<commit_message>
Update Training for Systems Engineering Add slide on Porter's five, to effectively place a medical device product
</commit_message>
<xml_diff>
--- a/2. Design and Development/DOC-201 - Training Systems Engineering.pptx
+++ b/2. Design and Development/DOC-201 - Training Systems Engineering.pptx
@@ -5,26 +5,27 @@
     <p:sldMasterId id="2147483648" r:id="rId1"/>
   </p:sldMasterIdLst>
   <p:notesMasterIdLst>
-    <p:notesMasterId r:id="rId19"/>
+    <p:notesMasterId r:id="rId20"/>
   </p:notesMasterIdLst>
   <p:sldIdLst>
     <p:sldId id="256" r:id="rId2"/>
     <p:sldId id="261" r:id="rId3"/>
-    <p:sldId id="272" r:id="rId4"/>
-    <p:sldId id="275" r:id="rId5"/>
-    <p:sldId id="273" r:id="rId6"/>
-    <p:sldId id="266" r:id="rId7"/>
-    <p:sldId id="265" r:id="rId8"/>
-    <p:sldId id="268" r:id="rId9"/>
-    <p:sldId id="270" r:id="rId10"/>
-    <p:sldId id="262" r:id="rId11"/>
-    <p:sldId id="264" r:id="rId12"/>
-    <p:sldId id="263" r:id="rId13"/>
-    <p:sldId id="269" r:id="rId14"/>
-    <p:sldId id="271" r:id="rId15"/>
-    <p:sldId id="276" r:id="rId16"/>
-    <p:sldId id="278" r:id="rId17"/>
-    <p:sldId id="279" r:id="rId18"/>
+    <p:sldId id="280" r:id="rId4"/>
+    <p:sldId id="272" r:id="rId5"/>
+    <p:sldId id="275" r:id="rId6"/>
+    <p:sldId id="273" r:id="rId7"/>
+    <p:sldId id="266" r:id="rId8"/>
+    <p:sldId id="265" r:id="rId9"/>
+    <p:sldId id="268" r:id="rId10"/>
+    <p:sldId id="270" r:id="rId11"/>
+    <p:sldId id="262" r:id="rId12"/>
+    <p:sldId id="264" r:id="rId13"/>
+    <p:sldId id="263" r:id="rId14"/>
+    <p:sldId id="269" r:id="rId15"/>
+    <p:sldId id="271" r:id="rId16"/>
+    <p:sldId id="276" r:id="rId17"/>
+    <p:sldId id="278" r:id="rId18"/>
+    <p:sldId id="279" r:id="rId19"/>
   </p:sldIdLst>
   <p:sldSz cx="12192000" cy="6858000"/>
   <p:notesSz cx="6858000" cy="9144000"/>
@@ -213,7 +214,7 @@
           <a:p>
             <a:fld id="{5464E162-CBEC-4925-93AE-447FF31D8791}" type="datetimeFigureOut">
               <a:rPr lang="en-US" smtClean="0"/>
-              <a:t>4/21/24</a:t>
+              <a:t>4/23/24</a:t>
             </a:fld>
             <a:endParaRPr lang="en-US"/>
           </a:p>
@@ -3357,7 +3358,7 @@
             </a:r>
             <a:r>
               <a:rPr lang="en-US" baseline="0" dirty="0"/>
-              <a:t> 004</a:t>
+              <a:t> 005</a:t>
             </a:r>
             <a:endParaRPr lang="en-US" dirty="0"/>
           </a:p>
@@ -3976,7 +3977,7 @@
           <a:p>
             <a:r>
               <a:rPr lang="en-US" dirty="0"/>
-              <a:t>Intended Purpose</a:t>
+              <a:t>Regulatory Strategy</a:t>
             </a:r>
           </a:p>
         </p:txBody>
@@ -3994,55 +3995,95 @@
         <p:spPr/>
         <p:txBody>
           <a:bodyPr>
-            <a:normAutofit/>
+            <a:normAutofit fontScale="85000" lnSpcReduction="10000"/>
           </a:bodyPr>
           <a:lstStyle/>
           <a:p>
             <a:r>
               <a:rPr lang="en-US" dirty="0"/>
-              <a:t>Often synonymously referred to as “intended use”</a:t>
-            </a:r>
-          </a:p>
-          <a:p>
-            <a:r>
-              <a:rPr lang="en-US" dirty="0"/>
-              <a:t>Cornerstone for:</a:t>
+              <a:t>EU, medical devices with hardware: all active devices need to comply with EMC and EMF (these require tests in official test labs).</a:t>
+            </a:r>
+          </a:p>
+          <a:p>
+            <a:r>
+              <a:rPr lang="en-US" dirty="0"/>
+              <a:t>For any </a:t>
+            </a:r>
+            <a:r>
+              <a:rPr lang="en-US" dirty="0" err="1"/>
+              <a:t>Wifi</a:t>
+            </a:r>
+            <a:r>
+              <a:rPr lang="en-US" dirty="0"/>
+              <a:t> device that is put on the market, compliance with the Radio Equipment Directive (RED) needs to be demonstrated.</a:t>
             </a:r>
           </a:p>
           <a:p>
             <a:pPr lvl="1"/>
             <a:r>
-              <a:rPr lang="en-US" dirty="0"/>
-              <a:t>Classification as a medical device</a:t>
-            </a:r>
+              <a:rPr lang="en-US" dirty="0">
+                <a:effectLst/>
+              </a:rPr>
+              <a:t>Even if radio modules are installed that already comply with RED, the RED conformity must be demonstrated again for the entire device in most cases. You can avoid certain tests, but the radio module must be appropriately installed and exemptions must be substantiated by a risk analysis.</a:t>
+            </a:r>
+            <a:endParaRPr lang="en-US" dirty="0"/>
           </a:p>
           <a:p>
             <a:pPr lvl="1"/>
             <a:r>
               <a:rPr lang="en-US" dirty="0"/>
-              <a:t>Classification of the medical device</a:t>
+              <a:t>Interesting note: Ho</a:t>
+            </a:r>
+            <a:r>
+              <a:rPr lang="en-US" dirty="0">
+                <a:effectLst/>
+              </a:rPr>
+              <a:t>w does the RPI get CE marking, even though it has an open PCB board? Answer is: it meets the standards, e.g. EMC, and uses a particular clause, where the user manual specifically needs to indicate a requirement for protective measures.</a:t>
+            </a:r>
+            <a:br>
+              <a:rPr lang="en-US" dirty="0">
+                <a:effectLst/>
+              </a:rPr>
+            </a:br>
+            <a:r>
+              <a:rPr lang="en-US" dirty="0">
+                <a:effectLst/>
+                <a:hlinkClick r:id="rId2" tooltip="https://electronics.stackexchange.com/questions/544125/how-does-a-bare-pcb-product-such-as-a-raspberry-pi-pass-esd-testing-for-ce-mark"/>
+              </a:rPr>
+              <a:t>https://electronics.stackexchange.com/questions/544125/how-does-a-bare-pcb-product-such-as-a-raspberry-pi-pass-esd-testing-for-ce-mark</a:t>
+            </a:r>
+            <a:endParaRPr lang="en-US" dirty="0">
+              <a:effectLst/>
+            </a:endParaRPr>
+          </a:p>
+          <a:p>
+            <a:r>
+              <a:rPr lang="en-US" dirty="0"/>
+              <a:t>EU: Is CE-Marking even needed?</a:t>
             </a:r>
           </a:p>
           <a:p>
             <a:pPr lvl="1"/>
             <a:r>
-              <a:rPr lang="en-US" dirty="0"/>
-              <a:t>What needs to be proven in the clinical evaluation</a:t>
+              <a:rPr lang="en-US" dirty="0">
+                <a:effectLst/>
+              </a:rPr>
+              <a:t>CE marking is only obligatory for products for which EU specifications exist and require the affixing of CE marking.</a:t>
             </a:r>
           </a:p>
           <a:p>
             <a:pPr lvl="1"/>
             <a:r>
               <a:rPr lang="en-US" dirty="0"/>
-              <a:t>Reimbursement (may require particular wording, also in indications for use)</a:t>
-            </a:r>
-          </a:p>
-          <a:p>
-            <a:pPr lvl="1"/>
-            <a:r>
-              <a:rPr lang="en-US" dirty="0"/>
-              <a:t>Liability</a:t>
-            </a:r>
+              <a:t>Not applicable for</a:t>
+            </a:r>
+            <a:r>
+              <a:rPr lang="en-US" dirty="0">
+                <a:effectLst/>
+              </a:rPr>
+              <a:t> resistors and other components</a:t>
+            </a:r>
+            <a:endParaRPr lang="en-US" dirty="0"/>
           </a:p>
         </p:txBody>
       </p:sp>
@@ -4071,46 +4112,10 @@
           </a:p>
         </p:txBody>
       </p:sp>
-      <p:sp>
-        <p:nvSpPr>
-          <p:cNvPr id="10" name="TextBox 9">
-            <a:extLst>
-              <a:ext uri="{FF2B5EF4-FFF2-40B4-BE49-F238E27FC236}">
-                <a16:creationId xmlns:a16="http://schemas.microsoft.com/office/drawing/2014/main" id="{7EEDC4AE-2441-246C-F406-5936FDB59959}"/>
-              </a:ext>
-            </a:extLst>
-          </p:cNvPr>
-          <p:cNvSpPr txBox="1"/>
-          <p:nvPr/>
-        </p:nvSpPr>
-        <p:spPr>
-          <a:xfrm>
-            <a:off x="3046142" y="4724543"/>
-            <a:ext cx="6099716" cy="923330"/>
-          </a:xfrm>
-          <a:prstGeom prst="rect">
-            <a:avLst/>
-          </a:prstGeom>
-          <a:noFill/>
-        </p:spPr>
-        <p:txBody>
-          <a:bodyPr wrap="square">
-            <a:spAutoFit/>
-          </a:bodyPr>
-          <a:lstStyle/>
-          <a:p>
-            <a:pPr algn="ctr"/>
-            <a:r>
-              <a:rPr lang="en-US" dirty="0"/>
-              <a:t>Note: The MDR also applies for some devices without a medical intended purpose (e.g. cosmetic lenses, aesthetic implants).</a:t>
-            </a:r>
-          </a:p>
-        </p:txBody>
-      </p:sp>
     </p:spTree>
     <p:extLst>
       <p:ext uri="{BB962C8B-B14F-4D97-AF65-F5344CB8AC3E}">
-        <p14:creationId xmlns:p14="http://schemas.microsoft.com/office/powerpoint/2010/main" val="2657151839"/>
+        <p14:creationId xmlns:p14="http://schemas.microsoft.com/office/powerpoint/2010/main" val="27161405"/>
       </p:ext>
     </p:extLst>
   </p:cSld>
@@ -4178,57 +4183,49 @@
           <a:p>
             <a:r>
               <a:rPr lang="en-US" dirty="0"/>
-              <a:t>Claims: what the device does</a:t>
+              <a:t>Often synonymously referred to as “intended use”</a:t>
+            </a:r>
+          </a:p>
+          <a:p>
+            <a:r>
+              <a:rPr lang="en-US" dirty="0"/>
+              <a:t>Cornerstone for:</a:t>
             </a:r>
           </a:p>
           <a:p>
             <a:pPr lvl="1"/>
             <a:r>
               <a:rPr lang="en-US" dirty="0"/>
-              <a:t>performance claims</a:t>
+              <a:t>Classification as a medical device</a:t>
             </a:r>
           </a:p>
           <a:p>
             <a:pPr lvl="1"/>
             <a:r>
               <a:rPr lang="en-US" dirty="0"/>
-              <a:t>benefit claims</a:t>
+              <a:t>Classification of the medical device</a:t>
             </a:r>
           </a:p>
           <a:p>
             <a:pPr lvl="1"/>
             <a:r>
               <a:rPr lang="en-US" dirty="0"/>
-              <a:t>non-clinical claims, list for clarity: other technical claims not to be evaluated in the CER, but can be claimed in the labeling and marketing</a:t>
+              <a:t>What needs to be proven in the clinical evaluation</a:t>
             </a:r>
           </a:p>
           <a:p>
             <a:pPr lvl="1"/>
             <a:r>
               <a:rPr lang="en-US" dirty="0"/>
-              <a:t>Disclaimers</a:t>
+              <a:t>Reimbursement (may require particular wording, also in indications for use)</a:t>
             </a:r>
           </a:p>
           <a:p>
             <a:pPr lvl="1"/>
             <a:r>
               <a:rPr lang="en-US" dirty="0"/>
-              <a:t>risks and side-effects</a:t>
-            </a:r>
-          </a:p>
-          <a:p>
-            <a:r>
-              <a:rPr lang="en-US" dirty="0"/>
-              <a:t>Intended patient population</a:t>
-            </a:r>
-          </a:p>
-          <a:p>
-            <a:pPr lvl="1"/>
-            <a:r>
-              <a:rPr lang="en-US" dirty="0"/>
-              <a:t>demographics (not diseases): age, weight, gender, ethnicity (e.g. AI trained on skin type), nationality, ..</a:t>
-            </a:r>
-            <a:endParaRPr lang="en-US" sz="1200" dirty="0"/>
+              <a:t>Liability</a:t>
+            </a:r>
           </a:p>
         </p:txBody>
       </p:sp>
@@ -4257,10 +4254,46 @@
           </a:p>
         </p:txBody>
       </p:sp>
+      <p:sp>
+        <p:nvSpPr>
+          <p:cNvPr id="10" name="TextBox 9">
+            <a:extLst>
+              <a:ext uri="{FF2B5EF4-FFF2-40B4-BE49-F238E27FC236}">
+                <a16:creationId xmlns:a16="http://schemas.microsoft.com/office/drawing/2014/main" id="{7EEDC4AE-2441-246C-F406-5936FDB59959}"/>
+              </a:ext>
+            </a:extLst>
+          </p:cNvPr>
+          <p:cNvSpPr txBox="1"/>
+          <p:nvPr/>
+        </p:nvSpPr>
+        <p:spPr>
+          <a:xfrm>
+            <a:off x="3046142" y="4724543"/>
+            <a:ext cx="6099716" cy="923330"/>
+          </a:xfrm>
+          <a:prstGeom prst="rect">
+            <a:avLst/>
+          </a:prstGeom>
+          <a:noFill/>
+        </p:spPr>
+        <p:txBody>
+          <a:bodyPr wrap="square">
+            <a:spAutoFit/>
+          </a:bodyPr>
+          <a:lstStyle/>
+          <a:p>
+            <a:pPr algn="ctr"/>
+            <a:r>
+              <a:rPr lang="en-US" dirty="0"/>
+              <a:t>Note: The MDR also applies for some devices without a medical intended purpose (e.g. cosmetic lenses, aesthetic implants).</a:t>
+            </a:r>
+          </a:p>
+        </p:txBody>
+      </p:sp>
     </p:spTree>
     <p:extLst>
       <p:ext uri="{BB962C8B-B14F-4D97-AF65-F5344CB8AC3E}">
-        <p14:creationId xmlns:p14="http://schemas.microsoft.com/office/powerpoint/2010/main" val="3916010154"/>
+        <p14:creationId xmlns:p14="http://schemas.microsoft.com/office/powerpoint/2010/main" val="2657151839"/>
       </p:ext>
     </p:extLst>
   </p:cSld>
@@ -4328,50 +4361,57 @@
           <a:p>
             <a:r>
               <a:rPr lang="en-US" dirty="0"/>
-              <a:t>Strategy:</a:t>
+              <a:t>Claims: what the device does</a:t>
             </a:r>
           </a:p>
           <a:p>
             <a:pPr lvl="1"/>
             <a:r>
               <a:rPr lang="en-US" dirty="0"/>
-              <a:t>FDA submissions</a:t>
-            </a:r>
-          </a:p>
-          <a:p>
-            <a:pPr lvl="2"/>
-            <a:r>
-              <a:rPr lang="en-US" dirty="0"/>
-              <a:t>“Me-too strategy”: follow the intended purpose of a previously cleared predicate device, even up to the point of copying its 510(k) submission. This is the easiest, least risky and most effective path to get to the market.</a:t>
-            </a:r>
-            <a:br>
-              <a:rPr lang="en-US" dirty="0"/>
-            </a:br>
-            <a:r>
-              <a:rPr lang="en-US" dirty="0"/>
-              <a:t>(best practice: browse FDA database for predicates in same product category)</a:t>
-            </a:r>
-          </a:p>
-          <a:p>
-            <a:pPr lvl="2"/>
-            <a:r>
-              <a:rPr lang="en-US" dirty="0"/>
-              <a:t>“Me-too +”: while generating revenue with the first, submit a second, high-risk submission with claims for an innovative device</a:t>
-            </a:r>
-          </a:p>
-          <a:p>
-            <a:pPr lvl="2"/>
-            <a:r>
-              <a:rPr lang="en-US" dirty="0"/>
-              <a:t>Classification as a medical device:</a:t>
-            </a:r>
-          </a:p>
-          <a:p>
-            <a:pPr lvl="3"/>
-            <a:r>
-              <a:rPr lang="en-US" dirty="0"/>
-              <a:t>Note that exemptions apply for certain devices (e.g. Non-Device clinical decision support, see CDS)</a:t>
-            </a:r>
+              <a:t>performance claims</a:t>
+            </a:r>
+          </a:p>
+          <a:p>
+            <a:pPr lvl="1"/>
+            <a:r>
+              <a:rPr lang="en-US" dirty="0"/>
+              <a:t>benefit claims</a:t>
+            </a:r>
+          </a:p>
+          <a:p>
+            <a:pPr lvl="1"/>
+            <a:r>
+              <a:rPr lang="en-US" dirty="0"/>
+              <a:t>non-clinical claims, list for clarity: other technical claims not to be evaluated in the CER, but can be claimed in the labeling and marketing</a:t>
+            </a:r>
+          </a:p>
+          <a:p>
+            <a:pPr lvl="1"/>
+            <a:r>
+              <a:rPr lang="en-US" dirty="0"/>
+              <a:t>Disclaimers</a:t>
+            </a:r>
+          </a:p>
+          <a:p>
+            <a:pPr lvl="1"/>
+            <a:r>
+              <a:rPr lang="en-US" dirty="0"/>
+              <a:t>risks and side-effects</a:t>
+            </a:r>
+          </a:p>
+          <a:p>
+            <a:r>
+              <a:rPr lang="en-US" dirty="0"/>
+              <a:t>Intended patient population</a:t>
+            </a:r>
+          </a:p>
+          <a:p>
+            <a:pPr lvl="1"/>
+            <a:r>
+              <a:rPr lang="en-US" dirty="0"/>
+              <a:t>demographics (not diseases): age, weight, gender, ethnicity (e.g. AI trained on skin type), nationality, ..</a:t>
+            </a:r>
+            <a:endParaRPr lang="en-US" sz="1200" dirty="0"/>
           </a:p>
         </p:txBody>
       </p:sp>
@@ -4403,7 +4443,7 @@
     </p:spTree>
     <p:extLst>
       <p:ext uri="{BB962C8B-B14F-4D97-AF65-F5344CB8AC3E}">
-        <p14:creationId xmlns:p14="http://schemas.microsoft.com/office/powerpoint/2010/main" val="1989624546"/>
+        <p14:creationId xmlns:p14="http://schemas.microsoft.com/office/powerpoint/2010/main" val="3916010154"/>
       </p:ext>
     </p:extLst>
   </p:cSld>
@@ -4465,83 +4505,55 @@
         <p:spPr/>
         <p:txBody>
           <a:bodyPr>
-            <a:normAutofit fontScale="92500" lnSpcReduction="20000"/>
+            <a:normAutofit/>
           </a:bodyPr>
           <a:lstStyle/>
           <a:p>
             <a:r>
               <a:rPr lang="en-US" dirty="0"/>
-              <a:t>General vs. narrow intended purpose:</a:t>
+              <a:t>Strategy:</a:t>
             </a:r>
           </a:p>
           <a:p>
             <a:pPr lvl="1"/>
             <a:r>
               <a:rPr lang="en-US" dirty="0"/>
-              <a:t>Europe:</a:t>
+              <a:t>FDA submissions</a:t>
             </a:r>
           </a:p>
           <a:p>
             <a:pPr lvl="2"/>
             <a:r>
               <a:rPr lang="en-US" dirty="0"/>
-              <a:t>Innovative devices should ideally/ theoretically claim a narrow scope, then extend it gradually through additional studies when the first device is already on the market.</a:t>
+              <a:t>“Me-too strategy”: follow the intended purpose of a previously cleared predicate device, even up to the point of copying its 510(k) submission. This is the easiest, least risky and most effective path to get to the market.</a:t>
+            </a:r>
+            <a:br>
+              <a:rPr lang="en-US" dirty="0"/>
+            </a:br>
+            <a:r>
+              <a:rPr lang="en-US" dirty="0"/>
+              <a:t>(best practice: browse FDA database for predicates in same product category)</a:t>
             </a:r>
           </a:p>
           <a:p>
             <a:pPr lvl="2"/>
             <a:r>
               <a:rPr lang="en-US" dirty="0"/>
-              <a:t>Being specific may significantly reduce the required efforts, e.g. for:</a:t>
+              <a:t>“Me-too +”: while generating revenue with the first, submit a second, high-risk submission with claims for an innovative device</a:t>
+            </a:r>
+          </a:p>
+          <a:p>
+            <a:pPr lvl="2"/>
+            <a:r>
+              <a:rPr lang="en-US" dirty="0"/>
+              <a:t>Classification as a medical device:</a:t>
             </a:r>
           </a:p>
           <a:p>
             <a:pPr lvl="3"/>
             <a:r>
               <a:rPr lang="en-US" dirty="0"/>
-              <a:t>Clinical evaluation: indication, patient population</a:t>
-            </a:r>
-          </a:p>
-          <a:p>
-            <a:pPr lvl="3"/>
-            <a:r>
-              <a:rPr lang="en-US" dirty="0"/>
-              <a:t>Design and validation: patient population</a:t>
-            </a:r>
-          </a:p>
-          <a:p>
-            <a:pPr lvl="3"/>
-            <a:r>
-              <a:rPr lang="en-US" dirty="0"/>
-              <a:t>Usability validation: user groups (number of groups, homogeneous?, trained?)</a:t>
-            </a:r>
-          </a:p>
-          <a:p>
-            <a:pPr lvl="1"/>
-            <a:r>
-              <a:rPr lang="en-US" dirty="0"/>
-              <a:t>FDA</a:t>
-            </a:r>
-          </a:p>
-          <a:p>
-            <a:pPr lvl="2"/>
-            <a:r>
-              <a:rPr lang="en-US" dirty="0"/>
-              <a:t>The “me-too strategy” often leads to a general intended purpose</a:t>
-            </a:r>
-          </a:p>
-          <a:p>
-            <a:pPr lvl="2"/>
-            <a:r>
-              <a:rPr lang="en-US" dirty="0"/>
-              <a:t>The FDA’s guidance document “General/Specific Intended Use - Guidance for Industry” provides indications to “determine whether the addition of a specific indication for use to a medical device cleared for marketing with a general indication for use could trigger the need for a PMA” or a Class III designation [FDA-2020-D-0957].</a:t>
-            </a:r>
-          </a:p>
-          <a:p>
-            <a:pPr lvl="2"/>
-            <a:r>
-              <a:rPr lang="en-US" dirty="0"/>
-              <a:t>Herein, substantial equivalence or non-equivalence is determined in part by general/specific uses. E.g., adding a more specific intended purpose with “treatment character” (e.g. knife for eye surgery or lithotripter) to a general intended use with a “tool” character (scalpel, typically Class I) may lead to a Class III designation.</a:t>
+              <a:t>Note that exemptions apply for certain devices (e.g. Non-Device clinical decision support, see CDS)</a:t>
             </a:r>
           </a:p>
         </p:txBody>
@@ -4574,7 +4586,7 @@
     </p:spTree>
     <p:extLst>
       <p:ext uri="{BB962C8B-B14F-4D97-AF65-F5344CB8AC3E}">
-        <p14:creationId xmlns:p14="http://schemas.microsoft.com/office/powerpoint/2010/main" val="3064633188"/>
+        <p14:creationId xmlns:p14="http://schemas.microsoft.com/office/powerpoint/2010/main" val="1989624546"/>
       </p:ext>
     </p:extLst>
   </p:cSld>
@@ -4618,7 +4630,7 @@
           <a:p>
             <a:r>
               <a:rPr lang="en-US" dirty="0"/>
-              <a:t>Requirements</a:t>
+              <a:t>Intended Purpose</a:t>
             </a:r>
           </a:p>
         </p:txBody>
@@ -4636,25 +4648,83 @@
         <p:spPr/>
         <p:txBody>
           <a:bodyPr>
-            <a:normAutofit/>
+            <a:normAutofit fontScale="92500" lnSpcReduction="20000"/>
           </a:bodyPr>
           <a:lstStyle/>
           <a:p>
             <a:r>
               <a:rPr lang="en-US" dirty="0"/>
-              <a:t>must</a:t>
-            </a:r>
-          </a:p>
-          <a:p>
-            <a:r>
-              <a:rPr lang="en-US" dirty="0"/>
-              <a:t>shall</a:t>
-            </a:r>
-          </a:p>
-          <a:p>
-            <a:r>
-              <a:rPr lang="en-US" dirty="0"/>
-              <a:t>should</a:t>
+              <a:t>General vs. narrow intended purpose:</a:t>
+            </a:r>
+          </a:p>
+          <a:p>
+            <a:pPr lvl="1"/>
+            <a:r>
+              <a:rPr lang="en-US" dirty="0"/>
+              <a:t>Europe:</a:t>
+            </a:r>
+          </a:p>
+          <a:p>
+            <a:pPr lvl="2"/>
+            <a:r>
+              <a:rPr lang="en-US" dirty="0"/>
+              <a:t>Innovative devices should ideally/ theoretically claim a narrow scope, then extend it gradually through additional studies when the first device is already on the market.</a:t>
+            </a:r>
+          </a:p>
+          <a:p>
+            <a:pPr lvl="2"/>
+            <a:r>
+              <a:rPr lang="en-US" dirty="0"/>
+              <a:t>Being specific may significantly reduce the required efforts, e.g. for:</a:t>
+            </a:r>
+          </a:p>
+          <a:p>
+            <a:pPr lvl="3"/>
+            <a:r>
+              <a:rPr lang="en-US" dirty="0"/>
+              <a:t>Clinical evaluation: indication, patient population</a:t>
+            </a:r>
+          </a:p>
+          <a:p>
+            <a:pPr lvl="3"/>
+            <a:r>
+              <a:rPr lang="en-US" dirty="0"/>
+              <a:t>Design and validation: patient population</a:t>
+            </a:r>
+          </a:p>
+          <a:p>
+            <a:pPr lvl="3"/>
+            <a:r>
+              <a:rPr lang="en-US" dirty="0"/>
+              <a:t>Usability validation: user groups (number of groups, homogeneous?, trained?)</a:t>
+            </a:r>
+          </a:p>
+          <a:p>
+            <a:pPr lvl="1"/>
+            <a:r>
+              <a:rPr lang="en-US" dirty="0"/>
+              <a:t>FDA</a:t>
+            </a:r>
+          </a:p>
+          <a:p>
+            <a:pPr lvl="2"/>
+            <a:r>
+              <a:rPr lang="en-US" dirty="0"/>
+              <a:t>The “me-too strategy” often leads to a general intended purpose</a:t>
+            </a:r>
+          </a:p>
+          <a:p>
+            <a:pPr lvl="2"/>
+            <a:r>
+              <a:rPr lang="en-US" dirty="0"/>
+              <a:t>The FDA’s guidance document “General/Specific Intended Use - Guidance for Industry” provides indications to “determine whether the addition of a specific indication for use to a medical device cleared for marketing with a general indication for use could trigger the need for a PMA” or a Class III designation [FDA-2020-D-0957].</a:t>
+            </a:r>
+          </a:p>
+          <a:p>
+            <a:pPr lvl="2"/>
+            <a:r>
+              <a:rPr lang="en-US" dirty="0"/>
+              <a:t>Herein, substantial equivalence or non-equivalence is determined in part by general/specific uses. E.g., adding a more specific intended purpose with “treatment character” (e.g. knife for eye surgery or lithotripter) to a general intended use with a “tool” character (scalpel, typically Class I) may lead to a Class III designation.</a:t>
             </a:r>
           </a:p>
         </p:txBody>
@@ -4687,7 +4757,7 @@
     </p:spTree>
     <p:extLst>
       <p:ext uri="{BB962C8B-B14F-4D97-AF65-F5344CB8AC3E}">
-        <p14:creationId xmlns:p14="http://schemas.microsoft.com/office/powerpoint/2010/main" val="3099098781"/>
+        <p14:creationId xmlns:p14="http://schemas.microsoft.com/office/powerpoint/2010/main" val="3064633188"/>
       </p:ext>
     </p:extLst>
   </p:cSld>
@@ -4731,7 +4801,7 @@
           <a:p>
             <a:r>
               <a:rPr lang="en-US" dirty="0"/>
-              <a:t>System Design Concepts Full-Stack Web</a:t>
+              <a:t>Requirements</a:t>
             </a:r>
           </a:p>
         </p:txBody>
@@ -4746,179 +4816,28 @@
             <p:ph idx="1"/>
           </p:nvPr>
         </p:nvSpPr>
-        <p:spPr>
-          <a:xfrm>
-            <a:off x="838200" y="1825625"/>
-            <a:ext cx="10515600" cy="4071700"/>
-          </a:xfrm>
-        </p:spPr>
+        <p:spPr/>
         <p:txBody>
           <a:bodyPr>
-            <a:normAutofit fontScale="55000" lnSpcReduction="20000"/>
+            <a:normAutofit/>
           </a:bodyPr>
           <a:lstStyle/>
           <a:p>
             <a:r>
               <a:rPr lang="en-US" dirty="0"/>
-              <a:t>Full-stack web programming includes:</a:t>
-            </a:r>
-          </a:p>
-          <a:p>
-            <a:pPr lvl="1"/>
-            <a:r>
-              <a:rPr lang="en-US" dirty="0"/>
-              <a:t>front-end: client software (e.g. JavaScript, jQuery, Angular, Vue)</a:t>
-            </a:r>
-          </a:p>
-          <a:p>
-            <a:pPr lvl="1"/>
-            <a:r>
-              <a:rPr lang="en-US" dirty="0"/>
-              <a:t>back-end: server software (e.g. PHP, ASP, Python, Node) including databases (e.g. SQL, SQLite, MongoDB)</a:t>
-            </a:r>
-          </a:p>
-          <a:p>
-            <a:r>
-              <a:rPr lang="en-US" dirty="0"/>
-              <a:t>Standard design concepts:</a:t>
-            </a:r>
-          </a:p>
-          <a:p>
-            <a:pPr lvl="1"/>
-            <a:r>
-              <a:rPr lang="en-US" dirty="0"/>
-              <a:t>web server:</a:t>
-            </a:r>
-          </a:p>
-          <a:p>
-            <a:pPr lvl="2"/>
-            <a:r>
-              <a:rPr lang="en-US" dirty="0"/>
-              <a:t>Load balancing: distribute traffic to multiple servers, e.g. DNS load balancing (resolve website to multiple IP addresses)</a:t>
-            </a:r>
-          </a:p>
-          <a:p>
-            <a:pPr lvl="1"/>
-            <a:r>
-              <a:rPr lang="en-US" dirty="0"/>
-              <a:t>static assets servers (images/videos)</a:t>
-            </a:r>
-          </a:p>
-          <a:p>
-            <a:pPr lvl="2"/>
-            <a:r>
-              <a:rPr lang="en-US" dirty="0"/>
-              <a:t>content delivery networks: global network of caching servers makes accessing content quick, e.g. pool technique: first user fetches the file, then it remains in cache.</a:t>
-            </a:r>
-          </a:p>
-          <a:p>
-            <a:pPr lvl="2"/>
-            <a:r>
-              <a:rPr lang="en-US" dirty="0"/>
-              <a:t>Distributed file systems (e.g. for users to upload images), e.g. Amazon S3</a:t>
-            </a:r>
-          </a:p>
-          <a:p>
-            <a:pPr lvl="1"/>
-            <a:r>
-              <a:rPr lang="en-US" dirty="0"/>
-              <a:t>database server:</a:t>
-            </a:r>
-          </a:p>
-          <a:p>
-            <a:pPr lvl="2"/>
-            <a:r>
-              <a:rPr lang="en-US" dirty="0"/>
-              <a:t>Use caching services: place popular data in caching layer instead of slow disk (e.g. NYT website). </a:t>
-            </a:r>
-          </a:p>
-          <a:p>
-            <a:pPr lvl="2"/>
-            <a:r>
-              <a:rPr lang="en-US" dirty="0" err="1"/>
-              <a:t>Indicing</a:t>
-            </a:r>
-            <a:r>
-              <a:rPr lang="en-US" dirty="0"/>
-              <a:t> using database schema design: the index points to the data record; use composite indices (an index table, e.g. sorted by longitude, latitude, last active) to make queries fast</a:t>
-            </a:r>
-          </a:p>
-          <a:p>
-            <a:pPr lvl="2"/>
-            <a:r>
-              <a:rPr lang="en-US" dirty="0"/>
-              <a:t>Slave-master replication: only master used to write to, slave databases replicate master for read-only (with a delay). To avoid delay for high priority request, read from master or a cache that is always up-to-date.</a:t>
-            </a:r>
-          </a:p>
-          <a:p>
-            <a:pPr lvl="2"/>
-            <a:r>
-              <a:rPr lang="en-US" dirty="0"/>
-              <a:t>Database </a:t>
-            </a:r>
-            <a:r>
-              <a:rPr lang="en-US" dirty="0" err="1"/>
-              <a:t>sharding</a:t>
-            </a:r>
-            <a:r>
-              <a:rPr lang="en-US" dirty="0"/>
-              <a:t>: split database into master databases on multiple servers.</a:t>
-            </a:r>
-          </a:p>
-          <a:p>
-            <a:pPr lvl="3"/>
-            <a:r>
-              <a:rPr lang="en-US" dirty="0"/>
-              <a:t>Allows lots of users write to the database simultaneously (e.g. Twitter)</a:t>
-            </a:r>
-          </a:p>
-          <a:p>
-            <a:pPr lvl="3"/>
-            <a:r>
-              <a:rPr lang="en-US" dirty="0" err="1"/>
-              <a:t>Verticle</a:t>
-            </a:r>
-            <a:r>
-              <a:rPr lang="en-US" dirty="0"/>
-              <a:t>: split into databases with different information (users, tweets, comments)</a:t>
-            </a:r>
-          </a:p>
-          <a:p>
-            <a:pPr lvl="3"/>
-            <a:r>
-              <a:rPr lang="en-US" dirty="0"/>
-              <a:t>Horizontal: split same content (e.g. tweets) over multiple machines, method: e.g. </a:t>
-            </a:r>
-            <a:r>
-              <a:rPr lang="en-US" dirty="0" err="1"/>
-              <a:t>userID</a:t>
-            </a:r>
-            <a:r>
-              <a:rPr lang="en-US" dirty="0"/>
-              <a:t> MOD N =&gt; server</a:t>
-            </a:r>
-          </a:p>
-          <a:p>
-            <a:pPr lvl="2"/>
-            <a:r>
-              <a:rPr lang="en-US" dirty="0"/>
-              <a:t>NoSQL databases: not relational (not tables), scale automatically across multiples machines (e.g. MongoDB, Firebase).</a:t>
-            </a:r>
-          </a:p>
-          <a:p>
-            <a:pPr lvl="1"/>
-            <a:r>
-              <a:rPr lang="en-US" dirty="0"/>
-              <a:t>API design (client-server communication): consider transport mechanism (e.g. JSON or protocol buffers), security requirements, support of offline usage</a:t>
-            </a:r>
-          </a:p>
-          <a:p>
-            <a:pPr marL="457200" lvl="1" indent="0">
-              <a:buNone/>
-            </a:pPr>
-            <a:r>
-              <a:rPr lang="en-US" dirty="0"/>
-              <a:t>General remark: Simplicity comes before optimization! No two applications scale the same way. Load and usage scenarios are important.</a:t>
+              <a:t>must</a:t>
+            </a:r>
+          </a:p>
+          <a:p>
+            <a:r>
+              <a:rPr lang="en-US" dirty="0"/>
+              <a:t>shall</a:t>
+            </a:r>
+          </a:p>
+          <a:p>
+            <a:r>
+              <a:rPr lang="en-US" dirty="0"/>
+              <a:t>should</a:t>
             </a:r>
           </a:p>
         </p:txBody>
@@ -4948,45 +4867,10 @@
           </a:p>
         </p:txBody>
       </p:sp>
-      <p:sp>
-        <p:nvSpPr>
-          <p:cNvPr id="6" name="TextBox 5">
-            <a:extLst>
-              <a:ext uri="{FF2B5EF4-FFF2-40B4-BE49-F238E27FC236}">
-                <a16:creationId xmlns:a16="http://schemas.microsoft.com/office/drawing/2014/main" id="{C7C555AA-6A66-253C-E0D7-89387CBF4661}"/>
-              </a:ext>
-            </a:extLst>
-          </p:cNvPr>
-          <p:cNvSpPr txBox="1"/>
-          <p:nvPr/>
-        </p:nvSpPr>
-        <p:spPr>
-          <a:xfrm>
-            <a:off x="830029" y="5897325"/>
-            <a:ext cx="10354644" cy="338554"/>
-          </a:xfrm>
-          <a:prstGeom prst="rect">
-            <a:avLst/>
-          </a:prstGeom>
-          <a:noFill/>
-        </p:spPr>
-        <p:txBody>
-          <a:bodyPr wrap="square">
-            <a:spAutoFit/>
-          </a:bodyPr>
-          <a:lstStyle/>
-          <a:p>
-            <a:r>
-              <a:rPr lang="en-US" sz="1600" dirty="0"/>
-              <a:t>[TechLead, 2020: Systems Design Interview concepts (for software engineers / full-stack web)]</a:t>
-            </a:r>
-          </a:p>
-        </p:txBody>
-      </p:sp>
     </p:spTree>
     <p:extLst>
       <p:ext uri="{BB962C8B-B14F-4D97-AF65-F5344CB8AC3E}">
-        <p14:creationId xmlns:p14="http://schemas.microsoft.com/office/powerpoint/2010/main" val="1408404674"/>
+        <p14:creationId xmlns:p14="http://schemas.microsoft.com/office/powerpoint/2010/main" val="3099098781"/>
       </p:ext>
     </p:extLst>
   </p:cSld>
@@ -5030,7 +4914,7 @@
           <a:p>
             <a:r>
               <a:rPr lang="en-US" dirty="0"/>
-              <a:t>Great Programming</a:t>
+              <a:t>System Design Concepts Full-Stack Web</a:t>
             </a:r>
           </a:p>
         </p:txBody>
@@ -5053,43 +4937,171 @@
         </p:spPr>
         <p:txBody>
           <a:bodyPr>
-            <a:normAutofit fontScale="92500" lnSpcReduction="20000"/>
+            <a:normAutofit fontScale="55000" lnSpcReduction="20000"/>
           </a:bodyPr>
           <a:lstStyle/>
           <a:p>
             <a:r>
               <a:rPr lang="en-US" dirty="0"/>
-              <a:t>Great programming can be practiced.</a:t>
-            </a:r>
-          </a:p>
-          <a:p>
-            <a:r>
-              <a:rPr lang="en-US" dirty="0"/>
-              <a:t>The core art is problem decomposition (e.g. using layers of abstraction)</a:t>
-            </a:r>
-          </a:p>
-          <a:p>
-            <a:r>
-              <a:rPr lang="en-US" dirty="0"/>
-              <a:t>Classes should be deep (i.e. simple interface (cost), lots of functionality contained (benefit); shallow classes create unnecessary overhead and complexity).</a:t>
-            </a:r>
-          </a:p>
-          <a:p>
-            <a:r>
-              <a:rPr lang="en-US" dirty="0"/>
-              <a:t>Ideally write classes for a general purpose (simpler and easier to maintain, special-purpose leads to complexity from sharing information through APIs)</a:t>
-            </a:r>
-          </a:p>
-          <a:p>
-            <a:r>
-              <a:rPr lang="en-US" dirty="0"/>
-              <a:t>Ideally write APIs for a general purpose</a:t>
-            </a:r>
-          </a:p>
-          <a:p>
-            <a:r>
-              <a:rPr lang="en-US" dirty="0"/>
-              <a:t>Spend 10% to continue improving your code base (as it will automatically become more complex otherwise); ideally, after a  change, it should be designed/structured as if change had been known from the start</a:t>
+              <a:t>Full-stack web programming includes:</a:t>
+            </a:r>
+          </a:p>
+          <a:p>
+            <a:pPr lvl="1"/>
+            <a:r>
+              <a:rPr lang="en-US" dirty="0"/>
+              <a:t>front-end: client software (e.g. JavaScript, jQuery, Angular, Vue)</a:t>
+            </a:r>
+          </a:p>
+          <a:p>
+            <a:pPr lvl="1"/>
+            <a:r>
+              <a:rPr lang="en-US" dirty="0"/>
+              <a:t>back-end: server software (e.g. PHP, ASP, Python, Node) including databases (e.g. SQL, SQLite, MongoDB)</a:t>
+            </a:r>
+          </a:p>
+          <a:p>
+            <a:r>
+              <a:rPr lang="en-US" dirty="0"/>
+              <a:t>Standard design concepts:</a:t>
+            </a:r>
+          </a:p>
+          <a:p>
+            <a:pPr lvl="1"/>
+            <a:r>
+              <a:rPr lang="en-US" dirty="0"/>
+              <a:t>web server:</a:t>
+            </a:r>
+          </a:p>
+          <a:p>
+            <a:pPr lvl="2"/>
+            <a:r>
+              <a:rPr lang="en-US" dirty="0"/>
+              <a:t>Load balancing: distribute traffic to multiple servers, e.g. DNS load balancing (resolve website to multiple IP addresses)</a:t>
+            </a:r>
+          </a:p>
+          <a:p>
+            <a:pPr lvl="1"/>
+            <a:r>
+              <a:rPr lang="en-US" dirty="0"/>
+              <a:t>static assets servers (images/videos)</a:t>
+            </a:r>
+          </a:p>
+          <a:p>
+            <a:pPr lvl="2"/>
+            <a:r>
+              <a:rPr lang="en-US" dirty="0"/>
+              <a:t>content delivery networks: global network of caching servers makes accessing content quick, e.g. pool technique: first user fetches the file, then it remains in cache.</a:t>
+            </a:r>
+          </a:p>
+          <a:p>
+            <a:pPr lvl="2"/>
+            <a:r>
+              <a:rPr lang="en-US" dirty="0"/>
+              <a:t>Distributed file systems (e.g. for users to upload images), e.g. Amazon S3</a:t>
+            </a:r>
+          </a:p>
+          <a:p>
+            <a:pPr lvl="1"/>
+            <a:r>
+              <a:rPr lang="en-US" dirty="0"/>
+              <a:t>database server:</a:t>
+            </a:r>
+          </a:p>
+          <a:p>
+            <a:pPr lvl="2"/>
+            <a:r>
+              <a:rPr lang="en-US" dirty="0"/>
+              <a:t>Use caching services: place popular data in caching layer instead of slow disk (e.g. NYT website). </a:t>
+            </a:r>
+          </a:p>
+          <a:p>
+            <a:pPr lvl="2"/>
+            <a:r>
+              <a:rPr lang="en-US" dirty="0" err="1"/>
+              <a:t>Indicing</a:t>
+            </a:r>
+            <a:r>
+              <a:rPr lang="en-US" dirty="0"/>
+              <a:t> using database schema design: the index points to the data record; use composite indices (an index table, e.g. sorted by longitude, latitude, last active) to make queries fast</a:t>
+            </a:r>
+          </a:p>
+          <a:p>
+            <a:pPr lvl="2"/>
+            <a:r>
+              <a:rPr lang="en-US" dirty="0"/>
+              <a:t>Slave-master replication: only master used to write to, slave databases replicate master for read-only (with a delay). To avoid delay for high priority request, read from master or a cache that is always up-to-date.</a:t>
+            </a:r>
+          </a:p>
+          <a:p>
+            <a:pPr lvl="2"/>
+            <a:r>
+              <a:rPr lang="en-US" dirty="0"/>
+              <a:t>Database </a:t>
+            </a:r>
+            <a:r>
+              <a:rPr lang="en-US" dirty="0" err="1"/>
+              <a:t>sharding</a:t>
+            </a:r>
+            <a:r>
+              <a:rPr lang="en-US" dirty="0"/>
+              <a:t>: split database into master databases on multiple servers.</a:t>
+            </a:r>
+          </a:p>
+          <a:p>
+            <a:pPr lvl="3"/>
+            <a:r>
+              <a:rPr lang="en-US" dirty="0"/>
+              <a:t>Allows lots of users write to the database simultaneously (e.g. Twitter)</a:t>
+            </a:r>
+          </a:p>
+          <a:p>
+            <a:pPr lvl="3"/>
+            <a:r>
+              <a:rPr lang="en-US" dirty="0" err="1"/>
+              <a:t>Verticle</a:t>
+            </a:r>
+            <a:r>
+              <a:rPr lang="en-US" dirty="0"/>
+              <a:t>: split into databases with different information (users, tweets, comments)</a:t>
+            </a:r>
+          </a:p>
+          <a:p>
+            <a:pPr lvl="3"/>
+            <a:r>
+              <a:rPr lang="en-US" dirty="0"/>
+              <a:t>Horizontal: split same content (e.g. tweets) over multiple machines, method: e.g. </a:t>
+            </a:r>
+            <a:r>
+              <a:rPr lang="en-US" dirty="0" err="1"/>
+              <a:t>userID</a:t>
+            </a:r>
+            <a:r>
+              <a:rPr lang="en-US" dirty="0"/>
+              <a:t> MOD N =&gt; server</a:t>
+            </a:r>
+          </a:p>
+          <a:p>
+            <a:pPr lvl="2"/>
+            <a:r>
+              <a:rPr lang="en-US" dirty="0"/>
+              <a:t>NoSQL databases: not relational (not tables), scale automatically across multiples machines (e.g. MongoDB, Firebase).</a:t>
+            </a:r>
+          </a:p>
+          <a:p>
+            <a:pPr lvl="1"/>
+            <a:r>
+              <a:rPr lang="en-US" dirty="0"/>
+              <a:t>API design (client-server communication): consider transport mechanism (e.g. JSON or protocol buffers), security requirements, support of offline usage</a:t>
+            </a:r>
+          </a:p>
+          <a:p>
+            <a:pPr marL="457200" lvl="1" indent="0">
+              <a:buNone/>
+            </a:pPr>
+            <a:r>
+              <a:rPr lang="en-US" dirty="0"/>
+              <a:t>General remark: Simplicity comes before optimization! No two applications scale the same way. Load and usage scenarios are important.</a:t>
             </a:r>
           </a:p>
         </p:txBody>
@@ -5149,15 +5161,7 @@
           <a:p>
             <a:r>
               <a:rPr lang="en-US" sz="1600" dirty="0"/>
-              <a:t>[Talk by </a:t>
-            </a:r>
-            <a:r>
-              <a:rPr lang="en-US" sz="1600" dirty="0" err="1"/>
-              <a:t>Ousterhout</a:t>
-            </a:r>
-            <a:r>
-              <a:rPr lang="en-US" sz="1600" dirty="0"/>
-              <a:t>, John related to: A Philosophy of Software Design]</a:t>
+              <a:t>[TechLead, 2020: Systems Design Interview concepts (for software engineers / full-stack web)]</a:t>
             </a:r>
           </a:p>
         </p:txBody>
@@ -5165,7 +5169,7 @@
     </p:spTree>
     <p:extLst>
       <p:ext uri="{BB962C8B-B14F-4D97-AF65-F5344CB8AC3E}">
-        <p14:creationId xmlns:p14="http://schemas.microsoft.com/office/powerpoint/2010/main" val="3004995272"/>
+        <p14:creationId xmlns:p14="http://schemas.microsoft.com/office/powerpoint/2010/main" val="1408404674"/>
       </p:ext>
     </p:extLst>
   </p:cSld>
@@ -5209,7 +5213,7 @@
           <a:p>
             <a:r>
               <a:rPr lang="en-US" dirty="0"/>
-              <a:t>Effective Engineering</a:t>
+              <a:t>Great Programming</a:t>
             </a:r>
           </a:p>
         </p:txBody>
@@ -5232,100 +5236,44 @@
         </p:spPr>
         <p:txBody>
           <a:bodyPr>
-            <a:normAutofit fontScale="77500" lnSpcReduction="20000"/>
+            <a:normAutofit fontScale="92500" lnSpcReduction="20000"/>
           </a:bodyPr>
           <a:lstStyle/>
           <a:p>
             <a:r>
               <a:rPr lang="en-US" dirty="0"/>
-              <a:t>10x-engineers produce 10x the impact, they do not work 10x the hours. </a:t>
-            </a:r>
-          </a:p>
-          <a:p>
-            <a:r>
-              <a:rPr lang="en-US" dirty="0"/>
-              <a:t>These engineers, per observation:</a:t>
-            </a:r>
-          </a:p>
-          <a:p>
-            <a:pPr lvl="1"/>
-            <a:r>
-              <a:rPr lang="en-US" dirty="0"/>
-              <a:t>Focus on big levers (work on what has the most impact), e.g. reduce complexity in design, do unit tests where they are most relevant, ..</a:t>
-            </a:r>
-          </a:p>
-          <a:p>
-            <a:pPr lvl="1"/>
-            <a:r>
-              <a:rPr lang="en-US" dirty="0"/>
-              <a:t>Optimize for learning (use opportunities to learn, educate themselves, do side projects, ..)</a:t>
-            </a:r>
-          </a:p>
-          <a:p>
-            <a:pPr lvl="1"/>
-            <a:r>
-              <a:rPr lang="en-US" dirty="0"/>
-              <a:t>Invest in iteration speed (learn and provide tooling, create tools when you need to do something twice, fasten build processes, [learn to focus and complete things in time] ..)</a:t>
-            </a:r>
-          </a:p>
-          <a:p>
-            <a:pPr lvl="1"/>
-            <a:r>
-              <a:rPr lang="en-US" dirty="0"/>
-              <a:t>Validate your ideas aggressively and iteratively, validate the assumptions that go into your ideas (this is sometimes very simple to do)</a:t>
-            </a:r>
-          </a:p>
-          <a:p>
-            <a:pPr lvl="1"/>
-            <a:r>
-              <a:rPr lang="en-US" dirty="0"/>
-              <a:t>Reduce complexity:</a:t>
-            </a:r>
-          </a:p>
-          <a:p>
-            <a:pPr lvl="2"/>
-            <a:r>
-              <a:rPr lang="en-US" dirty="0"/>
-              <a:t>Code and system complexity (easier-to-maintain, easier-to-learn for beginners)</a:t>
-            </a:r>
-          </a:p>
-          <a:p>
-            <a:pPr lvl="2"/>
-            <a:r>
-              <a:rPr lang="en-US" dirty="0"/>
-              <a:t>Product complexity (no clear vision; each feature adds a lot to that)</a:t>
-            </a:r>
-          </a:p>
-          <a:p>
-            <a:pPr lvl="2"/>
-            <a:r>
-              <a:rPr lang="en-US" dirty="0"/>
-              <a:t>Minimize operational burden (at its core, this is a cost of code complexity). With organizational complexity, quality and motivation goes down due to lack of feedback/work in isolation, bus factor goes down.</a:t>
-            </a:r>
-          </a:p>
-          <a:p>
-            <a:pPr lvl="1"/>
-            <a:r>
-              <a:rPr lang="en-US" dirty="0"/>
-              <a:t>Build a great engineering culture</a:t>
-            </a:r>
-          </a:p>
-          <a:p>
-            <a:pPr lvl="2"/>
-            <a:r>
-              <a:rPr lang="en-US" dirty="0"/>
-              <a:t>Candidates like companies with all of the above.</a:t>
-            </a:r>
-          </a:p>
-          <a:p>
-            <a:pPr lvl="2"/>
-            <a:r>
-              <a:rPr lang="en-US" dirty="0"/>
-              <a:t>Resource conflicts: communicate between teams on their priorities. Align priorities, otherwise, understand them to see if possibly your team has to do some of the low-priority work of others</a:t>
-            </a:r>
-          </a:p>
-          <a:p>
-            <a:endParaRPr lang="en-US" dirty="0"/>
+              <a:t>Great programming can be practiced.</a:t>
+            </a:r>
+          </a:p>
+          <a:p>
+            <a:r>
+              <a:rPr lang="en-US" dirty="0"/>
+              <a:t>The core art is problem decomposition (e.g. using layers of abstraction)</a:t>
+            </a:r>
+          </a:p>
+          <a:p>
+            <a:r>
+              <a:rPr lang="en-US" dirty="0"/>
+              <a:t>Classes should be deep (i.e. simple interface (cost), lots of functionality contained (benefit); shallow classes create unnecessary overhead and complexity).</a:t>
+            </a:r>
+          </a:p>
+          <a:p>
+            <a:r>
+              <a:rPr lang="en-US" dirty="0"/>
+              <a:t>Ideally write classes for a general purpose (simpler and easier to maintain, special-purpose leads to complexity from sharing information through APIs)</a:t>
+            </a:r>
+          </a:p>
+          <a:p>
+            <a:r>
+              <a:rPr lang="en-US" dirty="0"/>
+              <a:t>Ideally write APIs for a general purpose</a:t>
+            </a:r>
+          </a:p>
+          <a:p>
+            <a:r>
+              <a:rPr lang="en-US" dirty="0"/>
+              <a:t>Spend 10% to continue improving your code base (as it will automatically become more complex otherwise); ideally, after a  change, it should be designed/structured as if change had been known from the start</a:t>
+            </a:r>
           </a:p>
         </p:txBody>
       </p:sp>
@@ -5349,6 +5297,241 @@
               <a:rPr lang="en-US" smtClean="0"/>
               <a:pPr algn="l"/>
               <a:t>17</a:t>
+            </a:fld>
+            <a:endParaRPr lang="en-US" dirty="0"/>
+          </a:p>
+        </p:txBody>
+      </p:sp>
+      <p:sp>
+        <p:nvSpPr>
+          <p:cNvPr id="6" name="TextBox 5">
+            <a:extLst>
+              <a:ext uri="{FF2B5EF4-FFF2-40B4-BE49-F238E27FC236}">
+                <a16:creationId xmlns:a16="http://schemas.microsoft.com/office/drawing/2014/main" id="{C7C555AA-6A66-253C-E0D7-89387CBF4661}"/>
+              </a:ext>
+            </a:extLst>
+          </p:cNvPr>
+          <p:cNvSpPr txBox="1"/>
+          <p:nvPr/>
+        </p:nvSpPr>
+        <p:spPr>
+          <a:xfrm>
+            <a:off x="830029" y="5897325"/>
+            <a:ext cx="10354644" cy="338554"/>
+          </a:xfrm>
+          <a:prstGeom prst="rect">
+            <a:avLst/>
+          </a:prstGeom>
+          <a:noFill/>
+        </p:spPr>
+        <p:txBody>
+          <a:bodyPr wrap="square">
+            <a:spAutoFit/>
+          </a:bodyPr>
+          <a:lstStyle/>
+          <a:p>
+            <a:r>
+              <a:rPr lang="en-US" sz="1600" dirty="0"/>
+              <a:t>[Talk by </a:t>
+            </a:r>
+            <a:r>
+              <a:rPr lang="en-US" sz="1600" dirty="0" err="1"/>
+              <a:t>Ousterhout</a:t>
+            </a:r>
+            <a:r>
+              <a:rPr lang="en-US" sz="1600" dirty="0"/>
+              <a:t>, John related to: A Philosophy of Software Design]</a:t>
+            </a:r>
+          </a:p>
+        </p:txBody>
+      </p:sp>
+    </p:spTree>
+    <p:extLst>
+      <p:ext uri="{BB962C8B-B14F-4D97-AF65-F5344CB8AC3E}">
+        <p14:creationId xmlns:p14="http://schemas.microsoft.com/office/powerpoint/2010/main" val="3004995272"/>
+      </p:ext>
+    </p:extLst>
+  </p:cSld>
+  <p:clrMapOvr>
+    <a:masterClrMapping/>
+  </p:clrMapOvr>
+</p:sld>
+</file>
+
+<file path=ppt/slides/slide18.xml><?xml version="1.0" encoding="utf-8"?>
+<p:sld xmlns:a="http://schemas.openxmlformats.org/drawingml/2006/main" xmlns:r="http://schemas.openxmlformats.org/officeDocument/2006/relationships" xmlns:p="http://schemas.openxmlformats.org/presentationml/2006/main">
+  <p:cSld>
+    <p:spTree>
+      <p:nvGrpSpPr>
+        <p:cNvPr id="1" name=""/>
+        <p:cNvGrpSpPr/>
+        <p:nvPr/>
+      </p:nvGrpSpPr>
+      <p:grpSpPr>
+        <a:xfrm>
+          <a:off x="0" y="0"/>
+          <a:ext cx="0" cy="0"/>
+          <a:chOff x="0" y="0"/>
+          <a:chExt cx="0" cy="0"/>
+        </a:xfrm>
+      </p:grpSpPr>
+      <p:sp>
+        <p:nvSpPr>
+          <p:cNvPr id="2" name="Title 1"/>
+          <p:cNvSpPr>
+            <a:spLocks noGrp="1"/>
+          </p:cNvSpPr>
+          <p:nvPr>
+            <p:ph type="title"/>
+          </p:nvPr>
+        </p:nvSpPr>
+        <p:spPr/>
+        <p:txBody>
+          <a:bodyPr/>
+          <a:lstStyle/>
+          <a:p>
+            <a:r>
+              <a:rPr lang="en-US" dirty="0"/>
+              <a:t>Effective Engineering</a:t>
+            </a:r>
+          </a:p>
+        </p:txBody>
+      </p:sp>
+      <p:sp>
+        <p:nvSpPr>
+          <p:cNvPr id="3" name="Content Placeholder 2"/>
+          <p:cNvSpPr>
+            <a:spLocks noGrp="1"/>
+          </p:cNvSpPr>
+          <p:nvPr>
+            <p:ph idx="1"/>
+          </p:nvPr>
+        </p:nvSpPr>
+        <p:spPr>
+          <a:xfrm>
+            <a:off x="838200" y="1825625"/>
+            <a:ext cx="10515600" cy="4071700"/>
+          </a:xfrm>
+        </p:spPr>
+        <p:txBody>
+          <a:bodyPr>
+            <a:normAutofit fontScale="77500" lnSpcReduction="20000"/>
+          </a:bodyPr>
+          <a:lstStyle/>
+          <a:p>
+            <a:r>
+              <a:rPr lang="en-US" dirty="0"/>
+              <a:t>10x-engineers produce 10x the impact, they do not work 10x the hours. </a:t>
+            </a:r>
+          </a:p>
+          <a:p>
+            <a:r>
+              <a:rPr lang="en-US" dirty="0"/>
+              <a:t>These engineers, per observation:</a:t>
+            </a:r>
+          </a:p>
+          <a:p>
+            <a:pPr lvl="1"/>
+            <a:r>
+              <a:rPr lang="en-US" dirty="0"/>
+              <a:t>Focus on big levers (work on what has the most impact), e.g. reduce complexity in design, do unit tests where they are most relevant, ..</a:t>
+            </a:r>
+          </a:p>
+          <a:p>
+            <a:pPr lvl="1"/>
+            <a:r>
+              <a:rPr lang="en-US" dirty="0"/>
+              <a:t>Optimize for learning (use opportunities to learn, educate themselves, do side projects, ..)</a:t>
+            </a:r>
+          </a:p>
+          <a:p>
+            <a:pPr lvl="1"/>
+            <a:r>
+              <a:rPr lang="en-US" dirty="0"/>
+              <a:t>Invest in iteration speed (learn and provide tooling, create tools when you need to do something twice, fasten build processes, [learn to focus and complete things in time] ..)</a:t>
+            </a:r>
+          </a:p>
+          <a:p>
+            <a:pPr lvl="1"/>
+            <a:r>
+              <a:rPr lang="en-US" dirty="0"/>
+              <a:t>Validate your ideas aggressively and iteratively, validate the assumptions that go into your ideas (this is sometimes very simple to do)</a:t>
+            </a:r>
+          </a:p>
+          <a:p>
+            <a:pPr lvl="1"/>
+            <a:r>
+              <a:rPr lang="en-US" dirty="0"/>
+              <a:t>Reduce complexity:</a:t>
+            </a:r>
+          </a:p>
+          <a:p>
+            <a:pPr lvl="2"/>
+            <a:r>
+              <a:rPr lang="en-US" dirty="0"/>
+              <a:t>Code and system complexity (easier-to-maintain, easier-to-learn for beginners)</a:t>
+            </a:r>
+          </a:p>
+          <a:p>
+            <a:pPr lvl="2"/>
+            <a:r>
+              <a:rPr lang="en-US" dirty="0"/>
+              <a:t>Product complexity (no clear vision; each feature adds a lot to that)</a:t>
+            </a:r>
+          </a:p>
+          <a:p>
+            <a:pPr lvl="2"/>
+            <a:r>
+              <a:rPr lang="en-US" dirty="0"/>
+              <a:t>Minimize operational burden (at its core, this is a cost of code complexity). With organizational complexity, quality and motivation goes down due to lack of feedback/work in isolation, bus factor goes down.</a:t>
+            </a:r>
+          </a:p>
+          <a:p>
+            <a:pPr lvl="1"/>
+            <a:r>
+              <a:rPr lang="en-US" dirty="0"/>
+              <a:t>Build a great engineering culture</a:t>
+            </a:r>
+          </a:p>
+          <a:p>
+            <a:pPr lvl="2"/>
+            <a:r>
+              <a:rPr lang="en-US" dirty="0"/>
+              <a:t>Candidates like companies with all of the above.</a:t>
+            </a:r>
+          </a:p>
+          <a:p>
+            <a:pPr lvl="2"/>
+            <a:r>
+              <a:rPr lang="en-US" dirty="0"/>
+              <a:t>Resource conflicts: communicate between teams on their priorities. Align priorities, otherwise, understand them to see if possibly your team has to do some of the low-priority work of others</a:t>
+            </a:r>
+          </a:p>
+          <a:p>
+            <a:endParaRPr lang="en-US" dirty="0"/>
+          </a:p>
+        </p:txBody>
+      </p:sp>
+      <p:sp>
+        <p:nvSpPr>
+          <p:cNvPr id="4" name="Slide Number Placeholder 3"/>
+          <p:cNvSpPr>
+            <a:spLocks noGrp="1"/>
+          </p:cNvSpPr>
+          <p:nvPr>
+            <p:ph type="sldNum" sz="quarter" idx="12"/>
+          </p:nvPr>
+        </p:nvSpPr>
+        <p:spPr/>
+        <p:txBody>
+          <a:bodyPr/>
+          <a:lstStyle/>
+          <a:p>
+            <a:pPr algn="l"/>
+            <a:fld id="{11CDFDCC-1F45-4E80-8B17-15DA0BDDC059}" type="slidenum">
+              <a:rPr lang="en-US" smtClean="0"/>
+              <a:pPr algn="l"/>
+              <a:t>18</a:t>
             </a:fld>
             <a:endParaRPr lang="en-US" dirty="0"/>
           </a:p>
@@ -5634,19 +5817,107 @@
           <a:p>
             <a:r>
               <a:rPr lang="en-US" dirty="0"/>
-              <a:t>For a product, projects and early startups first need to find a business model.</a:t>
-            </a:r>
-          </a:p>
-          <a:p>
-            <a:r>
-              <a:rPr lang="en-US" dirty="0"/>
-              <a:t>To validate a business model, time and cost are typically limited.</a:t>
-            </a:r>
-          </a:p>
-          <a:p>
-            <a:r>
-              <a:rPr lang="en-US" dirty="0"/>
-              <a:t>Fill relevant fields of the Business Model Canvas, then validate and iterate it, ideally through early market exposure:</a:t>
+              <a:t>Profitability is the ability to avoid pure competition.</a:t>
+            </a:r>
+          </a:p>
+          <a:p>
+            <a:r>
+              <a:rPr lang="en-US" dirty="0"/>
+              <a:t>Competitive intensity is driven by Porter’s five [1]:</a:t>
+            </a:r>
+          </a:p>
+          <a:p>
+            <a:pPr marL="1371600" lvl="2" indent="-457200">
+              <a:buFont typeface="+mj-lt"/>
+              <a:buAutoNum type="arabicPeriod"/>
+            </a:pPr>
+            <a:r>
+              <a:rPr lang="en-US" dirty="0"/>
+              <a:t>Threat of new entrants</a:t>
+            </a:r>
+          </a:p>
+          <a:p>
+            <a:pPr lvl="3"/>
+            <a:r>
+              <a:rPr lang="en-US" dirty="0"/>
+              <a:t>Put barriers to entry</a:t>
+            </a:r>
+          </a:p>
+          <a:p>
+            <a:pPr marL="1371600" lvl="2" indent="-457200">
+              <a:buFont typeface="+mj-lt"/>
+              <a:buAutoNum type="arabicPeriod"/>
+            </a:pPr>
+            <a:r>
+              <a:rPr lang="en-US" dirty="0"/>
+              <a:t>Threat of substitutes </a:t>
+            </a:r>
+          </a:p>
+          <a:p>
+            <a:pPr lvl="3"/>
+            <a:r>
+              <a:rPr lang="en-US" dirty="0"/>
+              <a:t>Make use of, e.g. buyer switching costs</a:t>
+            </a:r>
+          </a:p>
+          <a:p>
+            <a:pPr marL="1371600" lvl="2" indent="-457200">
+              <a:buFont typeface="+mj-lt"/>
+              <a:buAutoNum type="arabicPeriod"/>
+            </a:pPr>
+            <a:r>
+              <a:rPr lang="en-US" dirty="0"/>
+              <a:t>Bargaining power of customers</a:t>
+            </a:r>
+          </a:p>
+          <a:p>
+            <a:pPr lvl="3"/>
+            <a:r>
+              <a:rPr lang="en-US" dirty="0"/>
+              <a:t>Make use of, e.g. buyer information availability</a:t>
+            </a:r>
+          </a:p>
+          <a:p>
+            <a:pPr marL="1371600" lvl="2" indent="-457200">
+              <a:buFont typeface="+mj-lt"/>
+              <a:buAutoNum type="arabicPeriod"/>
+            </a:pPr>
+            <a:r>
+              <a:rPr lang="en-US" dirty="0"/>
+              <a:t>Bargaining power of suppliers</a:t>
+            </a:r>
+          </a:p>
+          <a:p>
+            <a:pPr lvl="3"/>
+            <a:r>
+              <a:rPr lang="en-US" dirty="0"/>
+              <a:t>Avoid, or, e.g. make use of supplier switching costs relative to firm switching costs</a:t>
+            </a:r>
+          </a:p>
+          <a:p>
+            <a:pPr marL="1371600" lvl="2" indent="-457200">
+              <a:buFont typeface="+mj-lt"/>
+              <a:buAutoNum type="arabicPeriod"/>
+            </a:pPr>
+            <a:r>
+              <a:rPr lang="en-US" dirty="0"/>
+              <a:t>Competitive rivalry</a:t>
+            </a:r>
+          </a:p>
+          <a:p>
+            <a:pPr lvl="3"/>
+            <a:r>
+              <a:rPr lang="en-US" dirty="0"/>
+              <a:t>Know your competitors' marketing strategies and pricing</a:t>
+            </a:r>
+          </a:p>
+          <a:p>
+            <a:pPr marL="457200" lvl="1" indent="0">
+              <a:buNone/>
+            </a:pPr>
+            <a:r>
+              <a:rPr lang="en-US" dirty="0"/>
+              <a:t>[1] Porter, M.E., 1979 Harvard Business Review</a:t>
             </a:r>
           </a:p>
         </p:txBody>
@@ -5671,6 +5942,119 @@
               <a:rPr lang="en-US" smtClean="0"/>
               <a:pPr algn="l"/>
               <a:t>3</a:t>
+            </a:fld>
+            <a:endParaRPr lang="en-US" dirty="0"/>
+          </a:p>
+        </p:txBody>
+      </p:sp>
+    </p:spTree>
+    <p:extLst>
+      <p:ext uri="{BB962C8B-B14F-4D97-AF65-F5344CB8AC3E}">
+        <p14:creationId xmlns:p14="http://schemas.microsoft.com/office/powerpoint/2010/main" val="4089053926"/>
+      </p:ext>
+    </p:extLst>
+  </p:cSld>
+  <p:clrMapOvr>
+    <a:masterClrMapping/>
+  </p:clrMapOvr>
+</p:sld>
+</file>
+
+<file path=ppt/slides/slide4.xml><?xml version="1.0" encoding="utf-8"?>
+<p:sld xmlns:a="http://schemas.openxmlformats.org/drawingml/2006/main" xmlns:r="http://schemas.openxmlformats.org/officeDocument/2006/relationships" xmlns:p="http://schemas.openxmlformats.org/presentationml/2006/main">
+  <p:cSld>
+    <p:spTree>
+      <p:nvGrpSpPr>
+        <p:cNvPr id="1" name=""/>
+        <p:cNvGrpSpPr/>
+        <p:nvPr/>
+      </p:nvGrpSpPr>
+      <p:grpSpPr>
+        <a:xfrm>
+          <a:off x="0" y="0"/>
+          <a:ext cx="0" cy="0"/>
+          <a:chOff x="0" y="0"/>
+          <a:chExt cx="0" cy="0"/>
+        </a:xfrm>
+      </p:grpSpPr>
+      <p:sp>
+        <p:nvSpPr>
+          <p:cNvPr id="2" name="Title 1"/>
+          <p:cNvSpPr>
+            <a:spLocks noGrp="1"/>
+          </p:cNvSpPr>
+          <p:nvPr>
+            <p:ph type="title"/>
+          </p:nvPr>
+        </p:nvSpPr>
+        <p:spPr/>
+        <p:txBody>
+          <a:bodyPr/>
+          <a:lstStyle/>
+          <a:p>
+            <a:r>
+              <a:rPr lang="en-US" dirty="0"/>
+              <a:t>Business Strategy</a:t>
+            </a:r>
+          </a:p>
+        </p:txBody>
+      </p:sp>
+      <p:sp>
+        <p:nvSpPr>
+          <p:cNvPr id="3" name="Content Placeholder 2"/>
+          <p:cNvSpPr>
+            <a:spLocks noGrp="1"/>
+          </p:cNvSpPr>
+          <p:nvPr>
+            <p:ph idx="1"/>
+          </p:nvPr>
+        </p:nvSpPr>
+        <p:spPr/>
+        <p:txBody>
+          <a:bodyPr>
+            <a:normAutofit/>
+          </a:bodyPr>
+          <a:lstStyle/>
+          <a:p>
+            <a:r>
+              <a:rPr lang="en-US" dirty="0"/>
+              <a:t>For a product, projects and early startups first need to find a business model.</a:t>
+            </a:r>
+          </a:p>
+          <a:p>
+            <a:r>
+              <a:rPr lang="en-US" dirty="0"/>
+              <a:t>To validate a business model, time and cost are typically limited.</a:t>
+            </a:r>
+          </a:p>
+          <a:p>
+            <a:r>
+              <a:rPr lang="en-US" dirty="0"/>
+              <a:t>Fill relevant fields of the Business Model Canvas, then validate and iterate it, ideally through early market exposure:</a:t>
+            </a:r>
+          </a:p>
+        </p:txBody>
+      </p:sp>
+      <p:sp>
+        <p:nvSpPr>
+          <p:cNvPr id="4" name="Slide Number Placeholder 3"/>
+          <p:cNvSpPr>
+            <a:spLocks noGrp="1"/>
+          </p:cNvSpPr>
+          <p:nvPr>
+            <p:ph type="sldNum" sz="quarter" idx="12"/>
+          </p:nvPr>
+        </p:nvSpPr>
+        <p:spPr/>
+        <p:txBody>
+          <a:bodyPr/>
+          <a:lstStyle/>
+          <a:p>
+            <a:pPr algn="l"/>
+            <a:fld id="{11CDFDCC-1F45-4E80-8B17-15DA0BDDC059}" type="slidenum">
+              <a:rPr lang="en-US" smtClean="0"/>
+              <a:pPr algn="l"/>
+              <a:t>4</a:t>
             </a:fld>
             <a:endParaRPr lang="en-US" dirty="0"/>
           </a:p>
@@ -6224,7 +6608,7 @@
 </p:sld>
 </file>
 
-<file path=ppt/slides/slide4.xml><?xml version="1.0" encoding="utf-8"?>
+<file path=ppt/slides/slide5.xml><?xml version="1.0" encoding="utf-8"?>
 <p:sld xmlns:a="http://schemas.openxmlformats.org/drawingml/2006/main" xmlns:r="http://schemas.openxmlformats.org/officeDocument/2006/relationships" xmlns:p="http://schemas.openxmlformats.org/presentationml/2006/main">
   <p:cSld>
     <p:spTree>
@@ -6309,7 +6693,7 @@
             <a:fld id="{11CDFDCC-1F45-4E80-8B17-15DA0BDDC059}" type="slidenum">
               <a:rPr lang="en-US" smtClean="0"/>
               <a:pPr algn="l"/>
-              <a:t>4</a:t>
+              <a:t>5</a:t>
             </a:fld>
             <a:endParaRPr lang="en-US" dirty="0"/>
           </a:p>
@@ -6977,7 +7361,7 @@
 </p:sld>
 </file>
 
-<file path=ppt/slides/slide5.xml><?xml version="1.0" encoding="utf-8"?>
+<file path=ppt/slides/slide6.xml><?xml version="1.0" encoding="utf-8"?>
 <p:sld xmlns:a="http://schemas.openxmlformats.org/drawingml/2006/main" xmlns:r="http://schemas.openxmlformats.org/officeDocument/2006/relationships" xmlns:p="http://schemas.openxmlformats.org/presentationml/2006/main">
   <p:cSld>
     <p:spTree>
@@ -7181,7 +7565,7 @@
             <a:fld id="{11CDFDCC-1F45-4E80-8B17-15DA0BDDC059}" type="slidenum">
               <a:rPr lang="en-US" smtClean="0"/>
               <a:pPr algn="l"/>
-              <a:t>5</a:t>
+              <a:t>6</a:t>
             </a:fld>
             <a:endParaRPr lang="en-US" dirty="0"/>
           </a:p>
@@ -7786,136 +8170,6 @@
 </p:sld>
 </file>
 
-<file path=ppt/slides/slide6.xml><?xml version="1.0" encoding="utf-8"?>
-<p:sld xmlns:a="http://schemas.openxmlformats.org/drawingml/2006/main" xmlns:r="http://schemas.openxmlformats.org/officeDocument/2006/relationships" xmlns:p="http://schemas.openxmlformats.org/presentationml/2006/main">
-  <p:cSld>
-    <p:spTree>
-      <p:nvGrpSpPr>
-        <p:cNvPr id="1" name=""/>
-        <p:cNvGrpSpPr/>
-        <p:nvPr/>
-      </p:nvGrpSpPr>
-      <p:grpSpPr>
-        <a:xfrm>
-          <a:off x="0" y="0"/>
-          <a:ext cx="0" cy="0"/>
-          <a:chOff x="0" y="0"/>
-          <a:chExt cx="0" cy="0"/>
-        </a:xfrm>
-      </p:grpSpPr>
-      <p:sp>
-        <p:nvSpPr>
-          <p:cNvPr id="2" name="Title 1"/>
-          <p:cNvSpPr>
-            <a:spLocks noGrp="1"/>
-          </p:cNvSpPr>
-          <p:nvPr>
-            <p:ph type="title"/>
-          </p:nvPr>
-        </p:nvSpPr>
-        <p:spPr/>
-        <p:txBody>
-          <a:bodyPr/>
-          <a:lstStyle/>
-          <a:p>
-            <a:r>
-              <a:rPr lang="en-US" dirty="0"/>
-              <a:t>Go-To-Market Strategy</a:t>
-            </a:r>
-          </a:p>
-        </p:txBody>
-      </p:sp>
-      <p:sp>
-        <p:nvSpPr>
-          <p:cNvPr id="3" name="Content Placeholder 2"/>
-          <p:cNvSpPr>
-            <a:spLocks noGrp="1"/>
-          </p:cNvSpPr>
-          <p:nvPr>
-            <p:ph idx="1"/>
-          </p:nvPr>
-        </p:nvSpPr>
-        <p:spPr/>
-        <p:txBody>
-          <a:bodyPr>
-            <a:normAutofit/>
-          </a:bodyPr>
-          <a:lstStyle/>
-          <a:p>
-            <a:r>
-              <a:rPr lang="en-US" dirty="0"/>
-              <a:t>Go-to-market approach by Alpha </a:t>
-            </a:r>
-            <a:r>
-              <a:rPr lang="en-US" dirty="0" err="1"/>
-              <a:t>Innomed</a:t>
-            </a:r>
-            <a:r>
-              <a:rPr lang="en-US" dirty="0"/>
-              <a:t>:</a:t>
-            </a:r>
-          </a:p>
-          <a:p>
-            <a:pPr lvl="1"/>
-            <a:r>
-              <a:rPr lang="en-US" dirty="0"/>
-              <a:t>Define what constitutes the most ready and most suitable target market</a:t>
-            </a:r>
-          </a:p>
-          <a:p>
-            <a:pPr lvl="1"/>
-            <a:r>
-              <a:rPr lang="en-US" dirty="0"/>
-              <a:t>Think globally and find a favorable market (the “beach head”) among regulated and non-regulated markets</a:t>
-            </a:r>
-          </a:p>
-          <a:p>
-            <a:pPr lvl="1"/>
-            <a:r>
-              <a:rPr lang="en-US" dirty="0"/>
-              <a:t>Identify adoption barriers to reach the required market readiness</a:t>
-            </a:r>
-          </a:p>
-        </p:txBody>
-      </p:sp>
-      <p:sp>
-        <p:nvSpPr>
-          <p:cNvPr id="4" name="Slide Number Placeholder 3"/>
-          <p:cNvSpPr>
-            <a:spLocks noGrp="1"/>
-          </p:cNvSpPr>
-          <p:nvPr>
-            <p:ph type="sldNum" sz="quarter" idx="12"/>
-          </p:nvPr>
-        </p:nvSpPr>
-        <p:spPr/>
-        <p:txBody>
-          <a:bodyPr/>
-          <a:lstStyle/>
-          <a:p>
-            <a:pPr algn="l"/>
-            <a:fld id="{11CDFDCC-1F45-4E80-8B17-15DA0BDDC059}" type="slidenum">
-              <a:rPr lang="en-US" smtClean="0"/>
-              <a:pPr algn="l"/>
-              <a:t>6</a:t>
-            </a:fld>
-            <a:endParaRPr lang="en-US" dirty="0"/>
-          </a:p>
-        </p:txBody>
-      </p:sp>
-    </p:spTree>
-    <p:extLst>
-      <p:ext uri="{BB962C8B-B14F-4D97-AF65-F5344CB8AC3E}">
-        <p14:creationId xmlns:p14="http://schemas.microsoft.com/office/powerpoint/2010/main" val="4087401635"/>
-      </p:ext>
-    </p:extLst>
-  </p:cSld>
-  <p:clrMapOvr>
-    <a:masterClrMapping/>
-  </p:clrMapOvr>
-</p:sld>
-</file>
-
 <file path=ppt/slides/slide7.xml><?xml version="1.0" encoding="utf-8"?>
 <p:sld xmlns:a="http://schemas.openxmlformats.org/drawingml/2006/main" xmlns:r="http://schemas.openxmlformats.org/officeDocument/2006/relationships" xmlns:p="http://schemas.openxmlformats.org/presentationml/2006/main">
   <p:cSld>
@@ -7950,7 +8204,7 @@
           <a:p>
             <a:r>
               <a:rPr lang="en-US" dirty="0"/>
-              <a:t>Regulatory Strategy</a:t>
+              <a:t>Go-To-Market Strategy</a:t>
             </a:r>
           </a:p>
         </p:txBody>
@@ -7968,89 +8222,42 @@
         <p:spPr/>
         <p:txBody>
           <a:bodyPr>
-            <a:normAutofit fontScale="92500" lnSpcReduction="10000"/>
+            <a:normAutofit/>
           </a:bodyPr>
           <a:lstStyle/>
           <a:p>
             <a:r>
               <a:rPr lang="en-US" dirty="0"/>
-              <a:t>Once the target market has been identified, identify the applicable local regulations.</a:t>
-            </a:r>
-          </a:p>
-          <a:p>
-            <a:r>
-              <a:rPr lang="en-US" dirty="0"/>
-              <a:t>Choose a regulatory pathway:</a:t>
+              <a:t>Go-to-market approach by Alpha </a:t>
+            </a:r>
+            <a:r>
+              <a:rPr lang="en-US" dirty="0" err="1"/>
+              <a:t>Innomed</a:t>
+            </a:r>
+            <a:r>
+              <a:rPr lang="en-US" dirty="0"/>
+              <a:t>:</a:t>
             </a:r>
           </a:p>
           <a:p>
             <a:pPr lvl="1"/>
             <a:r>
               <a:rPr lang="en-US" dirty="0"/>
-              <a:t>Medical devices</a:t>
-            </a:r>
-          </a:p>
-          <a:p>
-            <a:pPr lvl="2"/>
-            <a:r>
-              <a:rPr lang="en-US" dirty="0"/>
-              <a:t>FDA: Premarket Notification 510(k), Premarket Approval (PMA), Humanitarian Device Exemption (HDE)</a:t>
-            </a:r>
-          </a:p>
-          <a:p>
-            <a:pPr lvl="2"/>
-            <a:r>
-              <a:rPr lang="en-US" dirty="0"/>
-              <a:t>Other markets: MDR (EU), NMPA (PRC), MFDS/KFDA (KOR), ANVISA (BRA) ..</a:t>
+              <a:t>Define what constitutes the most ready and most suitable target market</a:t>
             </a:r>
           </a:p>
           <a:p>
             <a:pPr lvl="1"/>
             <a:r>
               <a:rPr lang="en-US" dirty="0"/>
-              <a:t>Non-medical devices</a:t>
-            </a:r>
-          </a:p>
-          <a:p>
-            <a:pPr lvl="2"/>
-            <a:r>
-              <a:rPr lang="en-US" dirty="0"/>
-              <a:t>Further reading: </a:t>
-            </a:r>
-            <a:r>
-              <a:rPr lang="en-US" dirty="0">
-                <a:hlinkClick r:id="rId2"/>
-              </a:rPr>
-              <a:t>https://openregulatory.com/is-our-software-medical-device/</a:t>
-            </a:r>
-            <a:endParaRPr lang="en-US" dirty="0"/>
-          </a:p>
-          <a:p>
-            <a:pPr lvl="2"/>
-            <a:r>
-              <a:rPr lang="en-US" dirty="0"/>
-              <a:t>Health and wellness applications</a:t>
-            </a:r>
-          </a:p>
-          <a:p>
-            <a:pPr lvl="2"/>
-            <a:r>
-              <a:rPr lang="en-US" dirty="0"/>
-              <a:t>Educational purpose</a:t>
-            </a:r>
-          </a:p>
-          <a:p>
-            <a:pPr lvl="2"/>
-            <a:r>
-              <a:rPr lang="en-US" dirty="0"/>
-              <a:t>Devices ”intended to be used for research applications only”/ “not designed or intended to be used for diagnosis or treatment of disease”</a:t>
-            </a:r>
-          </a:p>
-          <a:p>
-            <a:pPr lvl="2"/>
-            <a:r>
-              <a:rPr lang="en-US" dirty="0"/>
-              <a:t>Machines (EU: Machinery Directive 2006/42/EC), radio equipment (EU: Directive 2014/53/EU)</a:t>
+              <a:t>Think globally and find a favorable market (the “beach head”) among regulated and non-regulated markets</a:t>
+            </a:r>
+          </a:p>
+          <a:p>
+            <a:pPr lvl="1"/>
+            <a:r>
+              <a:rPr lang="en-US" dirty="0"/>
+              <a:t>Identify adoption barriers to reach the required market readiness</a:t>
             </a:r>
           </a:p>
         </p:txBody>
@@ -8083,7 +8290,7 @@
     </p:spTree>
     <p:extLst>
       <p:ext uri="{BB962C8B-B14F-4D97-AF65-F5344CB8AC3E}">
-        <p14:creationId xmlns:p14="http://schemas.microsoft.com/office/powerpoint/2010/main" val="487582228"/>
+        <p14:creationId xmlns:p14="http://schemas.microsoft.com/office/powerpoint/2010/main" val="4087401635"/>
       </p:ext>
     </p:extLst>
   </p:cSld>
@@ -8112,6 +8319,28 @@
       </p:grpSpPr>
       <p:sp>
         <p:nvSpPr>
+          <p:cNvPr id="2" name="Title 1"/>
+          <p:cNvSpPr>
+            <a:spLocks noGrp="1"/>
+          </p:cNvSpPr>
+          <p:nvPr>
+            <p:ph type="title"/>
+          </p:nvPr>
+        </p:nvSpPr>
+        <p:spPr/>
+        <p:txBody>
+          <a:bodyPr/>
+          <a:lstStyle/>
+          <a:p>
+            <a:r>
+              <a:rPr lang="en-US" dirty="0"/>
+              <a:t>Regulatory Strategy</a:t>
+            </a:r>
+          </a:p>
+        </p:txBody>
+      </p:sp>
+      <p:sp>
+        <p:nvSpPr>
           <p:cNvPr id="3" name="Content Placeholder 2"/>
           <p:cNvSpPr>
             <a:spLocks noGrp="1"/>
@@ -8123,113 +8352,89 @@
         <p:spPr/>
         <p:txBody>
           <a:bodyPr>
-            <a:normAutofit fontScale="92500" lnSpcReduction="20000"/>
+            <a:normAutofit fontScale="92500" lnSpcReduction="10000"/>
           </a:bodyPr>
           <a:lstStyle/>
           <a:p>
             <a:r>
               <a:rPr lang="en-US" dirty="0"/>
-              <a:t>Non-medical devices:</a:t>
-            </a:r>
-            <a:br>
-              <a:rPr lang="en-US" dirty="0"/>
-            </a:br>
-            <a:r>
-              <a:rPr lang="en-US" dirty="0"/>
-              <a:t>Example for health and wellness application</a:t>
+              <a:t>Once the target market has been identified, identify the applicable local regulations.</a:t>
+            </a:r>
+          </a:p>
+          <a:p>
+            <a:r>
+              <a:rPr lang="en-US" dirty="0"/>
+              <a:t>Choose a regulatory pathway:</a:t>
             </a:r>
           </a:p>
           <a:p>
             <a:pPr lvl="1"/>
             <a:r>
               <a:rPr lang="en-US" dirty="0"/>
-              <a:t>Huawei Scale 3 Pro</a:t>
-            </a:r>
-            <a:br>
-              <a:rPr lang="en-US" dirty="0"/>
-            </a:br>
-            <a:r>
-              <a:rPr lang="en-US" dirty="0"/>
-              <a:t>“Compliance with the essential requirements and other relevant provisions of Directive 2014/53/EU (radio equipment directive, RAD).”</a:t>
+              <a:t>Medical devices</a:t>
             </a:r>
           </a:p>
           <a:p>
             <a:pPr lvl="2"/>
             <a:r>
               <a:rPr lang="en-US" dirty="0"/>
-              <a:t>Intended use:</a:t>
-            </a:r>
-          </a:p>
-          <a:p>
-            <a:pPr lvl="3"/>
-            <a:r>
-              <a:rPr lang="en-US" dirty="0"/>
-              <a:t>Weight measurements, body fat measurements, heart rate measurements, for use with HUAWEI Health App</a:t>
-            </a:r>
-          </a:p>
-          <a:p>
-            <a:pPr lvl="3"/>
-            <a:r>
-              <a:rPr lang="en-US" dirty="0"/>
-              <a:t>This product is not designed to be a medical device, and is not intended to diagnose, treat, cure or prevent any disease. All data and measurements should be used for personal reference only.</a:t>
-            </a:r>
-          </a:p>
-          <a:p>
-            <a:pPr lvl="3"/>
-            <a:r>
-              <a:rPr lang="en-US" dirty="0"/>
-              <a:t>The product is suitable for daily use, especially for people who would like to understand more about their weight, body shape, body fat, and </a:t>
-            </a:r>
-            <a:r>
-              <a:rPr lang="en-US" dirty="0" err="1"/>
-              <a:t>musclemass</a:t>
-            </a:r>
-            <a:r>
-              <a:rPr lang="en-US" dirty="0"/>
-              <a:t>. The data it provides is for personal reference only, and is not intended for medical treatment or as a basis for medical diagnosis, and should not be used in clinics or other medical institutions such as hospitals.”</a:t>
+              <a:t>FDA: Premarket Notification 510(k), Premarket Approval (PMA), Humanitarian Device Exemption (HDE)</a:t>
+            </a:r>
+          </a:p>
+          <a:p>
+            <a:pPr lvl="2"/>
+            <a:r>
+              <a:rPr lang="en-US" dirty="0"/>
+              <a:t>Other markets: MDR (EU), NMPA (PRC), MFDS/KFDA (KOR), ANVISA (BRA) ..</a:t>
             </a:r>
           </a:p>
           <a:p>
             <a:pPr lvl="1"/>
             <a:r>
               <a:rPr lang="en-US" dirty="0"/>
-              <a:t>HUAWEI Health App</a:t>
+              <a:t>Non-medical devices</a:t>
             </a:r>
           </a:p>
           <a:p>
             <a:pPr lvl="2"/>
             <a:r>
               <a:rPr lang="en-US" dirty="0"/>
-              <a:t>Intended use:</a:t>
-            </a:r>
-          </a:p>
-          <a:p>
-            <a:pPr lvl="3"/>
-            <a:r>
-              <a:rPr lang="en-US" dirty="0"/>
-              <a:t>“The Huawei Health app is designed for fitness and wellness only. It is not intended for the diagnosis or treatment of disease or other health problems, nor for the cure or prevention of disease. Huawei makes no representations or warranties to you in this respect.”</a:t>
-            </a:r>
-          </a:p>
-        </p:txBody>
-      </p:sp>
-      <p:sp>
-        <p:nvSpPr>
-          <p:cNvPr id="2" name="Title 1"/>
-          <p:cNvSpPr>
-            <a:spLocks noGrp="1"/>
-          </p:cNvSpPr>
-          <p:nvPr>
-            <p:ph type="title"/>
-          </p:nvPr>
-        </p:nvSpPr>
-        <p:spPr/>
-        <p:txBody>
-          <a:bodyPr/>
-          <a:lstStyle/>
-          <a:p>
-            <a:r>
-              <a:rPr lang="en-US" dirty="0"/>
-              <a:t>Regulatory Strategy</a:t>
+              <a:t>Further reading: </a:t>
+            </a:r>
+            <a:r>
+              <a:rPr lang="en-US" dirty="0">
+                <a:hlinkClick r:id="rId2"/>
+              </a:rPr>
+              <a:t>https://openregulatory.com/is-our-software-medical-device/</a:t>
+            </a:r>
+            <a:endParaRPr lang="en-US" dirty="0"/>
+          </a:p>
+          <a:p>
+            <a:pPr lvl="2"/>
+            <a:r>
+              <a:rPr lang="en-US" dirty="0"/>
+              <a:t>Health and wellness applications</a:t>
+            </a:r>
+          </a:p>
+          <a:p>
+            <a:pPr lvl="2"/>
+            <a:r>
+              <a:rPr lang="en-US" dirty="0"/>
+              <a:t>Educational purpose</a:t>
+            </a:r>
+          </a:p>
+          <a:p>
+            <a:pPr lvl="2"/>
+            <a:r>
+              <a:rPr lang="en-US" dirty="0"/>
+              <a:t>Devices ”intended to be used for research applications only”/ “not designed or intended to be used for diagnosis or treatment of disease”</a:t>
+            </a:r>
+          </a:p>
+          <a:p>
+            <a:pPr lvl="2"/>
+            <a:r>
+              <a:rPr lang="en-US" dirty="0"/>
+              <a:t>Machines (EU: Machinery Directive 2006/42/EC), radio equipment (EU: Directive 2014/53/EU)</a:t>
             </a:r>
           </a:p>
         </p:txBody>
@@ -8254,6 +8459,185 @@
               <a:rPr lang="en-US" smtClean="0"/>
               <a:pPr algn="l"/>
               <a:t>8</a:t>
+            </a:fld>
+            <a:endParaRPr lang="en-US" dirty="0"/>
+          </a:p>
+        </p:txBody>
+      </p:sp>
+    </p:spTree>
+    <p:extLst>
+      <p:ext uri="{BB962C8B-B14F-4D97-AF65-F5344CB8AC3E}">
+        <p14:creationId xmlns:p14="http://schemas.microsoft.com/office/powerpoint/2010/main" val="487582228"/>
+      </p:ext>
+    </p:extLst>
+  </p:cSld>
+  <p:clrMapOvr>
+    <a:masterClrMapping/>
+  </p:clrMapOvr>
+</p:sld>
+</file>
+
+<file path=ppt/slides/slide9.xml><?xml version="1.0" encoding="utf-8"?>
+<p:sld xmlns:a="http://schemas.openxmlformats.org/drawingml/2006/main" xmlns:r="http://schemas.openxmlformats.org/officeDocument/2006/relationships" xmlns:p="http://schemas.openxmlformats.org/presentationml/2006/main">
+  <p:cSld>
+    <p:spTree>
+      <p:nvGrpSpPr>
+        <p:cNvPr id="1" name=""/>
+        <p:cNvGrpSpPr/>
+        <p:nvPr/>
+      </p:nvGrpSpPr>
+      <p:grpSpPr>
+        <a:xfrm>
+          <a:off x="0" y="0"/>
+          <a:ext cx="0" cy="0"/>
+          <a:chOff x="0" y="0"/>
+          <a:chExt cx="0" cy="0"/>
+        </a:xfrm>
+      </p:grpSpPr>
+      <p:sp>
+        <p:nvSpPr>
+          <p:cNvPr id="3" name="Content Placeholder 2"/>
+          <p:cNvSpPr>
+            <a:spLocks noGrp="1"/>
+          </p:cNvSpPr>
+          <p:nvPr>
+            <p:ph idx="1"/>
+          </p:nvPr>
+        </p:nvSpPr>
+        <p:spPr/>
+        <p:txBody>
+          <a:bodyPr>
+            <a:normAutofit fontScale="92500" lnSpcReduction="20000"/>
+          </a:bodyPr>
+          <a:lstStyle/>
+          <a:p>
+            <a:r>
+              <a:rPr lang="en-US" dirty="0"/>
+              <a:t>Non-medical devices:</a:t>
+            </a:r>
+            <a:br>
+              <a:rPr lang="en-US" dirty="0"/>
+            </a:br>
+            <a:r>
+              <a:rPr lang="en-US" dirty="0"/>
+              <a:t>Example for health and wellness application</a:t>
+            </a:r>
+          </a:p>
+          <a:p>
+            <a:pPr lvl="1"/>
+            <a:r>
+              <a:rPr lang="en-US" dirty="0"/>
+              <a:t>Huawei Scale 3 Pro</a:t>
+            </a:r>
+            <a:br>
+              <a:rPr lang="en-US" dirty="0"/>
+            </a:br>
+            <a:r>
+              <a:rPr lang="en-US" dirty="0"/>
+              <a:t>“Compliance with the essential requirements and other relevant provisions of Directive 2014/53/EU (radio equipment directive, RAD).”</a:t>
+            </a:r>
+          </a:p>
+          <a:p>
+            <a:pPr lvl="2"/>
+            <a:r>
+              <a:rPr lang="en-US" dirty="0"/>
+              <a:t>Intended use:</a:t>
+            </a:r>
+          </a:p>
+          <a:p>
+            <a:pPr lvl="3"/>
+            <a:r>
+              <a:rPr lang="en-US" dirty="0"/>
+              <a:t>Weight measurements, body fat measurements, heart rate measurements, for use with HUAWEI Health App</a:t>
+            </a:r>
+          </a:p>
+          <a:p>
+            <a:pPr lvl="3"/>
+            <a:r>
+              <a:rPr lang="en-US" dirty="0"/>
+              <a:t>This product is not designed to be a medical device, and is not intended to diagnose, treat, cure or prevent any disease. All data and measurements should be used for personal reference only.</a:t>
+            </a:r>
+          </a:p>
+          <a:p>
+            <a:pPr lvl="3"/>
+            <a:r>
+              <a:rPr lang="en-US" dirty="0"/>
+              <a:t>The product is suitable for daily use, especially for people who would like to understand more about their weight, body shape, body fat, and </a:t>
+            </a:r>
+            <a:r>
+              <a:rPr lang="en-US" dirty="0" err="1"/>
+              <a:t>musclemass</a:t>
+            </a:r>
+            <a:r>
+              <a:rPr lang="en-US" dirty="0"/>
+              <a:t>. The data it provides is for personal reference only, and is not intended for medical treatment or as a basis for medical diagnosis, and should not be used in clinics or other medical institutions such as hospitals.”</a:t>
+            </a:r>
+          </a:p>
+          <a:p>
+            <a:pPr lvl="1"/>
+            <a:r>
+              <a:rPr lang="en-US" dirty="0"/>
+              <a:t>HUAWEI Health App</a:t>
+            </a:r>
+          </a:p>
+          <a:p>
+            <a:pPr lvl="2"/>
+            <a:r>
+              <a:rPr lang="en-US" dirty="0"/>
+              <a:t>Intended use:</a:t>
+            </a:r>
+          </a:p>
+          <a:p>
+            <a:pPr lvl="3"/>
+            <a:r>
+              <a:rPr lang="en-US" dirty="0"/>
+              <a:t>“The Huawei Health app is designed for fitness and wellness only. It is not intended for the diagnosis or treatment of disease or other health problems, nor for the cure or prevention of disease. Huawei makes no representations or warranties to you in this respect.”</a:t>
+            </a:r>
+          </a:p>
+        </p:txBody>
+      </p:sp>
+      <p:sp>
+        <p:nvSpPr>
+          <p:cNvPr id="2" name="Title 1"/>
+          <p:cNvSpPr>
+            <a:spLocks noGrp="1"/>
+          </p:cNvSpPr>
+          <p:nvPr>
+            <p:ph type="title"/>
+          </p:nvPr>
+        </p:nvSpPr>
+        <p:spPr/>
+        <p:txBody>
+          <a:bodyPr/>
+          <a:lstStyle/>
+          <a:p>
+            <a:r>
+              <a:rPr lang="en-US" dirty="0"/>
+              <a:t>Regulatory Strategy</a:t>
+            </a:r>
+          </a:p>
+        </p:txBody>
+      </p:sp>
+      <p:sp>
+        <p:nvSpPr>
+          <p:cNvPr id="4" name="Slide Number Placeholder 3"/>
+          <p:cNvSpPr>
+            <a:spLocks noGrp="1"/>
+          </p:cNvSpPr>
+          <p:nvPr>
+            <p:ph type="sldNum" sz="quarter" idx="12"/>
+          </p:nvPr>
+        </p:nvSpPr>
+        <p:spPr/>
+        <p:txBody>
+          <a:bodyPr/>
+          <a:lstStyle/>
+          <a:p>
+            <a:pPr algn="l"/>
+            <a:fld id="{11CDFDCC-1F45-4E80-8B17-15DA0BDDC059}" type="slidenum">
+              <a:rPr lang="en-US" smtClean="0"/>
+              <a:pPr algn="l"/>
+              <a:t>9</a:t>
             </a:fld>
             <a:endParaRPr lang="en-US" dirty="0"/>
           </a:p>
@@ -8308,188 +8692,6 @@
     <p:extLst>
       <p:ext uri="{BB962C8B-B14F-4D97-AF65-F5344CB8AC3E}">
         <p14:creationId xmlns:p14="http://schemas.microsoft.com/office/powerpoint/2010/main" val="664015928"/>
-      </p:ext>
-    </p:extLst>
-  </p:cSld>
-  <p:clrMapOvr>
-    <a:masterClrMapping/>
-  </p:clrMapOvr>
-</p:sld>
-</file>
-
-<file path=ppt/slides/slide9.xml><?xml version="1.0" encoding="utf-8"?>
-<p:sld xmlns:a="http://schemas.openxmlformats.org/drawingml/2006/main" xmlns:r="http://schemas.openxmlformats.org/officeDocument/2006/relationships" xmlns:p="http://schemas.openxmlformats.org/presentationml/2006/main">
-  <p:cSld>
-    <p:spTree>
-      <p:nvGrpSpPr>
-        <p:cNvPr id="1" name=""/>
-        <p:cNvGrpSpPr/>
-        <p:nvPr/>
-      </p:nvGrpSpPr>
-      <p:grpSpPr>
-        <a:xfrm>
-          <a:off x="0" y="0"/>
-          <a:ext cx="0" cy="0"/>
-          <a:chOff x="0" y="0"/>
-          <a:chExt cx="0" cy="0"/>
-        </a:xfrm>
-      </p:grpSpPr>
-      <p:sp>
-        <p:nvSpPr>
-          <p:cNvPr id="2" name="Title 1"/>
-          <p:cNvSpPr>
-            <a:spLocks noGrp="1"/>
-          </p:cNvSpPr>
-          <p:nvPr>
-            <p:ph type="title"/>
-          </p:nvPr>
-        </p:nvSpPr>
-        <p:spPr/>
-        <p:txBody>
-          <a:bodyPr/>
-          <a:lstStyle/>
-          <a:p>
-            <a:r>
-              <a:rPr lang="en-US" dirty="0"/>
-              <a:t>Regulatory Strategy</a:t>
-            </a:r>
-          </a:p>
-        </p:txBody>
-      </p:sp>
-      <p:sp>
-        <p:nvSpPr>
-          <p:cNvPr id="3" name="Content Placeholder 2"/>
-          <p:cNvSpPr>
-            <a:spLocks noGrp="1"/>
-          </p:cNvSpPr>
-          <p:nvPr>
-            <p:ph idx="1"/>
-          </p:nvPr>
-        </p:nvSpPr>
-        <p:spPr/>
-        <p:txBody>
-          <a:bodyPr>
-            <a:normAutofit fontScale="85000" lnSpcReduction="10000"/>
-          </a:bodyPr>
-          <a:lstStyle/>
-          <a:p>
-            <a:r>
-              <a:rPr lang="en-US" dirty="0"/>
-              <a:t>EU, medical devices with hardware: all active devices need to comply with EMC and EMF (these require tests in official test labs).</a:t>
-            </a:r>
-          </a:p>
-          <a:p>
-            <a:r>
-              <a:rPr lang="en-US" dirty="0"/>
-              <a:t>For any </a:t>
-            </a:r>
-            <a:r>
-              <a:rPr lang="en-US" dirty="0" err="1"/>
-              <a:t>Wifi</a:t>
-            </a:r>
-            <a:r>
-              <a:rPr lang="en-US" dirty="0"/>
-              <a:t> device that is put on the market, compliance with the Radio Equipment Directive (RED) needs to be demonstrated.</a:t>
-            </a:r>
-          </a:p>
-          <a:p>
-            <a:pPr lvl="1"/>
-            <a:r>
-              <a:rPr lang="en-US" dirty="0">
-                <a:effectLst/>
-              </a:rPr>
-              <a:t>Even if radio modules are installed that already comply with RED, the RED conformity must be demonstrated again for the entire device in most cases. You can avoid certain tests, but the radio module must be appropriately installed and exemptions must be substantiated by a risk analysis.</a:t>
-            </a:r>
-            <a:endParaRPr lang="en-US" dirty="0"/>
-          </a:p>
-          <a:p>
-            <a:pPr lvl="1"/>
-            <a:r>
-              <a:rPr lang="en-US" dirty="0"/>
-              <a:t>Interesting note: Ho</a:t>
-            </a:r>
-            <a:r>
-              <a:rPr lang="en-US" dirty="0">
-                <a:effectLst/>
-              </a:rPr>
-              <a:t>w does the RPI get CE marking, even though it has an open PCB board? Answer is: it meets the standards, e.g. EMC, and uses a particular clause, where the user manual specifically needs to indicate a requirement for protective measures.</a:t>
-            </a:r>
-            <a:br>
-              <a:rPr lang="en-US" dirty="0">
-                <a:effectLst/>
-              </a:rPr>
-            </a:br>
-            <a:r>
-              <a:rPr lang="en-US" dirty="0">
-                <a:effectLst/>
-                <a:hlinkClick r:id="rId2" tooltip="https://electronics.stackexchange.com/questions/544125/how-does-a-bare-pcb-product-such-as-a-raspberry-pi-pass-esd-testing-for-ce-mark"/>
-              </a:rPr>
-              <a:t>https://electronics.stackexchange.com/questions/544125/how-does-a-bare-pcb-product-such-as-a-raspberry-pi-pass-esd-testing-for-ce-mark</a:t>
-            </a:r>
-            <a:endParaRPr lang="en-US" dirty="0">
-              <a:effectLst/>
-            </a:endParaRPr>
-          </a:p>
-          <a:p>
-            <a:r>
-              <a:rPr lang="en-US" dirty="0"/>
-              <a:t>EU: Is CE-Marking even needed?</a:t>
-            </a:r>
-          </a:p>
-          <a:p>
-            <a:pPr lvl="1"/>
-            <a:r>
-              <a:rPr lang="en-US" dirty="0">
-                <a:effectLst/>
-              </a:rPr>
-              <a:t>CE marking is only obligatory for products for which EU specifications exist and require the affixing of CE marking.</a:t>
-            </a:r>
-          </a:p>
-          <a:p>
-            <a:pPr lvl="1"/>
-            <a:r>
-              <a:rPr lang="en-US" dirty="0"/>
-              <a:t>Not applicable for</a:t>
-            </a:r>
-            <a:r>
-              <a:rPr lang="en-US" dirty="0">
-                <a:effectLst/>
-              </a:rPr>
-              <a:t> resistors and other components</a:t>
-            </a:r>
-            <a:endParaRPr lang="en-US" dirty="0"/>
-          </a:p>
-        </p:txBody>
-      </p:sp>
-      <p:sp>
-        <p:nvSpPr>
-          <p:cNvPr id="4" name="Slide Number Placeholder 3"/>
-          <p:cNvSpPr>
-            <a:spLocks noGrp="1"/>
-          </p:cNvSpPr>
-          <p:nvPr>
-            <p:ph type="sldNum" sz="quarter" idx="12"/>
-          </p:nvPr>
-        </p:nvSpPr>
-        <p:spPr/>
-        <p:txBody>
-          <a:bodyPr/>
-          <a:lstStyle/>
-          <a:p>
-            <a:pPr algn="l"/>
-            <a:fld id="{11CDFDCC-1F45-4E80-8B17-15DA0BDDC059}" type="slidenum">
-              <a:rPr lang="en-US" smtClean="0"/>
-              <a:pPr algn="l"/>
-              <a:t>9</a:t>
-            </a:fld>
-            <a:endParaRPr lang="en-US" dirty="0"/>
-          </a:p>
-        </p:txBody>
-      </p:sp>
-    </p:spTree>
-    <p:extLst>
-      <p:ext uri="{BB962C8B-B14F-4D97-AF65-F5344CB8AC3E}">
-        <p14:creationId xmlns:p14="http://schemas.microsoft.com/office/powerpoint/2010/main" val="27161405"/>
       </p:ext>
     </p:extLst>
   </p:cSld>

</xml_diff>

<commit_message>
Add slide on the scientific method, cause and effect
</commit_message>
<xml_diff>
--- a/2. Design and Development/DOC-201 - Training Systems Engineering.pptx
+++ b/2. Design and Development/DOC-201 - Training Systems Engineering.pptx
@@ -5,27 +5,29 @@
     <p:sldMasterId id="2147483648" r:id="rId1"/>
   </p:sldMasterIdLst>
   <p:notesMasterIdLst>
-    <p:notesMasterId r:id="rId20"/>
+    <p:notesMasterId r:id="rId22"/>
   </p:notesMasterIdLst>
   <p:sldIdLst>
     <p:sldId id="256" r:id="rId2"/>
     <p:sldId id="261" r:id="rId3"/>
-    <p:sldId id="280" r:id="rId4"/>
-    <p:sldId id="272" r:id="rId5"/>
-    <p:sldId id="275" r:id="rId6"/>
-    <p:sldId id="273" r:id="rId7"/>
-    <p:sldId id="266" r:id="rId8"/>
-    <p:sldId id="265" r:id="rId9"/>
-    <p:sldId id="268" r:id="rId10"/>
-    <p:sldId id="270" r:id="rId11"/>
-    <p:sldId id="262" r:id="rId12"/>
-    <p:sldId id="264" r:id="rId13"/>
-    <p:sldId id="263" r:id="rId14"/>
-    <p:sldId id="269" r:id="rId15"/>
-    <p:sldId id="271" r:id="rId16"/>
-    <p:sldId id="276" r:id="rId17"/>
-    <p:sldId id="278" r:id="rId18"/>
-    <p:sldId id="279" r:id="rId19"/>
+    <p:sldId id="282" r:id="rId4"/>
+    <p:sldId id="281" r:id="rId5"/>
+    <p:sldId id="280" r:id="rId6"/>
+    <p:sldId id="272" r:id="rId7"/>
+    <p:sldId id="275" r:id="rId8"/>
+    <p:sldId id="273" r:id="rId9"/>
+    <p:sldId id="266" r:id="rId10"/>
+    <p:sldId id="265" r:id="rId11"/>
+    <p:sldId id="268" r:id="rId12"/>
+    <p:sldId id="270" r:id="rId13"/>
+    <p:sldId id="262" r:id="rId14"/>
+    <p:sldId id="264" r:id="rId15"/>
+    <p:sldId id="263" r:id="rId16"/>
+    <p:sldId id="269" r:id="rId17"/>
+    <p:sldId id="271" r:id="rId18"/>
+    <p:sldId id="276" r:id="rId19"/>
+    <p:sldId id="278" r:id="rId20"/>
+    <p:sldId id="279" r:id="rId21"/>
   </p:sldIdLst>
   <p:sldSz cx="12192000" cy="6858000"/>
   <p:notesSz cx="6858000" cy="9144000"/>
@@ -214,7 +216,7 @@
           <a:p>
             <a:fld id="{5464E162-CBEC-4925-93AE-447FF31D8791}" type="datetimeFigureOut">
               <a:rPr lang="en-US" smtClean="0"/>
-              <a:t>4/23/24</a:t>
+              <a:t>6/18/25</a:t>
             </a:fld>
             <a:endParaRPr lang="en-US"/>
           </a:p>
@@ -3358,7 +3360,7 @@
             </a:r>
             <a:r>
               <a:rPr lang="en-US" baseline="0" dirty="0"/>
-              <a:t> 005</a:t>
+              <a:t> 006</a:t>
             </a:r>
             <a:endParaRPr lang="en-US" dirty="0"/>
           </a:p>
@@ -3995,95 +3997,90 @@
         <p:spPr/>
         <p:txBody>
           <a:bodyPr>
-            <a:normAutofit fontScale="85000" lnSpcReduction="10000"/>
+            <a:normAutofit fontScale="92500" lnSpcReduction="10000"/>
           </a:bodyPr>
           <a:lstStyle/>
           <a:p>
             <a:r>
               <a:rPr lang="en-US" dirty="0"/>
-              <a:t>EU, medical devices with hardware: all active devices need to comply with EMC and EMF (these require tests in official test labs).</a:t>
-            </a:r>
-          </a:p>
-          <a:p>
-            <a:r>
-              <a:rPr lang="en-US" dirty="0"/>
-              <a:t>For any </a:t>
-            </a:r>
-            <a:r>
-              <a:rPr lang="en-US" dirty="0" err="1"/>
-              <a:t>Wifi</a:t>
-            </a:r>
-            <a:r>
-              <a:rPr lang="en-US" dirty="0"/>
-              <a:t> device that is put on the market, compliance with the Radio Equipment Directive (RED) needs to be demonstrated.</a:t>
+              <a:t>Once the target market has been identified, identify the applicable local regulations.</a:t>
+            </a:r>
+          </a:p>
+          <a:p>
+            <a:r>
+              <a:rPr lang="en-US" dirty="0"/>
+              <a:t>Choose a regulatory pathway:</a:t>
             </a:r>
           </a:p>
           <a:p>
             <a:pPr lvl="1"/>
             <a:r>
+              <a:rPr lang="en-US" dirty="0"/>
+              <a:t>Medical devices</a:t>
+            </a:r>
+          </a:p>
+          <a:p>
+            <a:pPr lvl="2"/>
+            <a:r>
+              <a:rPr lang="en-US" dirty="0"/>
+              <a:t>FDA: Premarket Notification 510(k), Premarket Approval (PMA), Humanitarian Device Exemption (HDE)</a:t>
+            </a:r>
+          </a:p>
+          <a:p>
+            <a:pPr lvl="2"/>
+            <a:r>
+              <a:rPr lang="en-US" dirty="0"/>
+              <a:t>Other markets: MDR (EU), NMPA (PRC), MFDS/KFDA (KOR), ANVISA (BRA) ..</a:t>
+            </a:r>
+          </a:p>
+          <a:p>
+            <a:pPr lvl="1"/>
+            <a:r>
+              <a:rPr lang="en-US" dirty="0"/>
+              <a:t>Non-medical devices</a:t>
+            </a:r>
+          </a:p>
+          <a:p>
+            <a:pPr lvl="2"/>
+            <a:r>
+              <a:rPr lang="en-US" dirty="0"/>
+              <a:t>Further reading: </a:t>
+            </a:r>
+            <a:r>
               <a:rPr lang="en-US" dirty="0">
-                <a:effectLst/>
+                <a:hlinkClick r:id="rId2"/>
               </a:rPr>
-              <a:t>Even if radio modules are installed that already comply with RED, the RED conformity must be demonstrated again for the entire device in most cases. You can avoid certain tests, but the radio module must be appropriately installed and exemptions must be substantiated by a risk analysis.</a:t>
+              <a:t>https://openregulatory.com/is-our-software-medical-device/</a:t>
             </a:r>
             <a:endParaRPr lang="en-US" dirty="0"/>
           </a:p>
           <a:p>
-            <a:pPr lvl="1"/>
-            <a:r>
-              <a:rPr lang="en-US" dirty="0"/>
-              <a:t>Interesting note: Ho</a:t>
-            </a:r>
-            <a:r>
-              <a:rPr lang="en-US" dirty="0">
-                <a:effectLst/>
-              </a:rPr>
-              <a:t>w does the RPI get CE marking, even though it has an open PCB board? Answer is: it meets the standards, e.g. EMC, and uses a particular clause, where the user manual specifically needs to indicate a requirement for protective measures.</a:t>
-            </a:r>
-            <a:br>
-              <a:rPr lang="en-US" dirty="0">
-                <a:effectLst/>
-              </a:rPr>
-            </a:br>
-            <a:r>
-              <a:rPr lang="en-US" dirty="0">
-                <a:effectLst/>
-                <a:hlinkClick r:id="rId2" tooltip="https://electronics.stackexchange.com/questions/544125/how-does-a-bare-pcb-product-such-as-a-raspberry-pi-pass-esd-testing-for-ce-mark"/>
-              </a:rPr>
-              <a:t>https://electronics.stackexchange.com/questions/544125/how-does-a-bare-pcb-product-such-as-a-raspberry-pi-pass-esd-testing-for-ce-mark</a:t>
-            </a:r>
-            <a:endParaRPr lang="en-US" dirty="0">
-              <a:effectLst/>
-            </a:endParaRPr>
-          </a:p>
-          <a:p>
-            <a:r>
-              <a:rPr lang="en-US" dirty="0"/>
-              <a:t>EU: Is CE-Marking even needed?</a:t>
-            </a:r>
-          </a:p>
-          <a:p>
-            <a:pPr lvl="1"/>
-            <a:r>
-              <a:rPr lang="en-US" dirty="0">
-                <a:effectLst/>
-              </a:rPr>
-              <a:t>CE marking is only obligatory for products for which EU specifications exist and require the affixing of CE marking.</a:t>
-            </a:r>
-          </a:p>
-          <a:p>
-            <a:pPr lvl="1"/>
-            <a:r>
-              <a:rPr lang="en-US" dirty="0"/>
-              <a:t>Not applicable for</a:t>
-            </a:r>
-            <a:r>
-              <a:rPr lang="en-US" dirty="0">
-                <a:effectLst/>
-              </a:rPr>
-              <a:t> resistors and other components</a:t>
-            </a:r>
-            <a:endParaRPr lang="en-US" dirty="0"/>
+            <a:pPr lvl="2"/>
+            <a:r>
+              <a:rPr lang="en-US" dirty="0"/>
+              <a:t>Health and wellness applications</a:t>
+            </a:r>
+          </a:p>
+          <a:p>
+            <a:pPr lvl="2"/>
+            <a:r>
+              <a:rPr lang="en-US" dirty="0"/>
+              <a:t>Educational purpose</a:t>
+            </a:r>
+          </a:p>
+          <a:p>
+            <a:pPr lvl="2"/>
+            <a:r>
+              <a:rPr lang="en-US" dirty="0"/>
+              <a:t>Devices ”intended to be used for research applications only”/ “not designed or intended to be used for diagnosis or treatment of disease”</a:t>
+            </a:r>
+          </a:p>
+          <a:p>
+            <a:pPr lvl="2"/>
+            <a:r>
+              <a:rPr lang="en-US" dirty="0"/>
+              <a:t>Machines (EU: Machinery Directive 2006/42/EC), radio equipment (EU: Directive 2014/53/EU)</a:t>
+            </a:r>
           </a:p>
         </p:txBody>
       </p:sp>
@@ -4115,7 +4112,7 @@
     </p:spTree>
     <p:extLst>
       <p:ext uri="{BB962C8B-B14F-4D97-AF65-F5344CB8AC3E}">
-        <p14:creationId xmlns:p14="http://schemas.microsoft.com/office/powerpoint/2010/main" val="27161405"/>
+        <p14:creationId xmlns:p14="http://schemas.microsoft.com/office/powerpoint/2010/main" val="487582228"/>
       </p:ext>
     </p:extLst>
   </p:cSld>
@@ -4144,6 +4141,108 @@
       </p:grpSpPr>
       <p:sp>
         <p:nvSpPr>
+          <p:cNvPr id="3" name="Content Placeholder 2"/>
+          <p:cNvSpPr>
+            <a:spLocks noGrp="1"/>
+          </p:cNvSpPr>
+          <p:nvPr>
+            <p:ph idx="1"/>
+          </p:nvPr>
+        </p:nvSpPr>
+        <p:spPr/>
+        <p:txBody>
+          <a:bodyPr>
+            <a:normAutofit fontScale="92500" lnSpcReduction="20000"/>
+          </a:bodyPr>
+          <a:lstStyle/>
+          <a:p>
+            <a:r>
+              <a:rPr lang="en-US" dirty="0"/>
+              <a:t>Non-medical devices:</a:t>
+            </a:r>
+            <a:br>
+              <a:rPr lang="en-US" dirty="0"/>
+            </a:br>
+            <a:r>
+              <a:rPr lang="en-US" dirty="0"/>
+              <a:t>Example for health and wellness application</a:t>
+            </a:r>
+          </a:p>
+          <a:p>
+            <a:pPr lvl="1"/>
+            <a:r>
+              <a:rPr lang="en-US" dirty="0"/>
+              <a:t>Huawei Scale 3 Pro</a:t>
+            </a:r>
+            <a:br>
+              <a:rPr lang="en-US" dirty="0"/>
+            </a:br>
+            <a:r>
+              <a:rPr lang="en-US" dirty="0"/>
+              <a:t>“Compliance with the essential requirements and other relevant provisions of Directive 2014/53/EU (radio equipment directive, RAD).”</a:t>
+            </a:r>
+          </a:p>
+          <a:p>
+            <a:pPr lvl="2"/>
+            <a:r>
+              <a:rPr lang="en-US" dirty="0"/>
+              <a:t>Intended use:</a:t>
+            </a:r>
+          </a:p>
+          <a:p>
+            <a:pPr lvl="3"/>
+            <a:r>
+              <a:rPr lang="en-US" dirty="0"/>
+              <a:t>Weight measurements, body fat measurements, heart rate measurements, for use with HUAWEI Health App</a:t>
+            </a:r>
+          </a:p>
+          <a:p>
+            <a:pPr lvl="3"/>
+            <a:r>
+              <a:rPr lang="en-US" dirty="0"/>
+              <a:t>This product is not designed to be a medical device, and is not intended to diagnose, treat, cure or prevent any disease. All data and measurements should be used for personal reference only.</a:t>
+            </a:r>
+          </a:p>
+          <a:p>
+            <a:pPr lvl="3"/>
+            <a:r>
+              <a:rPr lang="en-US" dirty="0"/>
+              <a:t>The product is suitable for daily use, especially for people who would like to understand more about their weight, body shape, body fat, and </a:t>
+            </a:r>
+            <a:r>
+              <a:rPr lang="en-US" dirty="0" err="1"/>
+              <a:t>musclemass</a:t>
+            </a:r>
+            <a:r>
+              <a:rPr lang="en-US" dirty="0"/>
+              <a:t>. The data it provides is for personal reference only, and is not intended for medical treatment or as a basis for medical diagnosis, and should not be used in clinics or other medical institutions such as hospitals.”</a:t>
+            </a:r>
+          </a:p>
+          <a:p>
+            <a:pPr lvl="1"/>
+            <a:r>
+              <a:rPr lang="en-US" dirty="0"/>
+              <a:t>HUAWEI Health App</a:t>
+            </a:r>
+          </a:p>
+          <a:p>
+            <a:pPr lvl="2"/>
+            <a:r>
+              <a:rPr lang="en-US" dirty="0"/>
+              <a:t>Intended use:</a:t>
+            </a:r>
+          </a:p>
+          <a:p>
+            <a:pPr lvl="3"/>
+            <a:r>
+              <a:rPr lang="en-US" dirty="0"/>
+              <a:t>“The Huawei Health app is designed for fitness and wellness only. It is not intended for the diagnosis or treatment of disease or other health problems, nor for the cure or prevention of disease. Huawei makes no representations or warranties to you in this respect.”</a:t>
+            </a:r>
+          </a:p>
+        </p:txBody>
+      </p:sp>
+      <p:sp>
+        <p:nvSpPr>
           <p:cNvPr id="2" name="Title 1"/>
           <p:cNvSpPr>
             <a:spLocks noGrp="1"/>
@@ -4159,72 +4258,7 @@
           <a:p>
             <a:r>
               <a:rPr lang="en-US" dirty="0"/>
-              <a:t>Intended Purpose</a:t>
-            </a:r>
-          </a:p>
-        </p:txBody>
-      </p:sp>
-      <p:sp>
-        <p:nvSpPr>
-          <p:cNvPr id="3" name="Content Placeholder 2"/>
-          <p:cNvSpPr>
-            <a:spLocks noGrp="1"/>
-          </p:cNvSpPr>
-          <p:nvPr>
-            <p:ph idx="1"/>
-          </p:nvPr>
-        </p:nvSpPr>
-        <p:spPr/>
-        <p:txBody>
-          <a:bodyPr>
-            <a:normAutofit/>
-          </a:bodyPr>
-          <a:lstStyle/>
-          <a:p>
-            <a:r>
-              <a:rPr lang="en-US" dirty="0"/>
-              <a:t>Often synonymously referred to as “intended use”</a:t>
-            </a:r>
-          </a:p>
-          <a:p>
-            <a:r>
-              <a:rPr lang="en-US" dirty="0"/>
-              <a:t>Cornerstone for:</a:t>
-            </a:r>
-          </a:p>
-          <a:p>
-            <a:pPr lvl="1"/>
-            <a:r>
-              <a:rPr lang="en-US" dirty="0"/>
-              <a:t>Classification as a medical device</a:t>
-            </a:r>
-          </a:p>
-          <a:p>
-            <a:pPr lvl="1"/>
-            <a:r>
-              <a:rPr lang="en-US" dirty="0"/>
-              <a:t>Classification of the medical device</a:t>
-            </a:r>
-          </a:p>
-          <a:p>
-            <a:pPr lvl="1"/>
-            <a:r>
-              <a:rPr lang="en-US" dirty="0"/>
-              <a:t>What needs to be proven in the clinical evaluation</a:t>
-            </a:r>
-          </a:p>
-          <a:p>
-            <a:pPr lvl="1"/>
-            <a:r>
-              <a:rPr lang="en-US" dirty="0"/>
-              <a:t>Reimbursement (may require particular wording, also in indications for use)</a:t>
-            </a:r>
-          </a:p>
-          <a:p>
-            <a:pPr lvl="1"/>
-            <a:r>
-              <a:rPr lang="en-US" dirty="0"/>
-              <a:t>Liability</a:t>
+              <a:t>Regulatory Strategy</a:t>
             </a:r>
           </a:p>
         </p:txBody>
@@ -4254,46 +4288,10 @@
           </a:p>
         </p:txBody>
       </p:sp>
-      <p:sp>
-        <p:nvSpPr>
-          <p:cNvPr id="10" name="TextBox 9">
-            <a:extLst>
-              <a:ext uri="{FF2B5EF4-FFF2-40B4-BE49-F238E27FC236}">
-                <a16:creationId xmlns:a16="http://schemas.microsoft.com/office/drawing/2014/main" id="{7EEDC4AE-2441-246C-F406-5936FDB59959}"/>
-              </a:ext>
-            </a:extLst>
-          </p:cNvPr>
-          <p:cNvSpPr txBox="1"/>
-          <p:nvPr/>
-        </p:nvSpPr>
-        <p:spPr>
-          <a:xfrm>
-            <a:off x="3046142" y="4724543"/>
-            <a:ext cx="6099716" cy="923330"/>
-          </a:xfrm>
-          <a:prstGeom prst="rect">
-            <a:avLst/>
-          </a:prstGeom>
-          <a:noFill/>
-        </p:spPr>
-        <p:txBody>
-          <a:bodyPr wrap="square">
-            <a:spAutoFit/>
-          </a:bodyPr>
-          <a:lstStyle/>
-          <a:p>
-            <a:pPr algn="ctr"/>
-            <a:r>
-              <a:rPr lang="en-US" dirty="0"/>
-              <a:t>Note: The MDR also applies for some devices without a medical intended purpose (e.g. cosmetic lenses, aesthetic implants).</a:t>
-            </a:r>
-          </a:p>
-        </p:txBody>
-      </p:sp>
     </p:spTree>
     <p:extLst>
       <p:ext uri="{BB962C8B-B14F-4D97-AF65-F5344CB8AC3E}">
-        <p14:creationId xmlns:p14="http://schemas.microsoft.com/office/powerpoint/2010/main" val="2657151839"/>
+        <p14:creationId xmlns:p14="http://schemas.microsoft.com/office/powerpoint/2010/main" val="664015928"/>
       </p:ext>
     </p:extLst>
   </p:cSld>
@@ -4337,7 +4335,7 @@
           <a:p>
             <a:r>
               <a:rPr lang="en-US" dirty="0"/>
-              <a:t>Intended Purpose</a:t>
+              <a:t>Regulatory Strategy</a:t>
             </a:r>
           </a:p>
         </p:txBody>
@@ -4355,63 +4353,95 @@
         <p:spPr/>
         <p:txBody>
           <a:bodyPr>
-            <a:normAutofit/>
+            <a:normAutofit fontScale="85000" lnSpcReduction="10000"/>
           </a:bodyPr>
           <a:lstStyle/>
           <a:p>
             <a:r>
               <a:rPr lang="en-US" dirty="0"/>
-              <a:t>Claims: what the device does</a:t>
+              <a:t>EU, medical devices with hardware: all active devices need to comply with EMC and EMF (these require tests in official test labs).</a:t>
+            </a:r>
+          </a:p>
+          <a:p>
+            <a:r>
+              <a:rPr lang="en-US" dirty="0"/>
+              <a:t>For any </a:t>
+            </a:r>
+            <a:r>
+              <a:rPr lang="en-US" dirty="0" err="1"/>
+              <a:t>Wifi</a:t>
+            </a:r>
+            <a:r>
+              <a:rPr lang="en-US" dirty="0"/>
+              <a:t> device that is put on the market, compliance with the Radio Equipment Directive (RED) needs to be demonstrated.</a:t>
             </a:r>
           </a:p>
           <a:p>
             <a:pPr lvl="1"/>
             <a:r>
-              <a:rPr lang="en-US" dirty="0"/>
-              <a:t>performance claims</a:t>
-            </a:r>
+              <a:rPr lang="en-US" dirty="0">
+                <a:effectLst/>
+              </a:rPr>
+              <a:t>Even if radio modules are installed that already comply with RED, the RED conformity must be demonstrated again for the entire device in most cases. You can avoid certain tests, but the radio module must be appropriately installed and exemptions must be substantiated by a risk analysis.</a:t>
+            </a:r>
+            <a:endParaRPr lang="en-US" dirty="0"/>
           </a:p>
           <a:p>
             <a:pPr lvl="1"/>
             <a:r>
               <a:rPr lang="en-US" dirty="0"/>
-              <a:t>benefit claims</a:t>
+              <a:t>Interesting note: Ho</a:t>
+            </a:r>
+            <a:r>
+              <a:rPr lang="en-US" dirty="0">
+                <a:effectLst/>
+              </a:rPr>
+              <a:t>w does the RPI get CE marking, even though it has an open PCB board? Answer is: it meets the standards, e.g. EMC, and uses a particular clause, where the user manual specifically needs to indicate a requirement for protective measures.</a:t>
+            </a:r>
+            <a:br>
+              <a:rPr lang="en-US" dirty="0">
+                <a:effectLst/>
+              </a:rPr>
+            </a:br>
+            <a:r>
+              <a:rPr lang="en-US" dirty="0">
+                <a:effectLst/>
+                <a:hlinkClick r:id="rId2" tooltip="https://electronics.stackexchange.com/questions/544125/how-does-a-bare-pcb-product-such-as-a-raspberry-pi-pass-esd-testing-for-ce-mark"/>
+              </a:rPr>
+              <a:t>https://electronics.stackexchange.com/questions/544125/how-does-a-bare-pcb-product-such-as-a-raspberry-pi-pass-esd-testing-for-ce-mark</a:t>
+            </a:r>
+            <a:endParaRPr lang="en-US" dirty="0">
+              <a:effectLst/>
+            </a:endParaRPr>
+          </a:p>
+          <a:p>
+            <a:r>
+              <a:rPr lang="en-US" dirty="0"/>
+              <a:t>EU: Is CE-Marking even needed?</a:t>
             </a:r>
           </a:p>
           <a:p>
             <a:pPr lvl="1"/>
             <a:r>
-              <a:rPr lang="en-US" dirty="0"/>
-              <a:t>non-clinical claims, list for clarity: other technical claims not to be evaluated in the CER, but can be claimed in the labeling and marketing</a:t>
+              <a:rPr lang="en-US" dirty="0">
+                <a:effectLst/>
+              </a:rPr>
+              <a:t>CE marking is only obligatory for products for which EU specifications exist and require the affixing of CE marking.</a:t>
             </a:r>
           </a:p>
           <a:p>
             <a:pPr lvl="1"/>
             <a:r>
               <a:rPr lang="en-US" dirty="0"/>
-              <a:t>Disclaimers</a:t>
-            </a:r>
-          </a:p>
-          <a:p>
-            <a:pPr lvl="1"/>
-            <a:r>
-              <a:rPr lang="en-US" dirty="0"/>
-              <a:t>risks and side-effects</a:t>
-            </a:r>
-          </a:p>
-          <a:p>
-            <a:r>
-              <a:rPr lang="en-US" dirty="0"/>
-              <a:t>Intended patient population</a:t>
-            </a:r>
-          </a:p>
-          <a:p>
-            <a:pPr lvl="1"/>
-            <a:r>
-              <a:rPr lang="en-US" dirty="0"/>
-              <a:t>demographics (not diseases): age, weight, gender, ethnicity (e.g. AI trained on skin type), nationality, ..</a:t>
-            </a:r>
-            <a:endParaRPr lang="en-US" sz="1200" dirty="0"/>
+              <a:t>Not applicable for</a:t>
+            </a:r>
+            <a:r>
+              <a:rPr lang="en-US" dirty="0">
+                <a:effectLst/>
+              </a:rPr>
+              <a:t> resistors and other components</a:t>
+            </a:r>
+            <a:endParaRPr lang="en-US" dirty="0"/>
           </a:p>
         </p:txBody>
       </p:sp>
@@ -4443,7 +4473,7 @@
     </p:spTree>
     <p:extLst>
       <p:ext uri="{BB962C8B-B14F-4D97-AF65-F5344CB8AC3E}">
-        <p14:creationId xmlns:p14="http://schemas.microsoft.com/office/powerpoint/2010/main" val="3916010154"/>
+        <p14:creationId xmlns:p14="http://schemas.microsoft.com/office/powerpoint/2010/main" val="27161405"/>
       </p:ext>
     </p:extLst>
   </p:cSld>
@@ -4511,49 +4541,48 @@
           <a:p>
             <a:r>
               <a:rPr lang="en-US" dirty="0"/>
-              <a:t>Strategy:</a:t>
+              <a:t>Often synonymously referred to as “intended use”</a:t>
+            </a:r>
+          </a:p>
+          <a:p>
+            <a:r>
+              <a:rPr lang="en-US" dirty="0"/>
+              <a:t>Cornerstone for:</a:t>
             </a:r>
           </a:p>
           <a:p>
             <a:pPr lvl="1"/>
             <a:r>
               <a:rPr lang="en-US" dirty="0"/>
-              <a:t>FDA submissions</a:t>
-            </a:r>
-          </a:p>
-          <a:p>
-            <a:pPr lvl="2"/>
-            <a:r>
-              <a:rPr lang="en-US" dirty="0"/>
-              <a:t>“Me-too strategy”: follow the intended purpose of a previously cleared predicate device, even up to the point of copying its 510(k) submission. This is the easiest, least risky and most effective path to get to the market.</a:t>
-            </a:r>
-            <a:br>
-              <a:rPr lang="en-US" dirty="0"/>
-            </a:br>
-            <a:r>
-              <a:rPr lang="en-US" dirty="0"/>
-              <a:t>(best practice: browse FDA database for predicates in same product category)</a:t>
-            </a:r>
-          </a:p>
-          <a:p>
-            <a:pPr lvl="2"/>
-            <a:r>
-              <a:rPr lang="en-US" dirty="0"/>
-              <a:t>“Me-too +”: while generating revenue with the first, submit a second, high-risk submission with claims for an innovative device</a:t>
-            </a:r>
-          </a:p>
-          <a:p>
-            <a:pPr lvl="2"/>
-            <a:r>
-              <a:rPr lang="en-US" dirty="0"/>
-              <a:t>Classification as a medical device:</a:t>
-            </a:r>
-          </a:p>
-          <a:p>
-            <a:pPr lvl="3"/>
-            <a:r>
-              <a:rPr lang="en-US" dirty="0"/>
-              <a:t>Note that exemptions apply for certain devices (e.g. Non-Device clinical decision support, see CDS)</a:t>
+              <a:t>Classification as a medical device</a:t>
+            </a:r>
+          </a:p>
+          <a:p>
+            <a:pPr lvl="1"/>
+            <a:r>
+              <a:rPr lang="en-US" dirty="0"/>
+              <a:t>Classification of the medical device</a:t>
+            </a:r>
+          </a:p>
+          <a:p>
+            <a:pPr lvl="1"/>
+            <a:r>
+              <a:rPr lang="en-US" dirty="0"/>
+              <a:t>What needs to be proven in the clinical evaluation</a:t>
+            </a:r>
+          </a:p>
+          <a:p>
+            <a:pPr lvl="1"/>
+            <a:r>
+              <a:rPr lang="en-US" dirty="0"/>
+              <a:t>Reimbursement (may require particular wording, also in indications for use)</a:t>
+            </a:r>
+          </a:p>
+          <a:p>
+            <a:pPr lvl="1"/>
+            <a:r>
+              <a:rPr lang="en-US" dirty="0"/>
+              <a:t>Liability</a:t>
             </a:r>
           </a:p>
         </p:txBody>
@@ -4583,10 +4612,46 @@
           </a:p>
         </p:txBody>
       </p:sp>
+      <p:sp>
+        <p:nvSpPr>
+          <p:cNvPr id="10" name="TextBox 9">
+            <a:extLst>
+              <a:ext uri="{FF2B5EF4-FFF2-40B4-BE49-F238E27FC236}">
+                <a16:creationId xmlns:a16="http://schemas.microsoft.com/office/drawing/2014/main" id="{7EEDC4AE-2441-246C-F406-5936FDB59959}"/>
+              </a:ext>
+            </a:extLst>
+          </p:cNvPr>
+          <p:cNvSpPr txBox="1"/>
+          <p:nvPr/>
+        </p:nvSpPr>
+        <p:spPr>
+          <a:xfrm>
+            <a:off x="3046142" y="4724543"/>
+            <a:ext cx="6099716" cy="923330"/>
+          </a:xfrm>
+          <a:prstGeom prst="rect">
+            <a:avLst/>
+          </a:prstGeom>
+          <a:noFill/>
+        </p:spPr>
+        <p:txBody>
+          <a:bodyPr wrap="square">
+            <a:spAutoFit/>
+          </a:bodyPr>
+          <a:lstStyle/>
+          <a:p>
+            <a:pPr algn="ctr"/>
+            <a:r>
+              <a:rPr lang="en-US" dirty="0"/>
+              <a:t>Note: The MDR also applies for some devices without a medical intended purpose (e.g. cosmetic lenses, aesthetic implants).</a:t>
+            </a:r>
+          </a:p>
+        </p:txBody>
+      </p:sp>
     </p:spTree>
     <p:extLst>
       <p:ext uri="{BB962C8B-B14F-4D97-AF65-F5344CB8AC3E}">
-        <p14:creationId xmlns:p14="http://schemas.microsoft.com/office/powerpoint/2010/main" val="1989624546"/>
+        <p14:creationId xmlns:p14="http://schemas.microsoft.com/office/powerpoint/2010/main" val="2657151839"/>
       </p:ext>
     </p:extLst>
   </p:cSld>
@@ -4648,84 +4713,63 @@
         <p:spPr/>
         <p:txBody>
           <a:bodyPr>
-            <a:normAutofit fontScale="92500" lnSpcReduction="20000"/>
+            <a:normAutofit/>
           </a:bodyPr>
           <a:lstStyle/>
           <a:p>
             <a:r>
               <a:rPr lang="en-US" dirty="0"/>
-              <a:t>General vs. narrow intended purpose:</a:t>
+              <a:t>Claims: what the device does</a:t>
             </a:r>
           </a:p>
           <a:p>
             <a:pPr lvl="1"/>
             <a:r>
               <a:rPr lang="en-US" dirty="0"/>
-              <a:t>Europe:</a:t>
-            </a:r>
-          </a:p>
-          <a:p>
-            <a:pPr lvl="2"/>
-            <a:r>
-              <a:rPr lang="en-US" dirty="0"/>
-              <a:t>Innovative devices should ideally/ theoretically claim a narrow scope, then extend it gradually through additional studies when the first device is already on the market.</a:t>
-            </a:r>
-          </a:p>
-          <a:p>
-            <a:pPr lvl="2"/>
-            <a:r>
-              <a:rPr lang="en-US" dirty="0"/>
-              <a:t>Being specific may significantly reduce the required efforts, e.g. for:</a:t>
-            </a:r>
-          </a:p>
-          <a:p>
-            <a:pPr lvl="3"/>
-            <a:r>
-              <a:rPr lang="en-US" dirty="0"/>
-              <a:t>Clinical evaluation: indication, patient population</a:t>
-            </a:r>
-          </a:p>
-          <a:p>
-            <a:pPr lvl="3"/>
-            <a:r>
-              <a:rPr lang="en-US" dirty="0"/>
-              <a:t>Design and validation: patient population</a:t>
-            </a:r>
-          </a:p>
-          <a:p>
-            <a:pPr lvl="3"/>
-            <a:r>
-              <a:rPr lang="en-US" dirty="0"/>
-              <a:t>Usability validation: user groups (number of groups, homogeneous?, trained?)</a:t>
+              <a:t>performance claims</a:t>
             </a:r>
           </a:p>
           <a:p>
             <a:pPr lvl="1"/>
             <a:r>
               <a:rPr lang="en-US" dirty="0"/>
-              <a:t>FDA</a:t>
-            </a:r>
-          </a:p>
-          <a:p>
-            <a:pPr lvl="2"/>
-            <a:r>
-              <a:rPr lang="en-US" dirty="0"/>
-              <a:t>The “me-too strategy” often leads to a general intended purpose</a:t>
-            </a:r>
-          </a:p>
-          <a:p>
-            <a:pPr lvl="2"/>
-            <a:r>
-              <a:rPr lang="en-US" dirty="0"/>
-              <a:t>The FDA’s guidance document “General/Specific Intended Use - Guidance for Industry” provides indications to “determine whether the addition of a specific indication for use to a medical device cleared for marketing with a general indication for use could trigger the need for a PMA” or a Class III designation [FDA-2020-D-0957].</a:t>
-            </a:r>
-          </a:p>
-          <a:p>
-            <a:pPr lvl="2"/>
-            <a:r>
-              <a:rPr lang="en-US" dirty="0"/>
-              <a:t>Herein, substantial equivalence or non-equivalence is determined in part by general/specific uses. E.g., adding a more specific intended purpose with “treatment character” (e.g. knife for eye surgery or lithotripter) to a general intended use with a “tool” character (scalpel, typically Class I) may lead to a Class III designation.</a:t>
-            </a:r>
+              <a:t>benefit claims</a:t>
+            </a:r>
+          </a:p>
+          <a:p>
+            <a:pPr lvl="1"/>
+            <a:r>
+              <a:rPr lang="en-US" dirty="0"/>
+              <a:t>non-clinical claims, list for clarity: other technical claims not to be evaluated in the CER, but can be claimed in the labeling and marketing</a:t>
+            </a:r>
+          </a:p>
+          <a:p>
+            <a:pPr lvl="1"/>
+            <a:r>
+              <a:rPr lang="en-US" dirty="0"/>
+              <a:t>Disclaimers</a:t>
+            </a:r>
+          </a:p>
+          <a:p>
+            <a:pPr lvl="1"/>
+            <a:r>
+              <a:rPr lang="en-US" dirty="0"/>
+              <a:t>risks and side-effects</a:t>
+            </a:r>
+          </a:p>
+          <a:p>
+            <a:r>
+              <a:rPr lang="en-US" dirty="0"/>
+              <a:t>Intended patient population</a:t>
+            </a:r>
+          </a:p>
+          <a:p>
+            <a:pPr lvl="1"/>
+            <a:r>
+              <a:rPr lang="en-US" dirty="0"/>
+              <a:t>demographics (not diseases): age, weight, gender, ethnicity (e.g. AI trained on skin type), nationality, ..</a:t>
+            </a:r>
+            <a:endParaRPr lang="en-US" sz="1200" dirty="0"/>
           </a:p>
         </p:txBody>
       </p:sp>
@@ -4757,7 +4801,7 @@
     </p:spTree>
     <p:extLst>
       <p:ext uri="{BB962C8B-B14F-4D97-AF65-F5344CB8AC3E}">
-        <p14:creationId xmlns:p14="http://schemas.microsoft.com/office/powerpoint/2010/main" val="3064633188"/>
+        <p14:creationId xmlns:p14="http://schemas.microsoft.com/office/powerpoint/2010/main" val="3916010154"/>
       </p:ext>
     </p:extLst>
   </p:cSld>
@@ -4801,7 +4845,7 @@
           <a:p>
             <a:r>
               <a:rPr lang="en-US" dirty="0"/>
-              <a:t>Requirements</a:t>
+              <a:t>Intended Purpose</a:t>
             </a:r>
           </a:p>
         </p:txBody>
@@ -4825,19 +4869,49 @@
           <a:p>
             <a:r>
               <a:rPr lang="en-US" dirty="0"/>
-              <a:t>must</a:t>
-            </a:r>
-          </a:p>
-          <a:p>
-            <a:r>
-              <a:rPr lang="en-US" dirty="0"/>
-              <a:t>shall</a:t>
-            </a:r>
-          </a:p>
-          <a:p>
-            <a:r>
-              <a:rPr lang="en-US" dirty="0"/>
-              <a:t>should</a:t>
+              <a:t>Strategy:</a:t>
+            </a:r>
+          </a:p>
+          <a:p>
+            <a:pPr lvl="1"/>
+            <a:r>
+              <a:rPr lang="en-US" dirty="0"/>
+              <a:t>FDA submissions</a:t>
+            </a:r>
+          </a:p>
+          <a:p>
+            <a:pPr lvl="2"/>
+            <a:r>
+              <a:rPr lang="en-US" dirty="0"/>
+              <a:t>“Me-too strategy”: follow the intended purpose of a previously cleared predicate device, even up to the point of copying its 510(k) submission. This is the easiest, least risky and most effective path to get to the market.</a:t>
+            </a:r>
+            <a:br>
+              <a:rPr lang="en-US" dirty="0"/>
+            </a:br>
+            <a:r>
+              <a:rPr lang="en-US" dirty="0"/>
+              <a:t>(best practice: browse FDA database for predicates in same product category)</a:t>
+            </a:r>
+          </a:p>
+          <a:p>
+            <a:pPr lvl="2"/>
+            <a:r>
+              <a:rPr lang="en-US" dirty="0"/>
+              <a:t>“Me-too +”: while generating revenue with the first, submit a second, high-risk submission with claims for an innovative device</a:t>
+            </a:r>
+          </a:p>
+          <a:p>
+            <a:pPr lvl="2"/>
+            <a:r>
+              <a:rPr lang="en-US" dirty="0"/>
+              <a:t>Classification as a medical device:</a:t>
+            </a:r>
+          </a:p>
+          <a:p>
+            <a:pPr lvl="3"/>
+            <a:r>
+              <a:rPr lang="en-US" dirty="0"/>
+              <a:t>Note that exemptions apply for certain devices (e.g. Non-Device clinical decision support, see CDS)</a:t>
             </a:r>
           </a:p>
         </p:txBody>
@@ -4870,7 +4944,7 @@
     </p:spTree>
     <p:extLst>
       <p:ext uri="{BB962C8B-B14F-4D97-AF65-F5344CB8AC3E}">
-        <p14:creationId xmlns:p14="http://schemas.microsoft.com/office/powerpoint/2010/main" val="3099098781"/>
+        <p14:creationId xmlns:p14="http://schemas.microsoft.com/office/powerpoint/2010/main" val="1989624546"/>
       </p:ext>
     </p:extLst>
   </p:cSld>
@@ -4914,7 +4988,7 @@
           <a:p>
             <a:r>
               <a:rPr lang="en-US" dirty="0"/>
-              <a:t>System Design Concepts Full-Stack Web</a:t>
+              <a:t>Intended Purpose</a:t>
             </a:r>
           </a:p>
         </p:txBody>
@@ -4929,179 +5003,86 @@
             <p:ph idx="1"/>
           </p:nvPr>
         </p:nvSpPr>
-        <p:spPr>
-          <a:xfrm>
-            <a:off x="838200" y="1825625"/>
-            <a:ext cx="10515600" cy="4071700"/>
-          </a:xfrm>
-        </p:spPr>
+        <p:spPr/>
         <p:txBody>
           <a:bodyPr>
-            <a:normAutofit fontScale="55000" lnSpcReduction="20000"/>
+            <a:normAutofit fontScale="92500" lnSpcReduction="20000"/>
           </a:bodyPr>
           <a:lstStyle/>
           <a:p>
             <a:r>
               <a:rPr lang="en-US" dirty="0"/>
-              <a:t>Full-stack web programming includes:</a:t>
+              <a:t>General vs. narrow intended purpose:</a:t>
             </a:r>
           </a:p>
           <a:p>
             <a:pPr lvl="1"/>
             <a:r>
               <a:rPr lang="en-US" dirty="0"/>
-              <a:t>front-end: client software (e.g. JavaScript, jQuery, Angular, Vue)</a:t>
+              <a:t>Europe:</a:t>
+            </a:r>
+          </a:p>
+          <a:p>
+            <a:pPr lvl="2"/>
+            <a:r>
+              <a:rPr lang="en-US" dirty="0"/>
+              <a:t>Innovative devices should ideally/ theoretically claim a narrow scope, then extend it gradually through additional studies when the first device is already on the market.</a:t>
+            </a:r>
+          </a:p>
+          <a:p>
+            <a:pPr lvl="2"/>
+            <a:r>
+              <a:rPr lang="en-US" dirty="0"/>
+              <a:t>Being specific may significantly reduce the required efforts, e.g. for:</a:t>
+            </a:r>
+          </a:p>
+          <a:p>
+            <a:pPr lvl="3"/>
+            <a:r>
+              <a:rPr lang="en-US" dirty="0"/>
+              <a:t>Clinical evaluation: indication, patient population</a:t>
+            </a:r>
+          </a:p>
+          <a:p>
+            <a:pPr lvl="3"/>
+            <a:r>
+              <a:rPr lang="en-US" dirty="0"/>
+              <a:t>Design and validation: patient population</a:t>
+            </a:r>
+          </a:p>
+          <a:p>
+            <a:pPr lvl="3"/>
+            <a:r>
+              <a:rPr lang="en-US" dirty="0"/>
+              <a:t>Usability validation: user groups (number of groups, homogeneous?, trained?)</a:t>
             </a:r>
           </a:p>
           <a:p>
             <a:pPr lvl="1"/>
             <a:r>
               <a:rPr lang="en-US" dirty="0"/>
-              <a:t>back-end: server software (e.g. PHP, ASP, Python, Node) including databases (e.g. SQL, SQLite, MongoDB)</a:t>
-            </a:r>
-          </a:p>
-          <a:p>
-            <a:r>
-              <a:rPr lang="en-US" dirty="0"/>
-              <a:t>Standard design concepts:</a:t>
-            </a:r>
-          </a:p>
-          <a:p>
-            <a:pPr lvl="1"/>
-            <a:r>
-              <a:rPr lang="en-US" dirty="0"/>
-              <a:t>web server:</a:t>
+              <a:t>FDA</a:t>
             </a:r>
           </a:p>
           <a:p>
             <a:pPr lvl="2"/>
             <a:r>
               <a:rPr lang="en-US" dirty="0"/>
-              <a:t>Load balancing: distribute traffic to multiple servers, e.g. DNS load balancing (resolve website to multiple IP addresses)</a:t>
-            </a:r>
-          </a:p>
-          <a:p>
-            <a:pPr lvl="1"/>
-            <a:r>
-              <a:rPr lang="en-US" dirty="0"/>
-              <a:t>static assets servers (images/videos)</a:t>
+              <a:t>The “me-too strategy” often leads to a general intended purpose</a:t>
             </a:r>
           </a:p>
           <a:p>
             <a:pPr lvl="2"/>
             <a:r>
               <a:rPr lang="en-US" dirty="0"/>
-              <a:t>content delivery networks: global network of caching servers makes accessing content quick, e.g. pool technique: first user fetches the file, then it remains in cache.</a:t>
+              <a:t>The FDA’s guidance document “General/Specific Intended Use - Guidance for Industry” provides indications to “determine whether the addition of a specific indication for use to a medical device cleared for marketing with a general indication for use could trigger the need for a PMA” or a Class III designation [FDA-2020-D-0957].</a:t>
             </a:r>
           </a:p>
           <a:p>
             <a:pPr lvl="2"/>
             <a:r>
               <a:rPr lang="en-US" dirty="0"/>
-              <a:t>Distributed file systems (e.g. for users to upload images), e.g. Amazon S3</a:t>
-            </a:r>
-          </a:p>
-          <a:p>
-            <a:pPr lvl="1"/>
-            <a:r>
-              <a:rPr lang="en-US" dirty="0"/>
-              <a:t>database server:</a:t>
-            </a:r>
-          </a:p>
-          <a:p>
-            <a:pPr lvl="2"/>
-            <a:r>
-              <a:rPr lang="en-US" dirty="0"/>
-              <a:t>Use caching services: place popular data in caching layer instead of slow disk (e.g. NYT website). </a:t>
-            </a:r>
-          </a:p>
-          <a:p>
-            <a:pPr lvl="2"/>
-            <a:r>
-              <a:rPr lang="en-US" dirty="0" err="1"/>
-              <a:t>Indicing</a:t>
-            </a:r>
-            <a:r>
-              <a:rPr lang="en-US" dirty="0"/>
-              <a:t> using database schema design: the index points to the data record; use composite indices (an index table, e.g. sorted by longitude, latitude, last active) to make queries fast</a:t>
-            </a:r>
-          </a:p>
-          <a:p>
-            <a:pPr lvl="2"/>
-            <a:r>
-              <a:rPr lang="en-US" dirty="0"/>
-              <a:t>Slave-master replication: only master used to write to, slave databases replicate master for read-only (with a delay). To avoid delay for high priority request, read from master or a cache that is always up-to-date.</a:t>
-            </a:r>
-          </a:p>
-          <a:p>
-            <a:pPr lvl="2"/>
-            <a:r>
-              <a:rPr lang="en-US" dirty="0"/>
-              <a:t>Database </a:t>
-            </a:r>
-            <a:r>
-              <a:rPr lang="en-US" dirty="0" err="1"/>
-              <a:t>sharding</a:t>
-            </a:r>
-            <a:r>
-              <a:rPr lang="en-US" dirty="0"/>
-              <a:t>: split database into master databases on multiple servers.</a:t>
-            </a:r>
-          </a:p>
-          <a:p>
-            <a:pPr lvl="3"/>
-            <a:r>
-              <a:rPr lang="en-US" dirty="0"/>
-              <a:t>Allows lots of users write to the database simultaneously (e.g. Twitter)</a:t>
-            </a:r>
-          </a:p>
-          <a:p>
-            <a:pPr lvl="3"/>
-            <a:r>
-              <a:rPr lang="en-US" dirty="0" err="1"/>
-              <a:t>Verticle</a:t>
-            </a:r>
-            <a:r>
-              <a:rPr lang="en-US" dirty="0"/>
-              <a:t>: split into databases with different information (users, tweets, comments)</a:t>
-            </a:r>
-          </a:p>
-          <a:p>
-            <a:pPr lvl="3"/>
-            <a:r>
-              <a:rPr lang="en-US" dirty="0"/>
-              <a:t>Horizontal: split same content (e.g. tweets) over multiple machines, method: e.g. </a:t>
-            </a:r>
-            <a:r>
-              <a:rPr lang="en-US" dirty="0" err="1"/>
-              <a:t>userID</a:t>
-            </a:r>
-            <a:r>
-              <a:rPr lang="en-US" dirty="0"/>
-              <a:t> MOD N =&gt; server</a:t>
-            </a:r>
-          </a:p>
-          <a:p>
-            <a:pPr lvl="2"/>
-            <a:r>
-              <a:rPr lang="en-US" dirty="0"/>
-              <a:t>NoSQL databases: not relational (not tables), scale automatically across multiples machines (e.g. MongoDB, Firebase).</a:t>
-            </a:r>
-          </a:p>
-          <a:p>
-            <a:pPr lvl="1"/>
-            <a:r>
-              <a:rPr lang="en-US" dirty="0"/>
-              <a:t>API design (client-server communication): consider transport mechanism (e.g. JSON or protocol buffers), security requirements, support of offline usage</a:t>
-            </a:r>
-          </a:p>
-          <a:p>
-            <a:pPr marL="457200" lvl="1" indent="0">
-              <a:buNone/>
-            </a:pPr>
-            <a:r>
-              <a:rPr lang="en-US" dirty="0"/>
-              <a:t>General remark: Simplicity comes before optimization! No two applications scale the same way. Load and usage scenarios are important.</a:t>
+              <a:t>Herein, substantial equivalence or non-equivalence is determined in part by general/specific uses. E.g., adding a more specific intended purpose with “treatment character” (e.g. knife for eye surgery or lithotripter) to a general intended use with a “tool” character (scalpel, typically Class I) may lead to a Class III designation.</a:t>
             </a:r>
           </a:p>
         </p:txBody>
@@ -5131,45 +5112,10 @@
           </a:p>
         </p:txBody>
       </p:sp>
-      <p:sp>
-        <p:nvSpPr>
-          <p:cNvPr id="6" name="TextBox 5">
-            <a:extLst>
-              <a:ext uri="{FF2B5EF4-FFF2-40B4-BE49-F238E27FC236}">
-                <a16:creationId xmlns:a16="http://schemas.microsoft.com/office/drawing/2014/main" id="{C7C555AA-6A66-253C-E0D7-89387CBF4661}"/>
-              </a:ext>
-            </a:extLst>
-          </p:cNvPr>
-          <p:cNvSpPr txBox="1"/>
-          <p:nvPr/>
-        </p:nvSpPr>
-        <p:spPr>
-          <a:xfrm>
-            <a:off x="830029" y="5897325"/>
-            <a:ext cx="10354644" cy="338554"/>
-          </a:xfrm>
-          <a:prstGeom prst="rect">
-            <a:avLst/>
-          </a:prstGeom>
-          <a:noFill/>
-        </p:spPr>
-        <p:txBody>
-          <a:bodyPr wrap="square">
-            <a:spAutoFit/>
-          </a:bodyPr>
-          <a:lstStyle/>
-          <a:p>
-            <a:r>
-              <a:rPr lang="en-US" sz="1600" dirty="0"/>
-              <a:t>[TechLead, 2020: Systems Design Interview concepts (for software engineers / full-stack web)]</a:t>
-            </a:r>
-          </a:p>
-        </p:txBody>
-      </p:sp>
     </p:spTree>
     <p:extLst>
       <p:ext uri="{BB962C8B-B14F-4D97-AF65-F5344CB8AC3E}">
-        <p14:creationId xmlns:p14="http://schemas.microsoft.com/office/powerpoint/2010/main" val="1408404674"/>
+        <p14:creationId xmlns:p14="http://schemas.microsoft.com/office/powerpoint/2010/main" val="3064633188"/>
       </p:ext>
     </p:extLst>
   </p:cSld>
@@ -5213,7 +5159,7 @@
           <a:p>
             <a:r>
               <a:rPr lang="en-US" dirty="0"/>
-              <a:t>Great Programming</a:t>
+              <a:t>Requirements</a:t>
             </a:r>
           </a:p>
         </p:txBody>
@@ -5228,51 +5174,28 @@
             <p:ph idx="1"/>
           </p:nvPr>
         </p:nvSpPr>
-        <p:spPr>
-          <a:xfrm>
-            <a:off x="838200" y="1825625"/>
-            <a:ext cx="10515600" cy="4071700"/>
-          </a:xfrm>
-        </p:spPr>
+        <p:spPr/>
         <p:txBody>
           <a:bodyPr>
-            <a:normAutofit fontScale="92500" lnSpcReduction="20000"/>
+            <a:normAutofit/>
           </a:bodyPr>
           <a:lstStyle/>
           <a:p>
             <a:r>
               <a:rPr lang="en-US" dirty="0"/>
-              <a:t>Great programming can be practiced.</a:t>
-            </a:r>
-          </a:p>
-          <a:p>
-            <a:r>
-              <a:rPr lang="en-US" dirty="0"/>
-              <a:t>The core art is problem decomposition (e.g. using layers of abstraction)</a:t>
-            </a:r>
-          </a:p>
-          <a:p>
-            <a:r>
-              <a:rPr lang="en-US" dirty="0"/>
-              <a:t>Classes should be deep (i.e. simple interface (cost), lots of functionality contained (benefit); shallow classes create unnecessary overhead and complexity).</a:t>
-            </a:r>
-          </a:p>
-          <a:p>
-            <a:r>
-              <a:rPr lang="en-US" dirty="0"/>
-              <a:t>Ideally write classes for a general purpose (simpler and easier to maintain, special-purpose leads to complexity from sharing information through APIs)</a:t>
-            </a:r>
-          </a:p>
-          <a:p>
-            <a:r>
-              <a:rPr lang="en-US" dirty="0"/>
-              <a:t>Ideally write APIs for a general purpose</a:t>
-            </a:r>
-          </a:p>
-          <a:p>
-            <a:r>
-              <a:rPr lang="en-US" dirty="0"/>
-              <a:t>Spend 10% to continue improving your code base (as it will automatically become more complex otherwise); ideally, after a  change, it should be designed/structured as if change had been known from the start</a:t>
+              <a:t>must</a:t>
+            </a:r>
+          </a:p>
+          <a:p>
+            <a:r>
+              <a:rPr lang="en-US" dirty="0"/>
+              <a:t>shall</a:t>
+            </a:r>
+          </a:p>
+          <a:p>
+            <a:r>
+              <a:rPr lang="en-US" dirty="0"/>
+              <a:t>should</a:t>
             </a:r>
           </a:p>
         </p:txBody>
@@ -5302,53 +5225,10 @@
           </a:p>
         </p:txBody>
       </p:sp>
-      <p:sp>
-        <p:nvSpPr>
-          <p:cNvPr id="6" name="TextBox 5">
-            <a:extLst>
-              <a:ext uri="{FF2B5EF4-FFF2-40B4-BE49-F238E27FC236}">
-                <a16:creationId xmlns:a16="http://schemas.microsoft.com/office/drawing/2014/main" id="{C7C555AA-6A66-253C-E0D7-89387CBF4661}"/>
-              </a:ext>
-            </a:extLst>
-          </p:cNvPr>
-          <p:cNvSpPr txBox="1"/>
-          <p:nvPr/>
-        </p:nvSpPr>
-        <p:spPr>
-          <a:xfrm>
-            <a:off x="830029" y="5897325"/>
-            <a:ext cx="10354644" cy="338554"/>
-          </a:xfrm>
-          <a:prstGeom prst="rect">
-            <a:avLst/>
-          </a:prstGeom>
-          <a:noFill/>
-        </p:spPr>
-        <p:txBody>
-          <a:bodyPr wrap="square">
-            <a:spAutoFit/>
-          </a:bodyPr>
-          <a:lstStyle/>
-          <a:p>
-            <a:r>
-              <a:rPr lang="en-US" sz="1600" dirty="0"/>
-              <a:t>[Talk by </a:t>
-            </a:r>
-            <a:r>
-              <a:rPr lang="en-US" sz="1600" dirty="0" err="1"/>
-              <a:t>Ousterhout</a:t>
-            </a:r>
-            <a:r>
-              <a:rPr lang="en-US" sz="1600" dirty="0"/>
-              <a:t>, John related to: A Philosophy of Software Design]</a:t>
-            </a:r>
-          </a:p>
-        </p:txBody>
-      </p:sp>
     </p:spTree>
     <p:extLst>
       <p:ext uri="{BB962C8B-B14F-4D97-AF65-F5344CB8AC3E}">
-        <p14:creationId xmlns:p14="http://schemas.microsoft.com/office/powerpoint/2010/main" val="3004995272"/>
+        <p14:creationId xmlns:p14="http://schemas.microsoft.com/office/powerpoint/2010/main" val="3099098781"/>
       </p:ext>
     </p:extLst>
   </p:cSld>
@@ -5392,7 +5272,7 @@
           <a:p>
             <a:r>
               <a:rPr lang="en-US" dirty="0"/>
-              <a:t>Effective Engineering</a:t>
+              <a:t>System Design Concepts Full-Stack Web</a:t>
             </a:r>
           </a:p>
         </p:txBody>
@@ -5415,100 +5295,172 @@
         </p:spPr>
         <p:txBody>
           <a:bodyPr>
-            <a:normAutofit fontScale="77500" lnSpcReduction="20000"/>
+            <a:normAutofit fontScale="55000" lnSpcReduction="20000"/>
           </a:bodyPr>
           <a:lstStyle/>
           <a:p>
             <a:r>
               <a:rPr lang="en-US" dirty="0"/>
-              <a:t>10x-engineers produce 10x the impact, they do not work 10x the hours. </a:t>
-            </a:r>
-          </a:p>
-          <a:p>
-            <a:r>
-              <a:rPr lang="en-US" dirty="0"/>
-              <a:t>These engineers, per observation:</a:t>
+              <a:t>Full-stack web programming includes:</a:t>
             </a:r>
           </a:p>
           <a:p>
             <a:pPr lvl="1"/>
             <a:r>
               <a:rPr lang="en-US" dirty="0"/>
-              <a:t>Focus on big levers (work on what has the most impact), e.g. reduce complexity in design, do unit tests where they are most relevant, ..</a:t>
+              <a:t>front-end: client software (e.g. JavaScript, jQuery, Angular, Vue)</a:t>
             </a:r>
           </a:p>
           <a:p>
             <a:pPr lvl="1"/>
             <a:r>
               <a:rPr lang="en-US" dirty="0"/>
-              <a:t>Optimize for learning (use opportunities to learn, educate themselves, do side projects, ..)</a:t>
+              <a:t>back-end: server software (e.g. PHP, ASP, Python, Node) including databases (e.g. SQL, SQLite, MongoDB)</a:t>
+            </a:r>
+          </a:p>
+          <a:p>
+            <a:r>
+              <a:rPr lang="en-US" dirty="0"/>
+              <a:t>Standard design concepts:</a:t>
             </a:r>
           </a:p>
           <a:p>
             <a:pPr lvl="1"/>
             <a:r>
               <a:rPr lang="en-US" dirty="0"/>
-              <a:t>Invest in iteration speed (learn and provide tooling, create tools when you need to do something twice, fasten build processes, [learn to focus and complete things in time] ..)</a:t>
+              <a:t>web server:</a:t>
+            </a:r>
+          </a:p>
+          <a:p>
+            <a:pPr lvl="2"/>
+            <a:r>
+              <a:rPr lang="en-US" dirty="0"/>
+              <a:t>Load balancing: distribute traffic to multiple servers, e.g. DNS load balancing (resolve website to multiple IP addresses)</a:t>
             </a:r>
           </a:p>
           <a:p>
             <a:pPr lvl="1"/>
             <a:r>
               <a:rPr lang="en-US" dirty="0"/>
-              <a:t>Validate your ideas aggressively and iteratively, validate the assumptions that go into your ideas (this is sometimes very simple to do)</a:t>
+              <a:t>static assets servers (images/videos)</a:t>
+            </a:r>
+          </a:p>
+          <a:p>
+            <a:pPr lvl="2"/>
+            <a:r>
+              <a:rPr lang="en-US" dirty="0"/>
+              <a:t>content delivery networks: global network of caching servers makes accessing content quick, e.g. pool technique: first user fetches the file, then it remains in cache.</a:t>
+            </a:r>
+          </a:p>
+          <a:p>
+            <a:pPr lvl="2"/>
+            <a:r>
+              <a:rPr lang="en-US" dirty="0"/>
+              <a:t>Distributed file systems (e.g. for users to upload images), e.g. Amazon S3</a:t>
             </a:r>
           </a:p>
           <a:p>
             <a:pPr lvl="1"/>
             <a:r>
               <a:rPr lang="en-US" dirty="0"/>
-              <a:t>Reduce complexity:</a:t>
+              <a:t>database server:</a:t>
             </a:r>
           </a:p>
           <a:p>
             <a:pPr lvl="2"/>
             <a:r>
               <a:rPr lang="en-US" dirty="0"/>
-              <a:t>Code and system complexity (easier-to-maintain, easier-to-learn for beginners)</a:t>
+              <a:t>Use caching services: place popular data in caching layer instead of slow disk (e.g. NYT website). </a:t>
             </a:r>
           </a:p>
           <a:p>
             <a:pPr lvl="2"/>
             <a:r>
-              <a:rPr lang="en-US" dirty="0"/>
-              <a:t>Product complexity (no clear vision; each feature adds a lot to that)</a:t>
+              <a:rPr lang="en-US" dirty="0" err="1"/>
+              <a:t>Indicing</a:t>
+            </a:r>
+            <a:r>
+              <a:rPr lang="en-US" dirty="0"/>
+              <a:t> using database schema design: the index points to the data record; use composite indices (an index table, e.g. sorted by longitude, latitude, last active) to make queries fast</a:t>
             </a:r>
           </a:p>
           <a:p>
             <a:pPr lvl="2"/>
             <a:r>
               <a:rPr lang="en-US" dirty="0"/>
-              <a:t>Minimize operational burden (at its core, this is a cost of code complexity). With organizational complexity, quality and motivation goes down due to lack of feedback/work in isolation, bus factor goes down.</a:t>
+              <a:t>Slave-master replication: only master used to write to, slave databases replicate master for read-only (with a delay). To avoid delay for high priority request, read from master or a cache that is always up-to-date.</a:t>
+            </a:r>
+          </a:p>
+          <a:p>
+            <a:pPr lvl="2"/>
+            <a:r>
+              <a:rPr lang="en-US" dirty="0"/>
+              <a:t>Database </a:t>
+            </a:r>
+            <a:r>
+              <a:rPr lang="en-US" dirty="0" err="1"/>
+              <a:t>sharding</a:t>
+            </a:r>
+            <a:r>
+              <a:rPr lang="en-US" dirty="0"/>
+              <a:t>: split database into master databases on multiple servers.</a:t>
+            </a:r>
+          </a:p>
+          <a:p>
+            <a:pPr lvl="3"/>
+            <a:r>
+              <a:rPr lang="en-US" dirty="0"/>
+              <a:t>Allows lots of users write to the database simultaneously (e.g. Twitter)</a:t>
+            </a:r>
+          </a:p>
+          <a:p>
+            <a:pPr lvl="3"/>
+            <a:r>
+              <a:rPr lang="en-US" dirty="0" err="1"/>
+              <a:t>Verticle</a:t>
+            </a:r>
+            <a:r>
+              <a:rPr lang="en-US" dirty="0"/>
+              <a:t>: split into databases with different information (users, tweets, comments)</a:t>
+            </a:r>
+          </a:p>
+          <a:p>
+            <a:pPr lvl="3"/>
+            <a:r>
+              <a:rPr lang="en-US" dirty="0"/>
+              <a:t>Horizontal: split same content (e.g. tweets) over multiple machines, method: e.g. </a:t>
+            </a:r>
+            <a:r>
+              <a:rPr lang="en-US" dirty="0" err="1"/>
+              <a:t>userID</a:t>
+            </a:r>
+            <a:r>
+              <a:rPr lang="en-US" dirty="0"/>
+              <a:t> MOD N =&gt; server</a:t>
+            </a:r>
+          </a:p>
+          <a:p>
+            <a:pPr lvl="2"/>
+            <a:r>
+              <a:rPr lang="en-US" dirty="0"/>
+              <a:t>NoSQL databases: not relational (not tables), scale automatically across multiples machines (e.g. MongoDB, Firebase).</a:t>
             </a:r>
           </a:p>
           <a:p>
             <a:pPr lvl="1"/>
             <a:r>
               <a:rPr lang="en-US" dirty="0"/>
-              <a:t>Build a great engineering culture</a:t>
-            </a:r>
-          </a:p>
-          <a:p>
-            <a:pPr lvl="2"/>
-            <a:r>
-              <a:rPr lang="en-US" dirty="0"/>
-              <a:t>Candidates like companies with all of the above.</a:t>
-            </a:r>
-          </a:p>
-          <a:p>
-            <a:pPr lvl="2"/>
-            <a:r>
-              <a:rPr lang="en-US" dirty="0"/>
-              <a:t>Resource conflicts: communicate between teams on their priorities. Align priorities, otherwise, understand them to see if possibly your team has to do some of the low-priority work of others</a:t>
-            </a:r>
-          </a:p>
-          <a:p>
-            <a:endParaRPr lang="en-US" dirty="0"/>
+              <a:t>API design (client-server communication): consider transport mechanism (e.g. JSON or protocol buffers), security requirements, support of offline usage</a:t>
+            </a:r>
+          </a:p>
+          <a:p>
+            <a:pPr marL="457200" lvl="1" indent="0">
+              <a:buNone/>
+            </a:pPr>
+            <a:r>
+              <a:rPr lang="en-US" dirty="0"/>
+              <a:t>General remark: Simplicity comes before optimization! No two applications scale the same way. Load and usage scenarios are important.</a:t>
+            </a:r>
           </a:p>
         </p:txBody>
       </p:sp>
@@ -5567,7 +5519,7 @@
           <a:p>
             <a:r>
               <a:rPr lang="en-US" sz="1600" dirty="0"/>
-              <a:t>[The Effective Engineer, Edmond Lau]</a:t>
+              <a:t>[TechLead, 2020: Systems Design Interview concepts (for software engineers / full-stack web)]</a:t>
             </a:r>
           </a:p>
         </p:txBody>
@@ -5575,7 +5527,186 @@
     </p:spTree>
     <p:extLst>
       <p:ext uri="{BB962C8B-B14F-4D97-AF65-F5344CB8AC3E}">
-        <p14:creationId xmlns:p14="http://schemas.microsoft.com/office/powerpoint/2010/main" val="418245327"/>
+        <p14:creationId xmlns:p14="http://schemas.microsoft.com/office/powerpoint/2010/main" val="1408404674"/>
+      </p:ext>
+    </p:extLst>
+  </p:cSld>
+  <p:clrMapOvr>
+    <a:masterClrMapping/>
+  </p:clrMapOvr>
+</p:sld>
+</file>
+
+<file path=ppt/slides/slide19.xml><?xml version="1.0" encoding="utf-8"?>
+<p:sld xmlns:a="http://schemas.openxmlformats.org/drawingml/2006/main" xmlns:r="http://schemas.openxmlformats.org/officeDocument/2006/relationships" xmlns:p="http://schemas.openxmlformats.org/presentationml/2006/main">
+  <p:cSld>
+    <p:spTree>
+      <p:nvGrpSpPr>
+        <p:cNvPr id="1" name=""/>
+        <p:cNvGrpSpPr/>
+        <p:nvPr/>
+      </p:nvGrpSpPr>
+      <p:grpSpPr>
+        <a:xfrm>
+          <a:off x="0" y="0"/>
+          <a:ext cx="0" cy="0"/>
+          <a:chOff x="0" y="0"/>
+          <a:chExt cx="0" cy="0"/>
+        </a:xfrm>
+      </p:grpSpPr>
+      <p:sp>
+        <p:nvSpPr>
+          <p:cNvPr id="2" name="Title 1"/>
+          <p:cNvSpPr>
+            <a:spLocks noGrp="1"/>
+          </p:cNvSpPr>
+          <p:nvPr>
+            <p:ph type="title"/>
+          </p:nvPr>
+        </p:nvSpPr>
+        <p:spPr/>
+        <p:txBody>
+          <a:bodyPr/>
+          <a:lstStyle/>
+          <a:p>
+            <a:r>
+              <a:rPr lang="en-US" dirty="0"/>
+              <a:t>Great Programming</a:t>
+            </a:r>
+          </a:p>
+        </p:txBody>
+      </p:sp>
+      <p:sp>
+        <p:nvSpPr>
+          <p:cNvPr id="3" name="Content Placeholder 2"/>
+          <p:cNvSpPr>
+            <a:spLocks noGrp="1"/>
+          </p:cNvSpPr>
+          <p:nvPr>
+            <p:ph idx="1"/>
+          </p:nvPr>
+        </p:nvSpPr>
+        <p:spPr>
+          <a:xfrm>
+            <a:off x="838200" y="1825625"/>
+            <a:ext cx="10515600" cy="4071700"/>
+          </a:xfrm>
+        </p:spPr>
+        <p:txBody>
+          <a:bodyPr>
+            <a:normAutofit fontScale="92500" lnSpcReduction="20000"/>
+          </a:bodyPr>
+          <a:lstStyle/>
+          <a:p>
+            <a:r>
+              <a:rPr lang="en-US" dirty="0"/>
+              <a:t>Great programming can be practiced.</a:t>
+            </a:r>
+          </a:p>
+          <a:p>
+            <a:r>
+              <a:rPr lang="en-US" dirty="0"/>
+              <a:t>The core art is problem decomposition (e.g. using layers of abstraction)</a:t>
+            </a:r>
+          </a:p>
+          <a:p>
+            <a:r>
+              <a:rPr lang="en-US" dirty="0"/>
+              <a:t>Classes should be deep (i.e. simple interface (cost), lots of functionality contained (benefit); shallow classes create unnecessary overhead and complexity).</a:t>
+            </a:r>
+          </a:p>
+          <a:p>
+            <a:r>
+              <a:rPr lang="en-US" dirty="0"/>
+              <a:t>Ideally write classes for a general purpose (simpler and easier to maintain, special-purpose leads to complexity from sharing information through APIs)</a:t>
+            </a:r>
+          </a:p>
+          <a:p>
+            <a:r>
+              <a:rPr lang="en-US" dirty="0"/>
+              <a:t>Ideally write APIs for a general purpose</a:t>
+            </a:r>
+          </a:p>
+          <a:p>
+            <a:r>
+              <a:rPr lang="en-US" dirty="0"/>
+              <a:t>Spend 10% to continue improving your code base (as it will automatically become more complex otherwise); ideally, after a  change, it should be designed/structured as if change had been known from the start</a:t>
+            </a:r>
+          </a:p>
+        </p:txBody>
+      </p:sp>
+      <p:sp>
+        <p:nvSpPr>
+          <p:cNvPr id="4" name="Slide Number Placeholder 3"/>
+          <p:cNvSpPr>
+            <a:spLocks noGrp="1"/>
+          </p:cNvSpPr>
+          <p:nvPr>
+            <p:ph type="sldNum" sz="quarter" idx="12"/>
+          </p:nvPr>
+        </p:nvSpPr>
+        <p:spPr/>
+        <p:txBody>
+          <a:bodyPr/>
+          <a:lstStyle/>
+          <a:p>
+            <a:pPr algn="l"/>
+            <a:fld id="{11CDFDCC-1F45-4E80-8B17-15DA0BDDC059}" type="slidenum">
+              <a:rPr lang="en-US" smtClean="0"/>
+              <a:pPr algn="l"/>
+              <a:t>19</a:t>
+            </a:fld>
+            <a:endParaRPr lang="en-US" dirty="0"/>
+          </a:p>
+        </p:txBody>
+      </p:sp>
+      <p:sp>
+        <p:nvSpPr>
+          <p:cNvPr id="6" name="TextBox 5">
+            <a:extLst>
+              <a:ext uri="{FF2B5EF4-FFF2-40B4-BE49-F238E27FC236}">
+                <a16:creationId xmlns:a16="http://schemas.microsoft.com/office/drawing/2014/main" id="{C7C555AA-6A66-253C-E0D7-89387CBF4661}"/>
+              </a:ext>
+            </a:extLst>
+          </p:cNvPr>
+          <p:cNvSpPr txBox="1"/>
+          <p:nvPr/>
+        </p:nvSpPr>
+        <p:spPr>
+          <a:xfrm>
+            <a:off x="830029" y="5897325"/>
+            <a:ext cx="10354644" cy="338554"/>
+          </a:xfrm>
+          <a:prstGeom prst="rect">
+            <a:avLst/>
+          </a:prstGeom>
+          <a:noFill/>
+        </p:spPr>
+        <p:txBody>
+          <a:bodyPr wrap="square">
+            <a:spAutoFit/>
+          </a:bodyPr>
+          <a:lstStyle/>
+          <a:p>
+            <a:r>
+              <a:rPr lang="en-US" sz="1600" dirty="0"/>
+              <a:t>[Talk by </a:t>
+            </a:r>
+            <a:r>
+              <a:rPr lang="en-US" sz="1600" dirty="0" err="1"/>
+              <a:t>Ousterhout</a:t>
+            </a:r>
+            <a:r>
+              <a:rPr lang="en-US" sz="1600" dirty="0"/>
+              <a:t>, John related to: A Philosophy of Software Design]</a:t>
+            </a:r>
+          </a:p>
+        </p:txBody>
+      </p:sp>
+    </p:spTree>
+    <p:extLst>
+      <p:ext uri="{BB962C8B-B14F-4D97-AF65-F5344CB8AC3E}">
+        <p14:creationId xmlns:p14="http://schemas.microsoft.com/office/powerpoint/2010/main" val="3004995272"/>
       </p:ext>
     </p:extLst>
   </p:cSld>
@@ -5619,7 +5750,7 @@
           <a:p>
             <a:r>
               <a:rPr lang="en-US" dirty="0"/>
-              <a:t>Business Strategy</a:t>
+              <a:t>Scientific evidence</a:t>
             </a:r>
           </a:p>
         </p:txBody>
@@ -5641,83 +5772,40 @@
           </a:bodyPr>
           <a:lstStyle/>
           <a:p>
-            <a:r>
-              <a:rPr lang="en-US" dirty="0"/>
-              <a:t>A proper business strategy is a fundamental anchor for product design and development.</a:t>
-            </a:r>
-          </a:p>
-          <a:p>
-            <a:r>
-              <a:rPr lang="en-US" dirty="0"/>
-              <a:t>To define a business strategy with “strategic positioning” [1]:</a:t>
-            </a:r>
-          </a:p>
-          <a:p>
-            <a:pPr marL="1371600" lvl="2" indent="-457200">
-              <a:buFont typeface="+mj-lt"/>
-              <a:buAutoNum type="arabicPeriod"/>
-            </a:pPr>
-            <a:r>
-              <a:rPr lang="en-US" dirty="0"/>
-              <a:t>Create a unique and valuable position:</a:t>
-            </a:r>
-            <a:br>
-              <a:rPr lang="en-US" dirty="0"/>
-            </a:br>
-            <a:r>
-              <a:rPr lang="en-US" dirty="0"/>
-              <a:t>serve few needs of many customers</a:t>
-            </a:r>
-            <a:br>
-              <a:rPr lang="en-US" dirty="0"/>
-            </a:br>
-            <a:r>
-              <a:rPr lang="en-US" dirty="0"/>
-              <a:t>serve broad needs of few customers</a:t>
-            </a:r>
-            <a:br>
-              <a:rPr lang="en-US" dirty="0"/>
-            </a:br>
-            <a:r>
-              <a:rPr lang="en-US" dirty="0"/>
-              <a:t>serve broad needs of many customers in a narrow market</a:t>
-            </a:r>
-          </a:p>
-          <a:p>
-            <a:pPr marL="1371600" lvl="2" indent="-457200">
-              <a:buFont typeface="+mj-lt"/>
-              <a:buAutoNum type="arabicPeriod"/>
-            </a:pPr>
-            <a:r>
-              <a:rPr lang="en-US" dirty="0"/>
-              <a:t>Chose what not to do.</a:t>
-            </a:r>
-          </a:p>
-          <a:p>
-            <a:pPr marL="1371600" lvl="2" indent="-457200">
-              <a:buFont typeface="+mj-lt"/>
-              <a:buAutoNum type="arabicPeriod"/>
-            </a:pPr>
-            <a:r>
-              <a:rPr lang="en-US" dirty="0"/>
-              <a:t>Create “fit” among the company’s activities.</a:t>
-            </a:r>
-            <a:br>
-              <a:rPr lang="en-US" dirty="0"/>
-            </a:br>
-            <a:r>
-              <a:rPr lang="en-US" dirty="0"/>
-              <a:t>Create competitive advantage and sustainability: align activities with the strategy until they mutually reinforce each other.</a:t>
-            </a:r>
-          </a:p>
-          <a:p>
-            <a:pPr marL="457200" lvl="1" indent="0">
+            <a:pPr marL="0" indent="0" algn="ctr">
               <a:buNone/>
             </a:pPr>
             <a:r>
               <a:rPr lang="en-US" dirty="0"/>
-              <a:t>[1] Porter, M.E., 2011. Chapter 1: What is Strategy? HBR's 10 Must Reads on Strategy. Harvard Business Press</a:t>
-            </a:r>
+              <a:t>Proving cause and effect in biomedical sciences is the foundation of any treatment.</a:t>
+            </a:r>
+          </a:p>
+          <a:p>
+            <a:pPr marL="0" indent="0" algn="ctr">
+              <a:buNone/>
+            </a:pPr>
+            <a:endParaRPr lang="en-US" dirty="0"/>
+          </a:p>
+          <a:p>
+            <a:pPr marL="0" indent="0" algn="ctr">
+              <a:buNone/>
+            </a:pPr>
+            <a:r>
+              <a:rPr lang="en-US" dirty="0"/>
+              <a:t>For a treatment device, the medical device can only fulfill its intended purpose if this foundation is right.</a:t>
+            </a:r>
+          </a:p>
+          <a:p>
+            <a:pPr marL="0" indent="0" algn="ctr">
+              <a:buNone/>
+            </a:pPr>
+            <a:endParaRPr lang="en-US" dirty="0"/>
+          </a:p>
+          <a:p>
+            <a:pPr marL="0" indent="0" algn="ctr">
+              <a:buNone/>
+            </a:pPr>
+            <a:endParaRPr lang="en-US" dirty="0"/>
           </a:p>
         </p:txBody>
       </p:sp>
@@ -5759,7 +5847,7 @@
 </p:sld>
 </file>
 
-<file path=ppt/slides/slide3.xml><?xml version="1.0" encoding="utf-8"?>
+<file path=ppt/slides/slide20.xml><?xml version="1.0" encoding="utf-8"?>
 <p:sld xmlns:a="http://schemas.openxmlformats.org/drawingml/2006/main" xmlns:r="http://schemas.openxmlformats.org/officeDocument/2006/relationships" xmlns:p="http://schemas.openxmlformats.org/presentationml/2006/main">
   <p:cSld>
     <p:spTree>
@@ -5793,7 +5881,7 @@
           <a:p>
             <a:r>
               <a:rPr lang="en-US" dirty="0"/>
-              <a:t>Business Strategy</a:t>
+              <a:t>Effective Engineering</a:t>
             </a:r>
           </a:p>
         </p:txBody>
@@ -5806,6 +5894,223 @@
           </p:cNvSpPr>
           <p:nvPr>
             <p:ph idx="1"/>
+          </p:nvPr>
+        </p:nvSpPr>
+        <p:spPr>
+          <a:xfrm>
+            <a:off x="838200" y="1825625"/>
+            <a:ext cx="10515600" cy="4071700"/>
+          </a:xfrm>
+        </p:spPr>
+        <p:txBody>
+          <a:bodyPr>
+            <a:normAutofit fontScale="77500" lnSpcReduction="20000"/>
+          </a:bodyPr>
+          <a:lstStyle/>
+          <a:p>
+            <a:r>
+              <a:rPr lang="en-US" dirty="0"/>
+              <a:t>10x-engineers produce 10x the impact, they do not work 10x the hours. </a:t>
+            </a:r>
+          </a:p>
+          <a:p>
+            <a:r>
+              <a:rPr lang="en-US" dirty="0"/>
+              <a:t>These engineers, per observation:</a:t>
+            </a:r>
+          </a:p>
+          <a:p>
+            <a:pPr lvl="1"/>
+            <a:r>
+              <a:rPr lang="en-US" dirty="0"/>
+              <a:t>Focus on big levers (work on what has the most impact), e.g. reduce complexity in design, do unit tests where they are most relevant, ..</a:t>
+            </a:r>
+          </a:p>
+          <a:p>
+            <a:pPr lvl="1"/>
+            <a:r>
+              <a:rPr lang="en-US" dirty="0"/>
+              <a:t>Optimize for learning (use opportunities to learn, educate themselves, do side projects, ..)</a:t>
+            </a:r>
+          </a:p>
+          <a:p>
+            <a:pPr lvl="1"/>
+            <a:r>
+              <a:rPr lang="en-US" dirty="0"/>
+              <a:t>Invest in iteration speed (learn and provide tooling, create tools when you need to do something twice, fasten build processes, [learn to focus and complete things in time] ..)</a:t>
+            </a:r>
+          </a:p>
+          <a:p>
+            <a:pPr lvl="1"/>
+            <a:r>
+              <a:rPr lang="en-US" dirty="0"/>
+              <a:t>Validate your ideas aggressively and iteratively, validate the assumptions that go into your ideas (this is sometimes very simple to do)</a:t>
+            </a:r>
+          </a:p>
+          <a:p>
+            <a:pPr lvl="1"/>
+            <a:r>
+              <a:rPr lang="en-US" dirty="0"/>
+              <a:t>Reduce complexity:</a:t>
+            </a:r>
+          </a:p>
+          <a:p>
+            <a:pPr lvl="2"/>
+            <a:r>
+              <a:rPr lang="en-US" dirty="0"/>
+              <a:t>Code and system complexity (easier-to-maintain, easier-to-learn for beginners)</a:t>
+            </a:r>
+          </a:p>
+          <a:p>
+            <a:pPr lvl="2"/>
+            <a:r>
+              <a:rPr lang="en-US" dirty="0"/>
+              <a:t>Product complexity (no clear vision; each feature adds a lot to that)</a:t>
+            </a:r>
+          </a:p>
+          <a:p>
+            <a:pPr lvl="2"/>
+            <a:r>
+              <a:rPr lang="en-US" dirty="0"/>
+              <a:t>Minimize operational burden (at its core, this is a cost of code complexity). With organizational complexity, quality and motivation goes down due to lack of feedback/work in isolation, bus factor goes down.</a:t>
+            </a:r>
+          </a:p>
+          <a:p>
+            <a:pPr lvl="1"/>
+            <a:r>
+              <a:rPr lang="en-US" dirty="0"/>
+              <a:t>Build a great engineering culture</a:t>
+            </a:r>
+          </a:p>
+          <a:p>
+            <a:pPr lvl="2"/>
+            <a:r>
+              <a:rPr lang="en-US" dirty="0"/>
+              <a:t>Candidates like companies with all of the above.</a:t>
+            </a:r>
+          </a:p>
+          <a:p>
+            <a:pPr lvl="2"/>
+            <a:r>
+              <a:rPr lang="en-US" dirty="0"/>
+              <a:t>Resource conflicts: communicate between teams on their priorities. Align priorities, otherwise, understand them to see if possibly your team has to do some of the low-priority work of others</a:t>
+            </a:r>
+          </a:p>
+          <a:p>
+            <a:endParaRPr lang="en-US" dirty="0"/>
+          </a:p>
+        </p:txBody>
+      </p:sp>
+      <p:sp>
+        <p:nvSpPr>
+          <p:cNvPr id="4" name="Slide Number Placeholder 3"/>
+          <p:cNvSpPr>
+            <a:spLocks noGrp="1"/>
+          </p:cNvSpPr>
+          <p:nvPr>
+            <p:ph type="sldNum" sz="quarter" idx="12"/>
+          </p:nvPr>
+        </p:nvSpPr>
+        <p:spPr/>
+        <p:txBody>
+          <a:bodyPr/>
+          <a:lstStyle/>
+          <a:p>
+            <a:pPr algn="l"/>
+            <a:fld id="{11CDFDCC-1F45-4E80-8B17-15DA0BDDC059}" type="slidenum">
+              <a:rPr lang="en-US" smtClean="0"/>
+              <a:pPr algn="l"/>
+              <a:t>20</a:t>
+            </a:fld>
+            <a:endParaRPr lang="en-US" dirty="0"/>
+          </a:p>
+        </p:txBody>
+      </p:sp>
+      <p:sp>
+        <p:nvSpPr>
+          <p:cNvPr id="6" name="TextBox 5">
+            <a:extLst>
+              <a:ext uri="{FF2B5EF4-FFF2-40B4-BE49-F238E27FC236}">
+                <a16:creationId xmlns:a16="http://schemas.microsoft.com/office/drawing/2014/main" id="{C7C555AA-6A66-253C-E0D7-89387CBF4661}"/>
+              </a:ext>
+            </a:extLst>
+          </p:cNvPr>
+          <p:cNvSpPr txBox="1"/>
+          <p:nvPr/>
+        </p:nvSpPr>
+        <p:spPr>
+          <a:xfrm>
+            <a:off x="830029" y="5897325"/>
+            <a:ext cx="10354644" cy="338554"/>
+          </a:xfrm>
+          <a:prstGeom prst="rect">
+            <a:avLst/>
+          </a:prstGeom>
+          <a:noFill/>
+        </p:spPr>
+        <p:txBody>
+          <a:bodyPr wrap="square">
+            <a:spAutoFit/>
+          </a:bodyPr>
+          <a:lstStyle/>
+          <a:p>
+            <a:r>
+              <a:rPr lang="en-US" sz="1600" dirty="0"/>
+              <a:t>[The Effective Engineer, Edmond Lau]</a:t>
+            </a:r>
+          </a:p>
+        </p:txBody>
+      </p:sp>
+    </p:spTree>
+    <p:extLst>
+      <p:ext uri="{BB962C8B-B14F-4D97-AF65-F5344CB8AC3E}">
+        <p14:creationId xmlns:p14="http://schemas.microsoft.com/office/powerpoint/2010/main" val="418245327"/>
+      </p:ext>
+    </p:extLst>
+  </p:cSld>
+  <p:clrMapOvr>
+    <a:masterClrMapping/>
+  </p:clrMapOvr>
+</p:sld>
+</file>
+
+<file path=ppt/slides/slide3.xml><?xml version="1.0" encoding="utf-8"?>
+<p:sld xmlns:a="http://schemas.openxmlformats.org/drawingml/2006/main" xmlns:r="http://schemas.openxmlformats.org/officeDocument/2006/relationships" xmlns:p="http://schemas.openxmlformats.org/presentationml/2006/main">
+  <p:cSld>
+    <p:spTree>
+      <p:nvGrpSpPr>
+        <p:cNvPr id="1" name="">
+          <a:extLst>
+            <a:ext uri="{FF2B5EF4-FFF2-40B4-BE49-F238E27FC236}">
+              <a16:creationId xmlns:a16="http://schemas.microsoft.com/office/drawing/2014/main" id="{2D7302E2-1CC0-3038-DF42-968F7090D44B}"/>
+            </a:ext>
+          </a:extLst>
+        </p:cNvPr>
+        <p:cNvGrpSpPr/>
+        <p:nvPr/>
+      </p:nvGrpSpPr>
+      <p:grpSpPr>
+        <a:xfrm>
+          <a:off x="0" y="0"/>
+          <a:ext cx="0" cy="0"/>
+          <a:chOff x="0" y="0"/>
+          <a:chExt cx="0" cy="0"/>
+        </a:xfrm>
+      </p:grpSpPr>
+      <p:sp>
+        <p:nvSpPr>
+          <p:cNvPr id="2" name="Title 1">
+            <a:extLst>
+              <a:ext uri="{FF2B5EF4-FFF2-40B4-BE49-F238E27FC236}">
+                <a16:creationId xmlns:a16="http://schemas.microsoft.com/office/drawing/2014/main" id="{58802914-29A1-8E55-EB39-0A695189FC03}"/>
+              </a:ext>
+            </a:extLst>
+          </p:cNvPr>
+          <p:cNvSpPr>
+            <a:spLocks noGrp="1"/>
+          </p:cNvSpPr>
+          <p:nvPr>
+            <p:ph type="title"/>
           </p:nvPr>
         </p:nvSpPr>
         <p:spPr/>
@@ -5817,114 +6122,154 @@
           <a:p>
             <a:r>
               <a:rPr lang="en-US" dirty="0"/>
-              <a:t>Profitability is the ability to avoid pure competition.</a:t>
-            </a:r>
-          </a:p>
-          <a:p>
-            <a:r>
-              <a:rPr lang="en-US" dirty="0"/>
-              <a:t>Competitive intensity is driven by Porter’s five [1]:</a:t>
-            </a:r>
-          </a:p>
-          <a:p>
-            <a:pPr marL="1371600" lvl="2" indent="-457200">
-              <a:buFont typeface="+mj-lt"/>
-              <a:buAutoNum type="arabicPeriod"/>
-            </a:pPr>
-            <a:r>
-              <a:rPr lang="en-US" dirty="0"/>
-              <a:t>Threat of new entrants</a:t>
+              <a:t>Proving Cause and Effect</a:t>
+            </a:r>
+          </a:p>
+        </p:txBody>
+      </p:sp>
+      <p:sp>
+        <p:nvSpPr>
+          <p:cNvPr id="3" name="Content Placeholder 2">
+            <a:extLst>
+              <a:ext uri="{FF2B5EF4-FFF2-40B4-BE49-F238E27FC236}">
+                <a16:creationId xmlns:a16="http://schemas.microsoft.com/office/drawing/2014/main" id="{1D7C149A-5FC5-AF30-70B4-767977B1241A}"/>
+              </a:ext>
+            </a:extLst>
+          </p:cNvPr>
+          <p:cNvSpPr>
+            <a:spLocks noGrp="1"/>
+          </p:cNvSpPr>
+          <p:nvPr>
+            <p:ph idx="1"/>
+          </p:nvPr>
+        </p:nvSpPr>
+        <p:spPr/>
+        <p:txBody>
+          <a:bodyPr>
+            <a:normAutofit lnSpcReduction="10000"/>
+          </a:bodyPr>
+          <a:lstStyle/>
+          <a:p>
+            <a:r>
+              <a:rPr lang="en-US" dirty="0"/>
+              <a:t>Model (</a:t>
+            </a:r>
+            <a:r>
+              <a:rPr lang="en-US" dirty="0" err="1"/>
+              <a:t>reproducable</a:t>
+            </a:r>
+            <a:r>
+              <a:rPr lang="en-US" dirty="0"/>
+              <a:t> experiment)</a:t>
+            </a:r>
+          </a:p>
+          <a:p>
+            <a:r>
+              <a:rPr lang="en-US" dirty="0"/>
+              <a:t>Empirical science (translational science)</a:t>
+            </a:r>
+          </a:p>
+          <a:p>
+            <a:pPr lvl="1"/>
+            <a:r>
+              <a:rPr lang="en-US" dirty="0"/>
+              <a:t>Observational studies</a:t>
+            </a:r>
+          </a:p>
+          <a:p>
+            <a:pPr lvl="2"/>
+            <a:r>
+              <a:rPr lang="en-US" dirty="0"/>
+              <a:t>Retrospective (correlation, difficult to establish causality)</a:t>
+            </a:r>
+          </a:p>
+          <a:p>
+            <a:pPr lvl="2"/>
+            <a:r>
+              <a:rPr lang="en-US" dirty="0"/>
+              <a:t>Prospective (better for establishing causality)</a:t>
             </a:r>
           </a:p>
           <a:p>
             <a:pPr lvl="3"/>
             <a:r>
               <a:rPr lang="en-US" dirty="0"/>
-              <a:t>Put barriers to entry</a:t>
-            </a:r>
-          </a:p>
-          <a:p>
-            <a:pPr marL="1371600" lvl="2" indent="-457200">
-              <a:buFont typeface="+mj-lt"/>
-              <a:buAutoNum type="arabicPeriod"/>
-            </a:pPr>
-            <a:r>
-              <a:rPr lang="en-US" dirty="0"/>
-              <a:t>Threat of substitutes </a:t>
-            </a:r>
-          </a:p>
-          <a:p>
-            <a:pPr lvl="3"/>
-            <a:r>
-              <a:rPr lang="en-US" dirty="0"/>
-              <a:t>Make use of, e.g. buyer switching costs</a:t>
-            </a:r>
-          </a:p>
-          <a:p>
-            <a:pPr marL="1371600" lvl="2" indent="-457200">
-              <a:buFont typeface="+mj-lt"/>
-              <a:buAutoNum type="arabicPeriod"/>
-            </a:pPr>
-            <a:r>
-              <a:rPr lang="en-US" dirty="0"/>
-              <a:t>Bargaining power of customers</a:t>
-            </a:r>
-          </a:p>
-          <a:p>
-            <a:pPr lvl="3"/>
-            <a:r>
-              <a:rPr lang="en-US" dirty="0"/>
-              <a:t>Make use of, e.g. buyer information availability</a:t>
-            </a:r>
-          </a:p>
-          <a:p>
-            <a:pPr marL="1371600" lvl="2" indent="-457200">
-              <a:buFont typeface="+mj-lt"/>
-              <a:buAutoNum type="arabicPeriod"/>
-            </a:pPr>
-            <a:r>
-              <a:rPr lang="en-US" dirty="0"/>
-              <a:t>Bargaining power of suppliers</a:t>
-            </a:r>
-          </a:p>
-          <a:p>
-            <a:pPr lvl="3"/>
-            <a:r>
-              <a:rPr lang="en-US" dirty="0"/>
-              <a:t>Avoid, or, e.g. make use of supplier switching costs relative to firm switching costs</a:t>
-            </a:r>
-          </a:p>
-          <a:p>
-            <a:pPr marL="1371600" lvl="2" indent="-457200">
-              <a:buFont typeface="+mj-lt"/>
-              <a:buAutoNum type="arabicPeriod"/>
-            </a:pPr>
-            <a:r>
-              <a:rPr lang="en-US" dirty="0"/>
-              <a:t>Competitive rivalry</a:t>
-            </a:r>
-          </a:p>
-          <a:p>
-            <a:pPr lvl="3"/>
-            <a:r>
-              <a:rPr lang="en-US" dirty="0"/>
-              <a:t>Know your competitors' marketing strategies and pricing</a:t>
-            </a:r>
-          </a:p>
-          <a:p>
-            <a:pPr marL="457200" lvl="1" indent="0">
-              <a:buNone/>
-            </a:pPr>
-            <a:r>
-              <a:rPr lang="en-US" dirty="0"/>
-              <a:t>[1] Porter, M.E., 1979 Harvard Business Review</a:t>
-            </a:r>
-          </a:p>
-        </p:txBody>
-      </p:sp>
-      <p:sp>
-        <p:nvSpPr>
-          <p:cNvPr id="4" name="Slide Number Placeholder 3"/>
+              <a:t>Gold standard: Randomized controlled trials. RCTs “are prospective studies that measure the effectiveness of a new intervention or treatment. Although no study is likely on its own to prove causality, randomization reduces bias and provides a rigorous tool to examine cause-effect relationships between an intervention and outcome.” [PMID: 29916205]</a:t>
+            </a:r>
+          </a:p>
+          <a:p>
+            <a:pPr lvl="1"/>
+            <a:r>
+              <a:rPr lang="en-US" dirty="0"/>
+              <a:t>Reporting standards:</a:t>
+            </a:r>
+          </a:p>
+          <a:p>
+            <a:pPr lvl="2"/>
+            <a:r>
+              <a:rPr lang="en-US" dirty="0"/>
+              <a:t>STROBE (</a:t>
+            </a:r>
+            <a:r>
+              <a:rPr lang="en-US" dirty="0" err="1"/>
+              <a:t>STrengthening</a:t>
+            </a:r>
+            <a:r>
+              <a:rPr lang="en-US" dirty="0"/>
+              <a:t> the Reporting of </a:t>
+            </a:r>
+            <a:r>
+              <a:rPr lang="en-US" dirty="0" err="1"/>
+              <a:t>OBservational</a:t>
+            </a:r>
+            <a:r>
+              <a:rPr lang="en-US" dirty="0"/>
+              <a:t> studies in Epidemiology)</a:t>
+            </a:r>
+            <a:br>
+              <a:rPr lang="en-US" dirty="0"/>
+            </a:br>
+            <a:r>
+              <a:rPr lang="en-US" dirty="0"/>
+              <a:t>Provides clear definitions of what pro-/retrospective can mean</a:t>
+            </a:r>
+          </a:p>
+          <a:p>
+            <a:pPr lvl="2"/>
+            <a:r>
+              <a:rPr lang="en-US" dirty="0"/>
+              <a:t>ICMJE Recommendations (adapted by many journals)</a:t>
+            </a:r>
+            <a:br>
+              <a:rPr lang="en-US" dirty="0"/>
+            </a:br>
+            <a:r>
+              <a:rPr lang="en-US" dirty="0"/>
+              <a:t>Formerly called Uniform Requirements for Manuscripts Submitted to Biomedical Journals (URMs) https://</a:t>
+            </a:r>
+            <a:r>
+              <a:rPr lang="en-US" dirty="0" err="1"/>
+              <a:t>www.icmje.org</a:t>
+            </a:r>
+            <a:r>
+              <a:rPr lang="en-US" dirty="0"/>
+              <a:t>/recommendations/</a:t>
+            </a:r>
+          </a:p>
+          <a:p>
+            <a:endParaRPr lang="en-US" dirty="0"/>
+          </a:p>
+        </p:txBody>
+      </p:sp>
+      <p:sp>
+        <p:nvSpPr>
+          <p:cNvPr id="4" name="Slide Number Placeholder 3">
+            <a:extLst>
+              <a:ext uri="{FF2B5EF4-FFF2-40B4-BE49-F238E27FC236}">
+                <a16:creationId xmlns:a16="http://schemas.microsoft.com/office/drawing/2014/main" id="{FC5E4D6F-F38B-D538-ADC4-FA9F5B4D5825}"/>
+              </a:ext>
+            </a:extLst>
+          </p:cNvPr>
           <p:cNvSpPr>
             <a:spLocks noGrp="1"/>
           </p:cNvSpPr>
@@ -5950,7 +6295,7 @@
     </p:spTree>
     <p:extLst>
       <p:ext uri="{BB962C8B-B14F-4D97-AF65-F5344CB8AC3E}">
-        <p14:creationId xmlns:p14="http://schemas.microsoft.com/office/powerpoint/2010/main" val="4089053926"/>
+        <p14:creationId xmlns:p14="http://schemas.microsoft.com/office/powerpoint/2010/main" val="83867403"/>
       </p:ext>
     </p:extLst>
   </p:cSld>
@@ -5961,6 +6306,204 @@
 </file>
 
 <file path=ppt/slides/slide4.xml><?xml version="1.0" encoding="utf-8"?>
+<p:sld xmlns:a="http://schemas.openxmlformats.org/drawingml/2006/main" xmlns:r="http://schemas.openxmlformats.org/officeDocument/2006/relationships" xmlns:p="http://schemas.openxmlformats.org/presentationml/2006/main">
+  <p:cSld>
+    <p:spTree>
+      <p:nvGrpSpPr>
+        <p:cNvPr id="1" name="">
+          <a:extLst>
+            <a:ext uri="{FF2B5EF4-FFF2-40B4-BE49-F238E27FC236}">
+              <a16:creationId xmlns:a16="http://schemas.microsoft.com/office/drawing/2014/main" id="{A105BD48-20E1-6EA6-006C-3023BC105BC6}"/>
+            </a:ext>
+          </a:extLst>
+        </p:cNvPr>
+        <p:cNvGrpSpPr/>
+        <p:nvPr/>
+      </p:nvGrpSpPr>
+      <p:grpSpPr>
+        <a:xfrm>
+          <a:off x="0" y="0"/>
+          <a:ext cx="0" cy="0"/>
+          <a:chOff x="0" y="0"/>
+          <a:chExt cx="0" cy="0"/>
+        </a:xfrm>
+      </p:grpSpPr>
+      <p:sp>
+        <p:nvSpPr>
+          <p:cNvPr id="2" name="Title 1">
+            <a:extLst>
+              <a:ext uri="{FF2B5EF4-FFF2-40B4-BE49-F238E27FC236}">
+                <a16:creationId xmlns:a16="http://schemas.microsoft.com/office/drawing/2014/main" id="{B0E4653B-E74A-908E-F036-1D469CF2D4FF}"/>
+              </a:ext>
+            </a:extLst>
+          </p:cNvPr>
+          <p:cNvSpPr>
+            <a:spLocks noGrp="1"/>
+          </p:cNvSpPr>
+          <p:nvPr>
+            <p:ph type="title"/>
+          </p:nvPr>
+        </p:nvSpPr>
+        <p:spPr/>
+        <p:txBody>
+          <a:bodyPr/>
+          <a:lstStyle/>
+          <a:p>
+            <a:r>
+              <a:rPr lang="en-US" dirty="0"/>
+              <a:t>Business Strategy</a:t>
+            </a:r>
+          </a:p>
+        </p:txBody>
+      </p:sp>
+      <p:sp>
+        <p:nvSpPr>
+          <p:cNvPr id="3" name="Content Placeholder 2">
+            <a:extLst>
+              <a:ext uri="{FF2B5EF4-FFF2-40B4-BE49-F238E27FC236}">
+                <a16:creationId xmlns:a16="http://schemas.microsoft.com/office/drawing/2014/main" id="{E5BE485D-BE68-B942-BC5A-68AF4F2C302C}"/>
+              </a:ext>
+            </a:extLst>
+          </p:cNvPr>
+          <p:cNvSpPr>
+            <a:spLocks noGrp="1"/>
+          </p:cNvSpPr>
+          <p:nvPr>
+            <p:ph idx="1"/>
+          </p:nvPr>
+        </p:nvSpPr>
+        <p:spPr/>
+        <p:txBody>
+          <a:bodyPr>
+            <a:normAutofit/>
+          </a:bodyPr>
+          <a:lstStyle/>
+          <a:p>
+            <a:r>
+              <a:rPr lang="en-US" dirty="0"/>
+              <a:t>A proper business strategy is a fundamental anchor for product design and development.</a:t>
+            </a:r>
+          </a:p>
+          <a:p>
+            <a:r>
+              <a:rPr lang="en-US" dirty="0"/>
+              <a:t>To define a business strategy with “strategic positioning” [1]:</a:t>
+            </a:r>
+          </a:p>
+          <a:p>
+            <a:pPr marL="1371600" lvl="2" indent="-457200">
+              <a:buFont typeface="+mj-lt"/>
+              <a:buAutoNum type="arabicPeriod"/>
+            </a:pPr>
+            <a:r>
+              <a:rPr lang="en-US" dirty="0"/>
+              <a:t>Create a unique and valuable position:</a:t>
+            </a:r>
+            <a:br>
+              <a:rPr lang="en-US" dirty="0"/>
+            </a:br>
+            <a:r>
+              <a:rPr lang="en-US" dirty="0"/>
+              <a:t>serve few needs of many customers</a:t>
+            </a:r>
+            <a:br>
+              <a:rPr lang="en-US" dirty="0"/>
+            </a:br>
+            <a:r>
+              <a:rPr lang="en-US" dirty="0"/>
+              <a:t>serve broad needs of few customers</a:t>
+            </a:r>
+            <a:br>
+              <a:rPr lang="en-US" dirty="0"/>
+            </a:br>
+            <a:r>
+              <a:rPr lang="en-US" dirty="0"/>
+              <a:t>serve broad needs of many customers in a narrow market</a:t>
+            </a:r>
+          </a:p>
+          <a:p>
+            <a:pPr marL="1371600" lvl="2" indent="-457200">
+              <a:buFont typeface="+mj-lt"/>
+              <a:buAutoNum type="arabicPeriod"/>
+            </a:pPr>
+            <a:r>
+              <a:rPr lang="en-US" dirty="0"/>
+              <a:t>Chose what not to do.</a:t>
+            </a:r>
+          </a:p>
+          <a:p>
+            <a:pPr marL="1371600" lvl="2" indent="-457200">
+              <a:buFont typeface="+mj-lt"/>
+              <a:buAutoNum type="arabicPeriod"/>
+            </a:pPr>
+            <a:r>
+              <a:rPr lang="en-US" dirty="0"/>
+              <a:t>Create “fit” among the company’s activities.</a:t>
+            </a:r>
+            <a:br>
+              <a:rPr lang="en-US" dirty="0"/>
+            </a:br>
+            <a:r>
+              <a:rPr lang="en-US" dirty="0"/>
+              <a:t>Create competitive advantage and sustainability: align activities with the strategy until they mutually reinforce each other.</a:t>
+            </a:r>
+          </a:p>
+          <a:p>
+            <a:pPr marL="457200" lvl="1" indent="0">
+              <a:buNone/>
+            </a:pPr>
+            <a:r>
+              <a:rPr lang="en-US" dirty="0"/>
+              <a:t>[1] Porter, M.E., 2011. Chapter 1: What is Strategy? HBR's 10 Must Reads on Strategy. Harvard Business Press</a:t>
+            </a:r>
+          </a:p>
+        </p:txBody>
+      </p:sp>
+      <p:sp>
+        <p:nvSpPr>
+          <p:cNvPr id="4" name="Slide Number Placeholder 3">
+            <a:extLst>
+              <a:ext uri="{FF2B5EF4-FFF2-40B4-BE49-F238E27FC236}">
+                <a16:creationId xmlns:a16="http://schemas.microsoft.com/office/drawing/2014/main" id="{EBB8CA4E-8C22-25AA-67C2-3EB8B04709E1}"/>
+              </a:ext>
+            </a:extLst>
+          </p:cNvPr>
+          <p:cNvSpPr>
+            <a:spLocks noGrp="1"/>
+          </p:cNvSpPr>
+          <p:nvPr>
+            <p:ph type="sldNum" sz="quarter" idx="12"/>
+          </p:nvPr>
+        </p:nvSpPr>
+        <p:spPr/>
+        <p:txBody>
+          <a:bodyPr/>
+          <a:lstStyle/>
+          <a:p>
+            <a:pPr algn="l"/>
+            <a:fld id="{11CDFDCC-1F45-4E80-8B17-15DA0BDDC059}" type="slidenum">
+              <a:rPr lang="en-US" smtClean="0"/>
+              <a:pPr algn="l"/>
+              <a:t>4</a:t>
+            </a:fld>
+            <a:endParaRPr lang="en-US" dirty="0"/>
+          </a:p>
+        </p:txBody>
+      </p:sp>
+    </p:spTree>
+    <p:extLst>
+      <p:ext uri="{BB962C8B-B14F-4D97-AF65-F5344CB8AC3E}">
+        <p14:creationId xmlns:p14="http://schemas.microsoft.com/office/powerpoint/2010/main" val="4063292090"/>
+      </p:ext>
+    </p:extLst>
+  </p:cSld>
+  <p:clrMapOvr>
+    <a:masterClrMapping/>
+  </p:clrMapOvr>
+</p:sld>
+</file>
+
+<file path=ppt/slides/slide5.xml><?xml version="1.0" encoding="utf-8"?>
 <p:sld xmlns:a="http://schemas.openxmlformats.org/drawingml/2006/main" xmlns:r="http://schemas.openxmlformats.org/officeDocument/2006/relationships" xmlns:p="http://schemas.openxmlformats.org/presentationml/2006/main">
   <p:cSld>
     <p:spTree>
@@ -6018,19 +6561,107 @@
           <a:p>
             <a:r>
               <a:rPr lang="en-US" dirty="0"/>
-              <a:t>For a product, projects and early startups first need to find a business model.</a:t>
-            </a:r>
-          </a:p>
-          <a:p>
-            <a:r>
-              <a:rPr lang="en-US" dirty="0"/>
-              <a:t>To validate a business model, time and cost are typically limited.</a:t>
-            </a:r>
-          </a:p>
-          <a:p>
-            <a:r>
-              <a:rPr lang="en-US" dirty="0"/>
-              <a:t>Fill relevant fields of the Business Model Canvas, then validate and iterate it, ideally through early market exposure:</a:t>
+              <a:t>Profitability is the ability to avoid pure competition.</a:t>
+            </a:r>
+          </a:p>
+          <a:p>
+            <a:r>
+              <a:rPr lang="en-US" dirty="0"/>
+              <a:t>Competitive intensity is driven by Porter’s five [1]:</a:t>
+            </a:r>
+          </a:p>
+          <a:p>
+            <a:pPr marL="1371600" lvl="2" indent="-457200">
+              <a:buFont typeface="+mj-lt"/>
+              <a:buAutoNum type="arabicPeriod"/>
+            </a:pPr>
+            <a:r>
+              <a:rPr lang="en-US" dirty="0"/>
+              <a:t>Threat of new entrants</a:t>
+            </a:r>
+          </a:p>
+          <a:p>
+            <a:pPr lvl="3"/>
+            <a:r>
+              <a:rPr lang="en-US" dirty="0"/>
+              <a:t>Put barriers to entry</a:t>
+            </a:r>
+          </a:p>
+          <a:p>
+            <a:pPr marL="1371600" lvl="2" indent="-457200">
+              <a:buFont typeface="+mj-lt"/>
+              <a:buAutoNum type="arabicPeriod"/>
+            </a:pPr>
+            <a:r>
+              <a:rPr lang="en-US" dirty="0"/>
+              <a:t>Threat of substitutes </a:t>
+            </a:r>
+          </a:p>
+          <a:p>
+            <a:pPr lvl="3"/>
+            <a:r>
+              <a:rPr lang="en-US" dirty="0"/>
+              <a:t>Make use of, e.g. buyer switching costs</a:t>
+            </a:r>
+          </a:p>
+          <a:p>
+            <a:pPr marL="1371600" lvl="2" indent="-457200">
+              <a:buFont typeface="+mj-lt"/>
+              <a:buAutoNum type="arabicPeriod"/>
+            </a:pPr>
+            <a:r>
+              <a:rPr lang="en-US" dirty="0"/>
+              <a:t>Bargaining power of customers</a:t>
+            </a:r>
+          </a:p>
+          <a:p>
+            <a:pPr lvl="3"/>
+            <a:r>
+              <a:rPr lang="en-US" dirty="0"/>
+              <a:t>Make use of, e.g. buyer information availability</a:t>
+            </a:r>
+          </a:p>
+          <a:p>
+            <a:pPr marL="1371600" lvl="2" indent="-457200">
+              <a:buFont typeface="+mj-lt"/>
+              <a:buAutoNum type="arabicPeriod"/>
+            </a:pPr>
+            <a:r>
+              <a:rPr lang="en-US" dirty="0"/>
+              <a:t>Bargaining power of suppliers</a:t>
+            </a:r>
+          </a:p>
+          <a:p>
+            <a:pPr lvl="3"/>
+            <a:r>
+              <a:rPr lang="en-US" dirty="0"/>
+              <a:t>Avoid, or, e.g. make use of supplier switching costs relative to firm switching costs</a:t>
+            </a:r>
+          </a:p>
+          <a:p>
+            <a:pPr marL="1371600" lvl="2" indent="-457200">
+              <a:buFont typeface="+mj-lt"/>
+              <a:buAutoNum type="arabicPeriod"/>
+            </a:pPr>
+            <a:r>
+              <a:rPr lang="en-US" dirty="0"/>
+              <a:t>Competitive rivalry</a:t>
+            </a:r>
+          </a:p>
+          <a:p>
+            <a:pPr lvl="3"/>
+            <a:r>
+              <a:rPr lang="en-US" dirty="0"/>
+              <a:t>Know your competitors' marketing strategies and pricing</a:t>
+            </a:r>
+          </a:p>
+          <a:p>
+            <a:pPr marL="457200" lvl="1" indent="0">
+              <a:buNone/>
+            </a:pPr>
+            <a:r>
+              <a:rPr lang="en-US" dirty="0"/>
+              <a:t>[1] Porter, M.E., 1979 Harvard Business Review</a:t>
             </a:r>
           </a:p>
         </p:txBody>
@@ -6054,7 +6685,120 @@
             <a:fld id="{11CDFDCC-1F45-4E80-8B17-15DA0BDDC059}" type="slidenum">
               <a:rPr lang="en-US" smtClean="0"/>
               <a:pPr algn="l"/>
-              <a:t>4</a:t>
+              <a:t>5</a:t>
+            </a:fld>
+            <a:endParaRPr lang="en-US" dirty="0"/>
+          </a:p>
+        </p:txBody>
+      </p:sp>
+    </p:spTree>
+    <p:extLst>
+      <p:ext uri="{BB962C8B-B14F-4D97-AF65-F5344CB8AC3E}">
+        <p14:creationId xmlns:p14="http://schemas.microsoft.com/office/powerpoint/2010/main" val="4089053926"/>
+      </p:ext>
+    </p:extLst>
+  </p:cSld>
+  <p:clrMapOvr>
+    <a:masterClrMapping/>
+  </p:clrMapOvr>
+</p:sld>
+</file>
+
+<file path=ppt/slides/slide6.xml><?xml version="1.0" encoding="utf-8"?>
+<p:sld xmlns:a="http://schemas.openxmlformats.org/drawingml/2006/main" xmlns:r="http://schemas.openxmlformats.org/officeDocument/2006/relationships" xmlns:p="http://schemas.openxmlformats.org/presentationml/2006/main">
+  <p:cSld>
+    <p:spTree>
+      <p:nvGrpSpPr>
+        <p:cNvPr id="1" name=""/>
+        <p:cNvGrpSpPr/>
+        <p:nvPr/>
+      </p:nvGrpSpPr>
+      <p:grpSpPr>
+        <a:xfrm>
+          <a:off x="0" y="0"/>
+          <a:ext cx="0" cy="0"/>
+          <a:chOff x="0" y="0"/>
+          <a:chExt cx="0" cy="0"/>
+        </a:xfrm>
+      </p:grpSpPr>
+      <p:sp>
+        <p:nvSpPr>
+          <p:cNvPr id="2" name="Title 1"/>
+          <p:cNvSpPr>
+            <a:spLocks noGrp="1"/>
+          </p:cNvSpPr>
+          <p:nvPr>
+            <p:ph type="title"/>
+          </p:nvPr>
+        </p:nvSpPr>
+        <p:spPr/>
+        <p:txBody>
+          <a:bodyPr/>
+          <a:lstStyle/>
+          <a:p>
+            <a:r>
+              <a:rPr lang="en-US" dirty="0"/>
+              <a:t>Business Strategy</a:t>
+            </a:r>
+          </a:p>
+        </p:txBody>
+      </p:sp>
+      <p:sp>
+        <p:nvSpPr>
+          <p:cNvPr id="3" name="Content Placeholder 2"/>
+          <p:cNvSpPr>
+            <a:spLocks noGrp="1"/>
+          </p:cNvSpPr>
+          <p:nvPr>
+            <p:ph idx="1"/>
+          </p:nvPr>
+        </p:nvSpPr>
+        <p:spPr/>
+        <p:txBody>
+          <a:bodyPr>
+            <a:normAutofit/>
+          </a:bodyPr>
+          <a:lstStyle/>
+          <a:p>
+            <a:r>
+              <a:rPr lang="en-US" dirty="0"/>
+              <a:t>For a product, projects and early startups first need to find a business model.</a:t>
+            </a:r>
+          </a:p>
+          <a:p>
+            <a:r>
+              <a:rPr lang="en-US" dirty="0"/>
+              <a:t>To validate a business model, time and cost are typically limited.</a:t>
+            </a:r>
+          </a:p>
+          <a:p>
+            <a:r>
+              <a:rPr lang="en-US" dirty="0"/>
+              <a:t>Fill relevant fields of the Business Model Canvas, then validate and iterate it, ideally through early market exposure:</a:t>
+            </a:r>
+          </a:p>
+        </p:txBody>
+      </p:sp>
+      <p:sp>
+        <p:nvSpPr>
+          <p:cNvPr id="4" name="Slide Number Placeholder 3"/>
+          <p:cNvSpPr>
+            <a:spLocks noGrp="1"/>
+          </p:cNvSpPr>
+          <p:nvPr>
+            <p:ph type="sldNum" sz="quarter" idx="12"/>
+          </p:nvPr>
+        </p:nvSpPr>
+        <p:spPr/>
+        <p:txBody>
+          <a:bodyPr/>
+          <a:lstStyle/>
+          <a:p>
+            <a:pPr algn="l"/>
+            <a:fld id="{11CDFDCC-1F45-4E80-8B17-15DA0BDDC059}" type="slidenum">
+              <a:rPr lang="en-US" smtClean="0"/>
+              <a:pPr algn="l"/>
+              <a:t>6</a:t>
             </a:fld>
             <a:endParaRPr lang="en-US" dirty="0"/>
           </a:p>
@@ -6608,7 +7352,7 @@
 </p:sld>
 </file>
 
-<file path=ppt/slides/slide5.xml><?xml version="1.0" encoding="utf-8"?>
+<file path=ppt/slides/slide7.xml><?xml version="1.0" encoding="utf-8"?>
 <p:sld xmlns:a="http://schemas.openxmlformats.org/drawingml/2006/main" xmlns:r="http://schemas.openxmlformats.org/officeDocument/2006/relationships" xmlns:p="http://schemas.openxmlformats.org/presentationml/2006/main">
   <p:cSld>
     <p:spTree>
@@ -6693,7 +7437,7 @@
             <a:fld id="{11CDFDCC-1F45-4E80-8B17-15DA0BDDC059}" type="slidenum">
               <a:rPr lang="en-US" smtClean="0"/>
               <a:pPr algn="l"/>
-              <a:t>5</a:t>
+              <a:t>7</a:t>
             </a:fld>
             <a:endParaRPr lang="en-US" dirty="0"/>
           </a:p>
@@ -7361,7 +8105,7 @@
 </p:sld>
 </file>
 
-<file path=ppt/slides/slide6.xml><?xml version="1.0" encoding="utf-8"?>
+<file path=ppt/slides/slide8.xml><?xml version="1.0" encoding="utf-8"?>
 <p:sld xmlns:a="http://schemas.openxmlformats.org/drawingml/2006/main" xmlns:r="http://schemas.openxmlformats.org/officeDocument/2006/relationships" xmlns:p="http://schemas.openxmlformats.org/presentationml/2006/main">
   <p:cSld>
     <p:spTree>
@@ -7565,7 +8309,7 @@
             <a:fld id="{11CDFDCC-1F45-4E80-8B17-15DA0BDDC059}" type="slidenum">
               <a:rPr lang="en-US" smtClean="0"/>
               <a:pPr algn="l"/>
-              <a:t>6</a:t>
+              <a:t>8</a:t>
             </a:fld>
             <a:endParaRPr lang="en-US" dirty="0"/>
           </a:p>
@@ -8170,313 +8914,6 @@
 </p:sld>
 </file>
 
-<file path=ppt/slides/slide7.xml><?xml version="1.0" encoding="utf-8"?>
-<p:sld xmlns:a="http://schemas.openxmlformats.org/drawingml/2006/main" xmlns:r="http://schemas.openxmlformats.org/officeDocument/2006/relationships" xmlns:p="http://schemas.openxmlformats.org/presentationml/2006/main">
-  <p:cSld>
-    <p:spTree>
-      <p:nvGrpSpPr>
-        <p:cNvPr id="1" name=""/>
-        <p:cNvGrpSpPr/>
-        <p:nvPr/>
-      </p:nvGrpSpPr>
-      <p:grpSpPr>
-        <a:xfrm>
-          <a:off x="0" y="0"/>
-          <a:ext cx="0" cy="0"/>
-          <a:chOff x="0" y="0"/>
-          <a:chExt cx="0" cy="0"/>
-        </a:xfrm>
-      </p:grpSpPr>
-      <p:sp>
-        <p:nvSpPr>
-          <p:cNvPr id="2" name="Title 1"/>
-          <p:cNvSpPr>
-            <a:spLocks noGrp="1"/>
-          </p:cNvSpPr>
-          <p:nvPr>
-            <p:ph type="title"/>
-          </p:nvPr>
-        </p:nvSpPr>
-        <p:spPr/>
-        <p:txBody>
-          <a:bodyPr/>
-          <a:lstStyle/>
-          <a:p>
-            <a:r>
-              <a:rPr lang="en-US" dirty="0"/>
-              <a:t>Go-To-Market Strategy</a:t>
-            </a:r>
-          </a:p>
-        </p:txBody>
-      </p:sp>
-      <p:sp>
-        <p:nvSpPr>
-          <p:cNvPr id="3" name="Content Placeholder 2"/>
-          <p:cNvSpPr>
-            <a:spLocks noGrp="1"/>
-          </p:cNvSpPr>
-          <p:nvPr>
-            <p:ph idx="1"/>
-          </p:nvPr>
-        </p:nvSpPr>
-        <p:spPr/>
-        <p:txBody>
-          <a:bodyPr>
-            <a:normAutofit/>
-          </a:bodyPr>
-          <a:lstStyle/>
-          <a:p>
-            <a:r>
-              <a:rPr lang="en-US" dirty="0"/>
-              <a:t>Go-to-market approach by Alpha </a:t>
-            </a:r>
-            <a:r>
-              <a:rPr lang="en-US" dirty="0" err="1"/>
-              <a:t>Innomed</a:t>
-            </a:r>
-            <a:r>
-              <a:rPr lang="en-US" dirty="0"/>
-              <a:t>:</a:t>
-            </a:r>
-          </a:p>
-          <a:p>
-            <a:pPr lvl="1"/>
-            <a:r>
-              <a:rPr lang="en-US" dirty="0"/>
-              <a:t>Define what constitutes the most ready and most suitable target market</a:t>
-            </a:r>
-          </a:p>
-          <a:p>
-            <a:pPr lvl="1"/>
-            <a:r>
-              <a:rPr lang="en-US" dirty="0"/>
-              <a:t>Think globally and find a favorable market (the “beach head”) among regulated and non-regulated markets</a:t>
-            </a:r>
-          </a:p>
-          <a:p>
-            <a:pPr lvl="1"/>
-            <a:r>
-              <a:rPr lang="en-US" dirty="0"/>
-              <a:t>Identify adoption barriers to reach the required market readiness</a:t>
-            </a:r>
-          </a:p>
-        </p:txBody>
-      </p:sp>
-      <p:sp>
-        <p:nvSpPr>
-          <p:cNvPr id="4" name="Slide Number Placeholder 3"/>
-          <p:cNvSpPr>
-            <a:spLocks noGrp="1"/>
-          </p:cNvSpPr>
-          <p:nvPr>
-            <p:ph type="sldNum" sz="quarter" idx="12"/>
-          </p:nvPr>
-        </p:nvSpPr>
-        <p:spPr/>
-        <p:txBody>
-          <a:bodyPr/>
-          <a:lstStyle/>
-          <a:p>
-            <a:pPr algn="l"/>
-            <a:fld id="{11CDFDCC-1F45-4E80-8B17-15DA0BDDC059}" type="slidenum">
-              <a:rPr lang="en-US" smtClean="0"/>
-              <a:pPr algn="l"/>
-              <a:t>7</a:t>
-            </a:fld>
-            <a:endParaRPr lang="en-US" dirty="0"/>
-          </a:p>
-        </p:txBody>
-      </p:sp>
-    </p:spTree>
-    <p:extLst>
-      <p:ext uri="{BB962C8B-B14F-4D97-AF65-F5344CB8AC3E}">
-        <p14:creationId xmlns:p14="http://schemas.microsoft.com/office/powerpoint/2010/main" val="4087401635"/>
-      </p:ext>
-    </p:extLst>
-  </p:cSld>
-  <p:clrMapOvr>
-    <a:masterClrMapping/>
-  </p:clrMapOvr>
-</p:sld>
-</file>
-
-<file path=ppt/slides/slide8.xml><?xml version="1.0" encoding="utf-8"?>
-<p:sld xmlns:a="http://schemas.openxmlformats.org/drawingml/2006/main" xmlns:r="http://schemas.openxmlformats.org/officeDocument/2006/relationships" xmlns:p="http://schemas.openxmlformats.org/presentationml/2006/main">
-  <p:cSld>
-    <p:spTree>
-      <p:nvGrpSpPr>
-        <p:cNvPr id="1" name=""/>
-        <p:cNvGrpSpPr/>
-        <p:nvPr/>
-      </p:nvGrpSpPr>
-      <p:grpSpPr>
-        <a:xfrm>
-          <a:off x="0" y="0"/>
-          <a:ext cx="0" cy="0"/>
-          <a:chOff x="0" y="0"/>
-          <a:chExt cx="0" cy="0"/>
-        </a:xfrm>
-      </p:grpSpPr>
-      <p:sp>
-        <p:nvSpPr>
-          <p:cNvPr id="2" name="Title 1"/>
-          <p:cNvSpPr>
-            <a:spLocks noGrp="1"/>
-          </p:cNvSpPr>
-          <p:nvPr>
-            <p:ph type="title"/>
-          </p:nvPr>
-        </p:nvSpPr>
-        <p:spPr/>
-        <p:txBody>
-          <a:bodyPr/>
-          <a:lstStyle/>
-          <a:p>
-            <a:r>
-              <a:rPr lang="en-US" dirty="0"/>
-              <a:t>Regulatory Strategy</a:t>
-            </a:r>
-          </a:p>
-        </p:txBody>
-      </p:sp>
-      <p:sp>
-        <p:nvSpPr>
-          <p:cNvPr id="3" name="Content Placeholder 2"/>
-          <p:cNvSpPr>
-            <a:spLocks noGrp="1"/>
-          </p:cNvSpPr>
-          <p:nvPr>
-            <p:ph idx="1"/>
-          </p:nvPr>
-        </p:nvSpPr>
-        <p:spPr/>
-        <p:txBody>
-          <a:bodyPr>
-            <a:normAutofit fontScale="92500" lnSpcReduction="10000"/>
-          </a:bodyPr>
-          <a:lstStyle/>
-          <a:p>
-            <a:r>
-              <a:rPr lang="en-US" dirty="0"/>
-              <a:t>Once the target market has been identified, identify the applicable local regulations.</a:t>
-            </a:r>
-          </a:p>
-          <a:p>
-            <a:r>
-              <a:rPr lang="en-US" dirty="0"/>
-              <a:t>Choose a regulatory pathway:</a:t>
-            </a:r>
-          </a:p>
-          <a:p>
-            <a:pPr lvl="1"/>
-            <a:r>
-              <a:rPr lang="en-US" dirty="0"/>
-              <a:t>Medical devices</a:t>
-            </a:r>
-          </a:p>
-          <a:p>
-            <a:pPr lvl="2"/>
-            <a:r>
-              <a:rPr lang="en-US" dirty="0"/>
-              <a:t>FDA: Premarket Notification 510(k), Premarket Approval (PMA), Humanitarian Device Exemption (HDE)</a:t>
-            </a:r>
-          </a:p>
-          <a:p>
-            <a:pPr lvl="2"/>
-            <a:r>
-              <a:rPr lang="en-US" dirty="0"/>
-              <a:t>Other markets: MDR (EU), NMPA (PRC), MFDS/KFDA (KOR), ANVISA (BRA) ..</a:t>
-            </a:r>
-          </a:p>
-          <a:p>
-            <a:pPr lvl="1"/>
-            <a:r>
-              <a:rPr lang="en-US" dirty="0"/>
-              <a:t>Non-medical devices</a:t>
-            </a:r>
-          </a:p>
-          <a:p>
-            <a:pPr lvl="2"/>
-            <a:r>
-              <a:rPr lang="en-US" dirty="0"/>
-              <a:t>Further reading: </a:t>
-            </a:r>
-            <a:r>
-              <a:rPr lang="en-US" dirty="0">
-                <a:hlinkClick r:id="rId2"/>
-              </a:rPr>
-              <a:t>https://openregulatory.com/is-our-software-medical-device/</a:t>
-            </a:r>
-            <a:endParaRPr lang="en-US" dirty="0"/>
-          </a:p>
-          <a:p>
-            <a:pPr lvl="2"/>
-            <a:r>
-              <a:rPr lang="en-US" dirty="0"/>
-              <a:t>Health and wellness applications</a:t>
-            </a:r>
-          </a:p>
-          <a:p>
-            <a:pPr lvl="2"/>
-            <a:r>
-              <a:rPr lang="en-US" dirty="0"/>
-              <a:t>Educational purpose</a:t>
-            </a:r>
-          </a:p>
-          <a:p>
-            <a:pPr lvl="2"/>
-            <a:r>
-              <a:rPr lang="en-US" dirty="0"/>
-              <a:t>Devices ”intended to be used for research applications only”/ “not designed or intended to be used for diagnosis or treatment of disease”</a:t>
-            </a:r>
-          </a:p>
-          <a:p>
-            <a:pPr lvl="2"/>
-            <a:r>
-              <a:rPr lang="en-US" dirty="0"/>
-              <a:t>Machines (EU: Machinery Directive 2006/42/EC), radio equipment (EU: Directive 2014/53/EU)</a:t>
-            </a:r>
-          </a:p>
-        </p:txBody>
-      </p:sp>
-      <p:sp>
-        <p:nvSpPr>
-          <p:cNvPr id="4" name="Slide Number Placeholder 3"/>
-          <p:cNvSpPr>
-            <a:spLocks noGrp="1"/>
-          </p:cNvSpPr>
-          <p:nvPr>
-            <p:ph type="sldNum" sz="quarter" idx="12"/>
-          </p:nvPr>
-        </p:nvSpPr>
-        <p:spPr/>
-        <p:txBody>
-          <a:bodyPr/>
-          <a:lstStyle/>
-          <a:p>
-            <a:pPr algn="l"/>
-            <a:fld id="{11CDFDCC-1F45-4E80-8B17-15DA0BDDC059}" type="slidenum">
-              <a:rPr lang="en-US" smtClean="0"/>
-              <a:pPr algn="l"/>
-              <a:t>8</a:t>
-            </a:fld>
-            <a:endParaRPr lang="en-US" dirty="0"/>
-          </a:p>
-        </p:txBody>
-      </p:sp>
-    </p:spTree>
-    <p:extLst>
-      <p:ext uri="{BB962C8B-B14F-4D97-AF65-F5344CB8AC3E}">
-        <p14:creationId xmlns:p14="http://schemas.microsoft.com/office/powerpoint/2010/main" val="487582228"/>
-      </p:ext>
-    </p:extLst>
-  </p:cSld>
-  <p:clrMapOvr>
-    <a:masterClrMapping/>
-  </p:clrMapOvr>
-</p:sld>
-</file>
-
 <file path=ppt/slides/slide9.xml><?xml version="1.0" encoding="utf-8"?>
 <p:sld xmlns:a="http://schemas.openxmlformats.org/drawingml/2006/main" xmlns:r="http://schemas.openxmlformats.org/officeDocument/2006/relationships" xmlns:p="http://schemas.openxmlformats.org/presentationml/2006/main">
   <p:cSld>
@@ -8496,6 +8933,28 @@
       </p:grpSpPr>
       <p:sp>
         <p:nvSpPr>
+          <p:cNvPr id="2" name="Title 1"/>
+          <p:cNvSpPr>
+            <a:spLocks noGrp="1"/>
+          </p:cNvSpPr>
+          <p:nvPr>
+            <p:ph type="title"/>
+          </p:nvPr>
+        </p:nvSpPr>
+        <p:spPr/>
+        <p:txBody>
+          <a:bodyPr/>
+          <a:lstStyle/>
+          <a:p>
+            <a:r>
+              <a:rPr lang="en-US" dirty="0"/>
+              <a:t>Go-To-Market Strategy</a:t>
+            </a:r>
+          </a:p>
+        </p:txBody>
+      </p:sp>
+      <p:sp>
+        <p:nvSpPr>
           <p:cNvPr id="3" name="Content Placeholder 2"/>
           <p:cNvSpPr>
             <a:spLocks noGrp="1"/>
@@ -8507,113 +8966,42 @@
         <p:spPr/>
         <p:txBody>
           <a:bodyPr>
-            <a:normAutofit fontScale="92500" lnSpcReduction="20000"/>
+            <a:normAutofit/>
           </a:bodyPr>
           <a:lstStyle/>
           <a:p>
             <a:r>
               <a:rPr lang="en-US" dirty="0"/>
-              <a:t>Non-medical devices:</a:t>
-            </a:r>
-            <a:br>
-              <a:rPr lang="en-US" dirty="0"/>
-            </a:br>
-            <a:r>
-              <a:rPr lang="en-US" dirty="0"/>
-              <a:t>Example for health and wellness application</a:t>
+              <a:t>Go-to-market approach by Alpha </a:t>
+            </a:r>
+            <a:r>
+              <a:rPr lang="en-US" dirty="0" err="1"/>
+              <a:t>Innomed</a:t>
+            </a:r>
+            <a:r>
+              <a:rPr lang="en-US" dirty="0"/>
+              <a:t>:</a:t>
             </a:r>
           </a:p>
           <a:p>
             <a:pPr lvl="1"/>
             <a:r>
               <a:rPr lang="en-US" dirty="0"/>
-              <a:t>Huawei Scale 3 Pro</a:t>
-            </a:r>
-            <a:br>
-              <a:rPr lang="en-US" dirty="0"/>
-            </a:br>
-            <a:r>
-              <a:rPr lang="en-US" dirty="0"/>
-              <a:t>“Compliance with the essential requirements and other relevant provisions of Directive 2014/53/EU (radio equipment directive, RAD).”</a:t>
-            </a:r>
-          </a:p>
-          <a:p>
-            <a:pPr lvl="2"/>
-            <a:r>
-              <a:rPr lang="en-US" dirty="0"/>
-              <a:t>Intended use:</a:t>
-            </a:r>
-          </a:p>
-          <a:p>
-            <a:pPr lvl="3"/>
-            <a:r>
-              <a:rPr lang="en-US" dirty="0"/>
-              <a:t>Weight measurements, body fat measurements, heart rate measurements, for use with HUAWEI Health App</a:t>
-            </a:r>
-          </a:p>
-          <a:p>
-            <a:pPr lvl="3"/>
-            <a:r>
-              <a:rPr lang="en-US" dirty="0"/>
-              <a:t>This product is not designed to be a medical device, and is not intended to diagnose, treat, cure or prevent any disease. All data and measurements should be used for personal reference only.</a:t>
-            </a:r>
-          </a:p>
-          <a:p>
-            <a:pPr lvl="3"/>
-            <a:r>
-              <a:rPr lang="en-US" dirty="0"/>
-              <a:t>The product is suitable for daily use, especially for people who would like to understand more about their weight, body shape, body fat, and </a:t>
-            </a:r>
-            <a:r>
-              <a:rPr lang="en-US" dirty="0" err="1"/>
-              <a:t>musclemass</a:t>
-            </a:r>
-            <a:r>
-              <a:rPr lang="en-US" dirty="0"/>
-              <a:t>. The data it provides is for personal reference only, and is not intended for medical treatment or as a basis for medical diagnosis, and should not be used in clinics or other medical institutions such as hospitals.”</a:t>
+              <a:t>Define what constitutes the most ready and most suitable target market</a:t>
             </a:r>
           </a:p>
           <a:p>
             <a:pPr lvl="1"/>
             <a:r>
               <a:rPr lang="en-US" dirty="0"/>
-              <a:t>HUAWEI Health App</a:t>
-            </a:r>
-          </a:p>
-          <a:p>
-            <a:pPr lvl="2"/>
-            <a:r>
-              <a:rPr lang="en-US" dirty="0"/>
-              <a:t>Intended use:</a:t>
-            </a:r>
-          </a:p>
-          <a:p>
-            <a:pPr lvl="3"/>
-            <a:r>
-              <a:rPr lang="en-US" dirty="0"/>
-              <a:t>“The Huawei Health app is designed for fitness and wellness only. It is not intended for the diagnosis or treatment of disease or other health problems, nor for the cure or prevention of disease. Huawei makes no representations or warranties to you in this respect.”</a:t>
-            </a:r>
-          </a:p>
-        </p:txBody>
-      </p:sp>
-      <p:sp>
-        <p:nvSpPr>
-          <p:cNvPr id="2" name="Title 1"/>
-          <p:cNvSpPr>
-            <a:spLocks noGrp="1"/>
-          </p:cNvSpPr>
-          <p:nvPr>
-            <p:ph type="title"/>
-          </p:nvPr>
-        </p:nvSpPr>
-        <p:spPr/>
-        <p:txBody>
-          <a:bodyPr/>
-          <a:lstStyle/>
-          <a:p>
-            <a:r>
-              <a:rPr lang="en-US" dirty="0"/>
-              <a:t>Regulatory Strategy</a:t>
+              <a:t>Think globally and find a favorable market (the “beach head”) among regulated and non-regulated markets</a:t>
+            </a:r>
+          </a:p>
+          <a:p>
+            <a:pPr lvl="1"/>
+            <a:r>
+              <a:rPr lang="en-US" dirty="0"/>
+              <a:t>Identify adoption barriers to reach the required market readiness</a:t>
             </a:r>
           </a:p>
         </p:txBody>
@@ -8643,55 +9031,10 @@
           </a:p>
         </p:txBody>
       </p:sp>
-      <p:pic>
-        <p:nvPicPr>
-          <p:cNvPr id="1026" name="Picture 2">
-            <a:extLst>
-              <a:ext uri="{FF2B5EF4-FFF2-40B4-BE49-F238E27FC236}">
-                <a16:creationId xmlns:a16="http://schemas.microsoft.com/office/drawing/2014/main" id="{B1D53DBF-F4BF-34CC-00CD-3C514F3A2C2A}"/>
-              </a:ext>
-            </a:extLst>
-          </p:cNvPr>
-          <p:cNvPicPr>
-            <a:picLocks noChangeAspect="1" noChangeArrowheads="1"/>
-          </p:cNvPicPr>
-          <p:nvPr/>
-        </p:nvPicPr>
-        <p:blipFill rotWithShape="1">
-          <a:blip r:embed="rId2">
-            <a:extLst>
-              <a:ext uri="{28A0092B-C50C-407E-A947-70E740481C1C}">
-                <a14:useLocalDpi xmlns:a14="http://schemas.microsoft.com/office/drawing/2010/main" val="0"/>
-              </a:ext>
-            </a:extLst>
-          </a:blip>
-          <a:srcRect l="17239" t="3090" r="54746" b="80476"/>
-          <a:stretch/>
-        </p:blipFill>
-        <p:spPr bwMode="auto">
-          <a:xfrm>
-            <a:off x="796574" y="3446254"/>
-            <a:ext cx="1405055" cy="1154530"/>
-          </a:xfrm>
-          <a:prstGeom prst="rect">
-            <a:avLst/>
-          </a:prstGeom>
-          <a:noFill/>
-          <a:extLst>
-            <a:ext uri="{909E8E84-426E-40DD-AFC4-6F175D3DCCD1}">
-              <a14:hiddenFill xmlns:a14="http://schemas.microsoft.com/office/drawing/2010/main">
-                <a:solidFill>
-                  <a:srgbClr val="FFFFFF"/>
-                </a:solidFill>
-              </a14:hiddenFill>
-            </a:ext>
-          </a:extLst>
-        </p:spPr>
-      </p:pic>
     </p:spTree>
     <p:extLst>
       <p:ext uri="{BB962C8B-B14F-4D97-AF65-F5344CB8AC3E}">
-        <p14:creationId xmlns:p14="http://schemas.microsoft.com/office/powerpoint/2010/main" val="664015928"/>
+        <p14:creationId xmlns:p14="http://schemas.microsoft.com/office/powerpoint/2010/main" val="4087401635"/>
       </p:ext>
     </p:extLst>
   </p:cSld>

</xml_diff>

<commit_message>
Minor updates to Training Material DOC-201
</commit_message>
<xml_diff>
--- a/2. Design and Development/DOC-201 - Training Systems Engineering.pptx
+++ b/2. Design and Development/DOC-201 - Training Systems Engineering.pptx
@@ -5,7 +5,7 @@
     <p:sldMasterId id="2147483648" r:id="rId1"/>
   </p:sldMasterIdLst>
   <p:notesMasterIdLst>
-    <p:notesMasterId r:id="rId22"/>
+    <p:notesMasterId r:id="rId26"/>
   </p:notesMasterIdLst>
   <p:sldIdLst>
     <p:sldId id="256" r:id="rId2"/>
@@ -25,9 +25,13 @@
     <p:sldId id="263" r:id="rId16"/>
     <p:sldId id="269" r:id="rId17"/>
     <p:sldId id="271" r:id="rId18"/>
-    <p:sldId id="276" r:id="rId19"/>
-    <p:sldId id="278" r:id="rId20"/>
-    <p:sldId id="279" r:id="rId21"/>
+    <p:sldId id="283" r:id="rId19"/>
+    <p:sldId id="284" r:id="rId20"/>
+    <p:sldId id="285" r:id="rId21"/>
+    <p:sldId id="286" r:id="rId22"/>
+    <p:sldId id="276" r:id="rId23"/>
+    <p:sldId id="278" r:id="rId24"/>
+    <p:sldId id="279" r:id="rId25"/>
   </p:sldIdLst>
   <p:sldSz cx="12192000" cy="6858000"/>
   <p:notesSz cx="6858000" cy="9144000"/>
@@ -216,7 +220,7 @@
           <a:p>
             <a:fld id="{5464E162-CBEC-4925-93AE-447FF31D8791}" type="datetimeFigureOut">
               <a:rPr lang="en-US" smtClean="0"/>
-              <a:t>6/18/25</a:t>
+              <a:t>8/10/25</a:t>
             </a:fld>
             <a:endParaRPr lang="en-US"/>
           </a:p>
@@ -5159,7 +5163,7 @@
           <a:p>
             <a:r>
               <a:rPr lang="en-US" dirty="0"/>
-              <a:t>Requirements</a:t>
+              <a:t>System Model: RFLP</a:t>
             </a:r>
           </a:p>
         </p:txBody>
@@ -5177,25 +5181,148 @@
         <p:spPr/>
         <p:txBody>
           <a:bodyPr>
-            <a:normAutofit/>
+            <a:normAutofit fontScale="70000" lnSpcReduction="20000"/>
           </a:bodyPr>
           <a:lstStyle/>
           <a:p>
             <a:r>
               <a:rPr lang="en-US" dirty="0"/>
-              <a:t>must</a:t>
-            </a:r>
-          </a:p>
-          <a:p>
-            <a:r>
-              <a:rPr lang="en-US" dirty="0"/>
-              <a:t>shall</a:t>
-            </a:r>
-          </a:p>
-          <a:p>
-            <a:r>
-              <a:rPr lang="en-US" dirty="0"/>
-              <a:t>should</a:t>
+              <a:t>Requirements:</a:t>
+            </a:r>
+            <a:br>
+              <a:rPr lang="en-US" dirty="0"/>
+            </a:br>
+            <a:r>
+              <a:rPr lang="en-US" dirty="0"/>
+              <a:t>“The system shall generate a 3D patient-specific model of the teeth from intraoral videos in real-time.”</a:t>
+            </a:r>
+          </a:p>
+          <a:p>
+            <a:pPr lvl="1"/>
+            <a:r>
+              <a:rPr lang="en-US" dirty="0"/>
+              <a:t>Wording:</a:t>
+            </a:r>
+          </a:p>
+          <a:p>
+            <a:pPr lvl="2"/>
+            <a:r>
+              <a:rPr lang="en-US" dirty="0"/>
+              <a:t>shall (mandatory requirement)</a:t>
+            </a:r>
+          </a:p>
+          <a:p>
+            <a:pPr lvl="2"/>
+            <a:r>
+              <a:rPr lang="en-US" dirty="0"/>
+              <a:t>should (goal)</a:t>
+            </a:r>
+          </a:p>
+          <a:p>
+            <a:pPr lvl="2"/>
+            <a:r>
+              <a:rPr lang="en-US" dirty="0"/>
+              <a:t>not commonly used, to be defined if used: must, will</a:t>
+            </a:r>
+          </a:p>
+          <a:p>
+            <a:pPr lvl="1"/>
+            <a:r>
+              <a:rPr lang="en-US" dirty="0"/>
+              <a:t>Criteria of a proper requirement:</a:t>
+            </a:r>
+          </a:p>
+          <a:p>
+            <a:pPr lvl="2"/>
+            <a:r>
+              <a:rPr lang="en-US" dirty="0"/>
+              <a:t>Clarity</a:t>
+            </a:r>
+          </a:p>
+          <a:p>
+            <a:pPr lvl="2"/>
+            <a:r>
+              <a:rPr lang="en-US" dirty="0"/>
+              <a:t>Completeness</a:t>
+            </a:r>
+          </a:p>
+          <a:p>
+            <a:pPr lvl="2"/>
+            <a:r>
+              <a:rPr lang="en-US" dirty="0"/>
+              <a:t>Compliance</a:t>
+            </a:r>
+          </a:p>
+          <a:p>
+            <a:pPr lvl="2"/>
+            <a:r>
+              <a:rPr lang="en-US" dirty="0"/>
+              <a:t>Consistency</a:t>
+            </a:r>
+          </a:p>
+          <a:p>
+            <a:pPr lvl="2"/>
+            <a:r>
+              <a:rPr lang="en-US" dirty="0"/>
+              <a:t>Traceability</a:t>
+            </a:r>
+          </a:p>
+          <a:p>
+            <a:pPr lvl="2"/>
+            <a:r>
+              <a:rPr lang="en-US" dirty="0"/>
+              <a:t>Correctness</a:t>
+            </a:r>
+          </a:p>
+          <a:p>
+            <a:pPr lvl="2"/>
+            <a:r>
+              <a:rPr lang="en-US" dirty="0"/>
+              <a:t>Functionality</a:t>
+            </a:r>
+          </a:p>
+          <a:p>
+            <a:pPr lvl="2"/>
+            <a:r>
+              <a:rPr lang="en-US" dirty="0"/>
+              <a:t>Performance</a:t>
+            </a:r>
+          </a:p>
+          <a:p>
+            <a:pPr lvl="2"/>
+            <a:r>
+              <a:rPr lang="en-US" dirty="0"/>
+              <a:t>Interfaces</a:t>
+            </a:r>
+          </a:p>
+          <a:p>
+            <a:pPr lvl="2"/>
+            <a:r>
+              <a:rPr lang="en-US" dirty="0"/>
+              <a:t>Maintainability</a:t>
+            </a:r>
+          </a:p>
+          <a:p>
+            <a:pPr lvl="2"/>
+            <a:r>
+              <a:rPr lang="en-US" dirty="0"/>
+              <a:t>Reliability</a:t>
+            </a:r>
+          </a:p>
+          <a:p>
+            <a:pPr lvl="2"/>
+            <a:r>
+              <a:rPr lang="en-US" dirty="0"/>
+              <a:t>Verifiability/Testability</a:t>
+            </a:r>
+          </a:p>
+          <a:p>
+            <a:pPr marL="914400" lvl="2" indent="0">
+              <a:buNone/>
+            </a:pPr>
+            <a:r>
+              <a:rPr lang="en-US" dirty="0"/>
+              <a:t>These and more, see [NASA Systems Engineering Handbook, Appendix C: How to Write a Good Requirement]</a:t>
             </a:r>
           </a:p>
         </p:txBody>
@@ -5243,7 +5370,13 @@
   <p:cSld>
     <p:spTree>
       <p:nvGrpSpPr>
-        <p:cNvPr id="1" name=""/>
+        <p:cNvPr id="1" name="">
+          <a:extLst>
+            <a:ext uri="{FF2B5EF4-FFF2-40B4-BE49-F238E27FC236}">
+              <a16:creationId xmlns:a16="http://schemas.microsoft.com/office/drawing/2014/main" id="{AB7B8BF5-BEED-FC70-72C0-90CF80F3D158}"/>
+            </a:ext>
+          </a:extLst>
+        </p:cNvPr>
         <p:cNvGrpSpPr/>
         <p:nvPr/>
       </p:nvGrpSpPr>
@@ -5257,7 +5390,13 @@
       </p:grpSpPr>
       <p:sp>
         <p:nvSpPr>
-          <p:cNvPr id="2" name="Title 1"/>
+          <p:cNvPr id="2" name="Title 1">
+            <a:extLst>
+              <a:ext uri="{FF2B5EF4-FFF2-40B4-BE49-F238E27FC236}">
+                <a16:creationId xmlns:a16="http://schemas.microsoft.com/office/drawing/2014/main" id="{13CEA609-FCB1-8EF8-21DE-E9239002131A}"/>
+              </a:ext>
+            </a:extLst>
+          </p:cNvPr>
           <p:cNvSpPr>
             <a:spLocks noGrp="1"/>
           </p:cNvSpPr>
@@ -5272,14 +5411,20 @@
           <a:p>
             <a:r>
               <a:rPr lang="en-US" dirty="0"/>
-              <a:t>System Design Concepts Full-Stack Web</a:t>
-            </a:r>
-          </a:p>
-        </p:txBody>
-      </p:sp>
-      <p:sp>
-        <p:nvSpPr>
-          <p:cNvPr id="3" name="Content Placeholder 2"/>
+              <a:t>System Model: RFLP</a:t>
+            </a:r>
+          </a:p>
+        </p:txBody>
+      </p:sp>
+      <p:sp>
+        <p:nvSpPr>
+          <p:cNvPr id="3" name="Content Placeholder 2">
+            <a:extLst>
+              <a:ext uri="{FF2B5EF4-FFF2-40B4-BE49-F238E27FC236}">
+                <a16:creationId xmlns:a16="http://schemas.microsoft.com/office/drawing/2014/main" id="{C0F12FCC-1C8F-57F0-A037-E8CF48B72F19}"/>
+              </a:ext>
+            </a:extLst>
+          </p:cNvPr>
           <p:cNvSpPr>
             <a:spLocks noGrp="1"/>
           </p:cNvSpPr>
@@ -5287,186 +5432,43 @@
             <p:ph idx="1"/>
           </p:nvPr>
         </p:nvSpPr>
-        <p:spPr>
-          <a:xfrm>
-            <a:off x="838200" y="1825625"/>
-            <a:ext cx="10515600" cy="4071700"/>
-          </a:xfrm>
-        </p:spPr>
+        <p:spPr/>
         <p:txBody>
           <a:bodyPr>
-            <a:normAutofit fontScale="55000" lnSpcReduction="20000"/>
+            <a:normAutofit/>
           </a:bodyPr>
           <a:lstStyle/>
           <a:p>
             <a:r>
               <a:rPr lang="en-US" dirty="0"/>
-              <a:t>Full-stack web programming includes:</a:t>
+              <a:t>Functional architecture</a:t>
             </a:r>
           </a:p>
           <a:p>
             <a:pPr lvl="1"/>
             <a:r>
               <a:rPr lang="en-US" dirty="0"/>
-              <a:t>front-end: client software (e.g. JavaScript, jQuery, Angular, Vue)</a:t>
+              <a:t>Functional flow block diagram</a:t>
             </a:r>
           </a:p>
           <a:p>
             <a:pPr lvl="1"/>
             <a:r>
               <a:rPr lang="en-US" dirty="0"/>
-              <a:t>back-end: server software (e.g. PHP, ASP, Python, Node) including databases (e.g. SQL, SQLite, MongoDB)</a:t>
-            </a:r>
-          </a:p>
-          <a:p>
-            <a:r>
-              <a:rPr lang="en-US" dirty="0"/>
-              <a:t>Standard design concepts:</a:t>
-            </a:r>
-          </a:p>
-          <a:p>
-            <a:pPr lvl="1"/>
-            <a:r>
-              <a:rPr lang="en-US" dirty="0"/>
-              <a:t>web server:</a:t>
-            </a:r>
-          </a:p>
-          <a:p>
-            <a:pPr lvl="2"/>
-            <a:r>
-              <a:rPr lang="en-US" dirty="0"/>
-              <a:t>Load balancing: distribute traffic to multiple servers, e.g. DNS load balancing (resolve website to multiple IP addresses)</a:t>
-            </a:r>
-          </a:p>
-          <a:p>
-            <a:pPr lvl="1"/>
-            <a:r>
-              <a:rPr lang="en-US" dirty="0"/>
-              <a:t>static assets servers (images/videos)</a:t>
-            </a:r>
-          </a:p>
-          <a:p>
-            <a:pPr lvl="2"/>
-            <a:r>
-              <a:rPr lang="en-US" dirty="0"/>
-              <a:t>content delivery networks: global network of caching servers makes accessing content quick, e.g. pool technique: first user fetches the file, then it remains in cache.</a:t>
-            </a:r>
-          </a:p>
-          <a:p>
-            <a:pPr lvl="2"/>
-            <a:r>
-              <a:rPr lang="en-US" dirty="0"/>
-              <a:t>Distributed file systems (e.g. for users to upload images), e.g. Amazon S3</a:t>
-            </a:r>
-          </a:p>
-          <a:p>
-            <a:pPr lvl="1"/>
-            <a:r>
-              <a:rPr lang="en-US" dirty="0"/>
-              <a:t>database server:</a:t>
-            </a:r>
-          </a:p>
-          <a:p>
-            <a:pPr lvl="2"/>
-            <a:r>
-              <a:rPr lang="en-US" dirty="0"/>
-              <a:t>Use caching services: place popular data in caching layer instead of slow disk (e.g. NYT website). </a:t>
-            </a:r>
-          </a:p>
-          <a:p>
-            <a:pPr lvl="2"/>
-            <a:r>
-              <a:rPr lang="en-US" dirty="0" err="1"/>
-              <a:t>Indicing</a:t>
-            </a:r>
-            <a:r>
-              <a:rPr lang="en-US" dirty="0"/>
-              <a:t> using database schema design: the index points to the data record; use composite indices (an index table, e.g. sorted by longitude, latitude, last active) to make queries fast</a:t>
-            </a:r>
-          </a:p>
-          <a:p>
-            <a:pPr lvl="2"/>
-            <a:r>
-              <a:rPr lang="en-US" dirty="0"/>
-              <a:t>Slave-master replication: only master used to write to, slave databases replicate master for read-only (with a delay). To avoid delay for high priority request, read from master or a cache that is always up-to-date.</a:t>
-            </a:r>
-          </a:p>
-          <a:p>
-            <a:pPr lvl="2"/>
-            <a:r>
-              <a:rPr lang="en-US" dirty="0"/>
-              <a:t>Database </a:t>
-            </a:r>
-            <a:r>
-              <a:rPr lang="en-US" dirty="0" err="1"/>
-              <a:t>sharding</a:t>
-            </a:r>
-            <a:r>
-              <a:rPr lang="en-US" dirty="0"/>
-              <a:t>: split database into master databases on multiple servers.</a:t>
-            </a:r>
-          </a:p>
-          <a:p>
-            <a:pPr lvl="3"/>
-            <a:r>
-              <a:rPr lang="en-US" dirty="0"/>
-              <a:t>Allows lots of users write to the database simultaneously (e.g. Twitter)</a:t>
-            </a:r>
-          </a:p>
-          <a:p>
-            <a:pPr lvl="3"/>
-            <a:r>
-              <a:rPr lang="en-US" dirty="0" err="1"/>
-              <a:t>Verticle</a:t>
-            </a:r>
-            <a:r>
-              <a:rPr lang="en-US" dirty="0"/>
-              <a:t>: split into databases with different information (users, tweets, comments)</a:t>
-            </a:r>
-          </a:p>
-          <a:p>
-            <a:pPr lvl="3"/>
-            <a:r>
-              <a:rPr lang="en-US" dirty="0"/>
-              <a:t>Horizontal: split same content (e.g. tweets) over multiple machines, method: e.g. </a:t>
-            </a:r>
-            <a:r>
-              <a:rPr lang="en-US" dirty="0" err="1"/>
-              <a:t>userID</a:t>
-            </a:r>
-            <a:r>
-              <a:rPr lang="en-US" dirty="0"/>
-              <a:t> MOD N =&gt; server</a:t>
-            </a:r>
-          </a:p>
-          <a:p>
-            <a:pPr lvl="2"/>
-            <a:r>
-              <a:rPr lang="en-US" dirty="0"/>
-              <a:t>NoSQL databases: not relational (not tables), scale automatically across multiples machines (e.g. MongoDB, Firebase).</a:t>
-            </a:r>
-          </a:p>
-          <a:p>
-            <a:pPr lvl="1"/>
-            <a:r>
-              <a:rPr lang="en-US" dirty="0"/>
-              <a:t>API design (client-server communication): consider transport mechanism (e.g. JSON or protocol buffers), security requirements, support of offline usage</a:t>
-            </a:r>
-          </a:p>
-          <a:p>
-            <a:pPr marL="457200" lvl="1" indent="0">
-              <a:buNone/>
-            </a:pPr>
-            <a:r>
-              <a:rPr lang="en-US" dirty="0"/>
-              <a:t>General remark: Simplicity comes before optimization! No two applications scale the same way. Load and usage scenarios are important.</a:t>
-            </a:r>
-          </a:p>
-        </p:txBody>
-      </p:sp>
-      <p:sp>
-        <p:nvSpPr>
-          <p:cNvPr id="4" name="Slide Number Placeholder 3"/>
+              <a:t>Acquire images =&gt; generate 3D model =&gt; clean =&gt; send for 3-D print</a:t>
+            </a:r>
+          </a:p>
+        </p:txBody>
+      </p:sp>
+      <p:sp>
+        <p:nvSpPr>
+          <p:cNvPr id="4" name="Slide Number Placeholder 3">
+            <a:extLst>
+              <a:ext uri="{FF2B5EF4-FFF2-40B4-BE49-F238E27FC236}">
+                <a16:creationId xmlns:a16="http://schemas.microsoft.com/office/drawing/2014/main" id="{BF8E6412-9A2E-1F45-2F6C-AC8D4A154128}"/>
+              </a:ext>
+            </a:extLst>
+          </p:cNvPr>
           <p:cNvSpPr>
             <a:spLocks noGrp="1"/>
           </p:cNvSpPr>
@@ -5489,45 +5491,10 @@
           </a:p>
         </p:txBody>
       </p:sp>
-      <p:sp>
-        <p:nvSpPr>
-          <p:cNvPr id="6" name="TextBox 5">
-            <a:extLst>
-              <a:ext uri="{FF2B5EF4-FFF2-40B4-BE49-F238E27FC236}">
-                <a16:creationId xmlns:a16="http://schemas.microsoft.com/office/drawing/2014/main" id="{C7C555AA-6A66-253C-E0D7-89387CBF4661}"/>
-              </a:ext>
-            </a:extLst>
-          </p:cNvPr>
-          <p:cNvSpPr txBox="1"/>
-          <p:nvPr/>
-        </p:nvSpPr>
-        <p:spPr>
-          <a:xfrm>
-            <a:off x="830029" y="5897325"/>
-            <a:ext cx="10354644" cy="338554"/>
-          </a:xfrm>
-          <a:prstGeom prst="rect">
-            <a:avLst/>
-          </a:prstGeom>
-          <a:noFill/>
-        </p:spPr>
-        <p:txBody>
-          <a:bodyPr wrap="square">
-            <a:spAutoFit/>
-          </a:bodyPr>
-          <a:lstStyle/>
-          <a:p>
-            <a:r>
-              <a:rPr lang="en-US" sz="1600" dirty="0"/>
-              <a:t>[TechLead, 2020: Systems Design Interview concepts (for software engineers / full-stack web)]</a:t>
-            </a:r>
-          </a:p>
-        </p:txBody>
-      </p:sp>
     </p:spTree>
     <p:extLst>
       <p:ext uri="{BB962C8B-B14F-4D97-AF65-F5344CB8AC3E}">
-        <p14:creationId xmlns:p14="http://schemas.microsoft.com/office/powerpoint/2010/main" val="1408404674"/>
+        <p14:creationId xmlns:p14="http://schemas.microsoft.com/office/powerpoint/2010/main" val="784144621"/>
       </p:ext>
     </p:extLst>
   </p:cSld>
@@ -5542,7 +5509,13 @@
   <p:cSld>
     <p:spTree>
       <p:nvGrpSpPr>
-        <p:cNvPr id="1" name=""/>
+        <p:cNvPr id="1" name="">
+          <a:extLst>
+            <a:ext uri="{FF2B5EF4-FFF2-40B4-BE49-F238E27FC236}">
+              <a16:creationId xmlns:a16="http://schemas.microsoft.com/office/drawing/2014/main" id="{FD1C6503-C18D-3E84-675F-99C3407DAC98}"/>
+            </a:ext>
+          </a:extLst>
+        </p:cNvPr>
         <p:cNvGrpSpPr/>
         <p:nvPr/>
       </p:nvGrpSpPr>
@@ -5556,7 +5529,13 @@
       </p:grpSpPr>
       <p:sp>
         <p:nvSpPr>
-          <p:cNvPr id="2" name="Title 1"/>
+          <p:cNvPr id="2" name="Title 1">
+            <a:extLst>
+              <a:ext uri="{FF2B5EF4-FFF2-40B4-BE49-F238E27FC236}">
+                <a16:creationId xmlns:a16="http://schemas.microsoft.com/office/drawing/2014/main" id="{0239E55C-1BA8-0FB9-7958-5B1AD15BCEBB}"/>
+              </a:ext>
+            </a:extLst>
+          </p:cNvPr>
           <p:cNvSpPr>
             <a:spLocks noGrp="1"/>
           </p:cNvSpPr>
@@ -5571,14 +5550,20 @@
           <a:p>
             <a:r>
               <a:rPr lang="en-US" dirty="0"/>
-              <a:t>Great Programming</a:t>
-            </a:r>
-          </a:p>
-        </p:txBody>
-      </p:sp>
-      <p:sp>
-        <p:nvSpPr>
-          <p:cNvPr id="3" name="Content Placeholder 2"/>
+              <a:t>System Model: RFLP</a:t>
+            </a:r>
+          </a:p>
+        </p:txBody>
+      </p:sp>
+      <p:sp>
+        <p:nvSpPr>
+          <p:cNvPr id="3" name="Content Placeholder 2">
+            <a:extLst>
+              <a:ext uri="{FF2B5EF4-FFF2-40B4-BE49-F238E27FC236}">
+                <a16:creationId xmlns:a16="http://schemas.microsoft.com/office/drawing/2014/main" id="{878C4B8E-2C56-219C-FE9A-5B27DC3CC791}"/>
+              </a:ext>
+            </a:extLst>
+          </p:cNvPr>
           <p:cNvSpPr>
             <a:spLocks noGrp="1"/>
           </p:cNvSpPr>
@@ -5586,58 +5571,36 @@
             <p:ph idx="1"/>
           </p:nvPr>
         </p:nvSpPr>
-        <p:spPr>
-          <a:xfrm>
-            <a:off x="838200" y="1825625"/>
-            <a:ext cx="10515600" cy="4071700"/>
-          </a:xfrm>
-        </p:spPr>
+        <p:spPr/>
         <p:txBody>
           <a:bodyPr>
-            <a:normAutofit fontScale="92500" lnSpcReduction="20000"/>
+            <a:normAutofit/>
           </a:bodyPr>
           <a:lstStyle/>
           <a:p>
             <a:r>
               <a:rPr lang="en-US" dirty="0"/>
-              <a:t>Great programming can be practiced.</a:t>
-            </a:r>
-          </a:p>
-          <a:p>
-            <a:r>
-              <a:rPr lang="en-US" dirty="0"/>
-              <a:t>The core art is problem decomposition (e.g. using layers of abstraction)</a:t>
-            </a:r>
-          </a:p>
-          <a:p>
-            <a:r>
-              <a:rPr lang="en-US" dirty="0"/>
-              <a:t>Classes should be deep (i.e. simple interface (cost), lots of functionality contained (benefit); shallow classes create unnecessary overhead and complexity).</a:t>
-            </a:r>
-          </a:p>
-          <a:p>
-            <a:r>
-              <a:rPr lang="en-US" dirty="0"/>
-              <a:t>Ideally write classes for a general purpose (simpler and easier to maintain, special-purpose leads to complexity from sharing information through APIs)</a:t>
-            </a:r>
-          </a:p>
-          <a:p>
-            <a:r>
-              <a:rPr lang="en-US" dirty="0"/>
-              <a:t>Ideally write APIs for a general purpose</a:t>
-            </a:r>
-          </a:p>
-          <a:p>
-            <a:r>
-              <a:rPr lang="en-US" dirty="0"/>
-              <a:t>Spend 10% to continue improving your code base (as it will automatically become more complex otherwise); ideally, after a  change, it should be designed/structured as if change had been known from the start</a:t>
-            </a:r>
-          </a:p>
-        </p:txBody>
-      </p:sp>
-      <p:sp>
-        <p:nvSpPr>
-          <p:cNvPr id="4" name="Slide Number Placeholder 3"/>
+              <a:t>Logical architecture</a:t>
+            </a:r>
+          </a:p>
+          <a:p>
+            <a:pPr lvl="1"/>
+            <a:r>
+              <a:rPr lang="en-US" dirty="0"/>
+              <a:t>Algorithms: This is also where algorithms live.</a:t>
+            </a:r>
+          </a:p>
+        </p:txBody>
+      </p:sp>
+      <p:sp>
+        <p:nvSpPr>
+          <p:cNvPr id="4" name="Slide Number Placeholder 3">
+            <a:extLst>
+              <a:ext uri="{FF2B5EF4-FFF2-40B4-BE49-F238E27FC236}">
+                <a16:creationId xmlns:a16="http://schemas.microsoft.com/office/drawing/2014/main" id="{ADF4DB5D-DE54-A70D-EEF2-4BC89970B1F8}"/>
+              </a:ext>
+            </a:extLst>
+          </p:cNvPr>
           <p:cNvSpPr>
             <a:spLocks noGrp="1"/>
           </p:cNvSpPr>
@@ -5660,53 +5623,10 @@
           </a:p>
         </p:txBody>
       </p:sp>
-      <p:sp>
-        <p:nvSpPr>
-          <p:cNvPr id="6" name="TextBox 5">
-            <a:extLst>
-              <a:ext uri="{FF2B5EF4-FFF2-40B4-BE49-F238E27FC236}">
-                <a16:creationId xmlns:a16="http://schemas.microsoft.com/office/drawing/2014/main" id="{C7C555AA-6A66-253C-E0D7-89387CBF4661}"/>
-              </a:ext>
-            </a:extLst>
-          </p:cNvPr>
-          <p:cNvSpPr txBox="1"/>
-          <p:nvPr/>
-        </p:nvSpPr>
-        <p:spPr>
-          <a:xfrm>
-            <a:off x="830029" y="5897325"/>
-            <a:ext cx="10354644" cy="338554"/>
-          </a:xfrm>
-          <a:prstGeom prst="rect">
-            <a:avLst/>
-          </a:prstGeom>
-          <a:noFill/>
-        </p:spPr>
-        <p:txBody>
-          <a:bodyPr wrap="square">
-            <a:spAutoFit/>
-          </a:bodyPr>
-          <a:lstStyle/>
-          <a:p>
-            <a:r>
-              <a:rPr lang="en-US" sz="1600" dirty="0"/>
-              <a:t>[Talk by </a:t>
-            </a:r>
-            <a:r>
-              <a:rPr lang="en-US" sz="1600" dirty="0" err="1"/>
-              <a:t>Ousterhout</a:t>
-            </a:r>
-            <a:r>
-              <a:rPr lang="en-US" sz="1600" dirty="0"/>
-              <a:t>, John related to: A Philosophy of Software Design]</a:t>
-            </a:r>
-          </a:p>
-        </p:txBody>
-      </p:sp>
     </p:spTree>
     <p:extLst>
       <p:ext uri="{BB962C8B-B14F-4D97-AF65-F5344CB8AC3E}">
-        <p14:creationId xmlns:p14="http://schemas.microsoft.com/office/powerpoint/2010/main" val="3004995272"/>
+        <p14:creationId xmlns:p14="http://schemas.microsoft.com/office/powerpoint/2010/main" val="4024856439"/>
       </p:ext>
     </p:extLst>
   </p:cSld>
@@ -5772,7 +5692,7 @@
           </a:bodyPr>
           <a:lstStyle/>
           <a:p>
-            <a:pPr marL="0" indent="0" algn="ctr">
+            <a:pPr marL="0" indent="0">
               <a:buNone/>
             </a:pPr>
             <a:r>
@@ -5781,31 +5701,19 @@
             </a:r>
           </a:p>
           <a:p>
-            <a:pPr marL="0" indent="0" algn="ctr">
+            <a:pPr marL="0" indent="0">
               <a:buNone/>
             </a:pPr>
             <a:endParaRPr lang="en-US" dirty="0"/>
           </a:p>
           <a:p>
-            <a:pPr marL="0" indent="0" algn="ctr">
+            <a:pPr marL="0" indent="0">
               <a:buNone/>
             </a:pPr>
             <a:r>
               <a:rPr lang="en-US" dirty="0"/>
               <a:t>For a treatment device, the medical device can only fulfill its intended purpose if this foundation is right.</a:t>
             </a:r>
-          </a:p>
-          <a:p>
-            <a:pPr marL="0" indent="0" algn="ctr">
-              <a:buNone/>
-            </a:pPr>
-            <a:endParaRPr lang="en-US" dirty="0"/>
-          </a:p>
-          <a:p>
-            <a:pPr marL="0" indent="0" algn="ctr">
-              <a:buNone/>
-            </a:pPr>
-            <a:endParaRPr lang="en-US" dirty="0"/>
           </a:p>
         </p:txBody>
       </p:sp>
@@ -5852,6 +5760,309 @@
   <p:cSld>
     <p:spTree>
       <p:nvGrpSpPr>
+        <p:cNvPr id="1" name="">
+          <a:extLst>
+            <a:ext uri="{FF2B5EF4-FFF2-40B4-BE49-F238E27FC236}">
+              <a16:creationId xmlns:a16="http://schemas.microsoft.com/office/drawing/2014/main" id="{8318812C-EA1C-B588-3FB0-47A77B41978D}"/>
+            </a:ext>
+          </a:extLst>
+        </p:cNvPr>
+        <p:cNvGrpSpPr/>
+        <p:nvPr/>
+      </p:nvGrpSpPr>
+      <p:grpSpPr>
+        <a:xfrm>
+          <a:off x="0" y="0"/>
+          <a:ext cx="0" cy="0"/>
+          <a:chOff x="0" y="0"/>
+          <a:chExt cx="0" cy="0"/>
+        </a:xfrm>
+      </p:grpSpPr>
+      <p:sp>
+        <p:nvSpPr>
+          <p:cNvPr id="2" name="Title 1">
+            <a:extLst>
+              <a:ext uri="{FF2B5EF4-FFF2-40B4-BE49-F238E27FC236}">
+                <a16:creationId xmlns:a16="http://schemas.microsoft.com/office/drawing/2014/main" id="{3B7D41A5-2CDB-7402-F420-DF26CD68CC11}"/>
+              </a:ext>
+            </a:extLst>
+          </p:cNvPr>
+          <p:cNvSpPr>
+            <a:spLocks noGrp="1"/>
+          </p:cNvSpPr>
+          <p:nvPr>
+            <p:ph type="title"/>
+          </p:nvPr>
+        </p:nvSpPr>
+        <p:spPr/>
+        <p:txBody>
+          <a:bodyPr/>
+          <a:lstStyle/>
+          <a:p>
+            <a:r>
+              <a:rPr lang="en-US" dirty="0"/>
+              <a:t>System Model: RFLP</a:t>
+            </a:r>
+          </a:p>
+        </p:txBody>
+      </p:sp>
+      <p:sp>
+        <p:nvSpPr>
+          <p:cNvPr id="3" name="Content Placeholder 2">
+            <a:extLst>
+              <a:ext uri="{FF2B5EF4-FFF2-40B4-BE49-F238E27FC236}">
+                <a16:creationId xmlns:a16="http://schemas.microsoft.com/office/drawing/2014/main" id="{0CF1632E-60EF-070D-499F-FB402B1FAC12}"/>
+              </a:ext>
+            </a:extLst>
+          </p:cNvPr>
+          <p:cNvSpPr>
+            <a:spLocks noGrp="1"/>
+          </p:cNvSpPr>
+          <p:nvPr>
+            <p:ph idx="1"/>
+          </p:nvPr>
+        </p:nvSpPr>
+        <p:spPr/>
+        <p:txBody>
+          <a:bodyPr>
+            <a:normAutofit/>
+          </a:bodyPr>
+          <a:lstStyle/>
+          <a:p>
+            <a:r>
+              <a:rPr lang="en-US" dirty="0"/>
+              <a:t>Physical architecture</a:t>
+            </a:r>
+          </a:p>
+          <a:p>
+            <a:pPr lvl="1"/>
+            <a:r>
+              <a:rPr lang="en-US" dirty="0"/>
+              <a:t>Design tied to specific software/hardware</a:t>
+            </a:r>
+          </a:p>
+          <a:p>
+            <a:pPr lvl="1"/>
+            <a:r>
+              <a:rPr lang="en-US" dirty="0"/>
+              <a:t>For algorithms: model weights, parameterization, or training data if deployed with the product (or if required to be provided with it as model validation traceability data)</a:t>
+            </a:r>
+          </a:p>
+          <a:p>
+            <a:pPr lvl="1"/>
+            <a:endParaRPr lang="en-US" dirty="0"/>
+          </a:p>
+        </p:txBody>
+      </p:sp>
+      <p:sp>
+        <p:nvSpPr>
+          <p:cNvPr id="4" name="Slide Number Placeholder 3">
+            <a:extLst>
+              <a:ext uri="{FF2B5EF4-FFF2-40B4-BE49-F238E27FC236}">
+                <a16:creationId xmlns:a16="http://schemas.microsoft.com/office/drawing/2014/main" id="{A28AB385-D4FA-C21D-428A-4B0D4A107369}"/>
+              </a:ext>
+            </a:extLst>
+          </p:cNvPr>
+          <p:cNvSpPr>
+            <a:spLocks noGrp="1"/>
+          </p:cNvSpPr>
+          <p:nvPr>
+            <p:ph type="sldNum" sz="quarter" idx="12"/>
+          </p:nvPr>
+        </p:nvSpPr>
+        <p:spPr/>
+        <p:txBody>
+          <a:bodyPr/>
+          <a:lstStyle/>
+          <a:p>
+            <a:pPr algn="l"/>
+            <a:fld id="{11CDFDCC-1F45-4E80-8B17-15DA0BDDC059}" type="slidenum">
+              <a:rPr lang="en-US" smtClean="0"/>
+              <a:pPr algn="l"/>
+              <a:t>20</a:t>
+            </a:fld>
+            <a:endParaRPr lang="en-US" dirty="0"/>
+          </a:p>
+        </p:txBody>
+      </p:sp>
+    </p:spTree>
+    <p:extLst>
+      <p:ext uri="{BB962C8B-B14F-4D97-AF65-F5344CB8AC3E}">
+        <p14:creationId xmlns:p14="http://schemas.microsoft.com/office/powerpoint/2010/main" val="159412436"/>
+      </p:ext>
+    </p:extLst>
+  </p:cSld>
+  <p:clrMapOvr>
+    <a:masterClrMapping/>
+  </p:clrMapOvr>
+</p:sld>
+</file>
+
+<file path=ppt/slides/slide21.xml><?xml version="1.0" encoding="utf-8"?>
+<p:sld xmlns:a="http://schemas.openxmlformats.org/drawingml/2006/main" xmlns:r="http://schemas.openxmlformats.org/officeDocument/2006/relationships" xmlns:p="http://schemas.openxmlformats.org/presentationml/2006/main">
+  <p:cSld>
+    <p:spTree>
+      <p:nvGrpSpPr>
+        <p:cNvPr id="1" name="">
+          <a:extLst>
+            <a:ext uri="{FF2B5EF4-FFF2-40B4-BE49-F238E27FC236}">
+              <a16:creationId xmlns:a16="http://schemas.microsoft.com/office/drawing/2014/main" id="{E70080C1-8C9B-0853-D7BC-AFDDAE729259}"/>
+            </a:ext>
+          </a:extLst>
+        </p:cNvPr>
+        <p:cNvGrpSpPr/>
+        <p:nvPr/>
+      </p:nvGrpSpPr>
+      <p:grpSpPr>
+        <a:xfrm>
+          <a:off x="0" y="0"/>
+          <a:ext cx="0" cy="0"/>
+          <a:chOff x="0" y="0"/>
+          <a:chExt cx="0" cy="0"/>
+        </a:xfrm>
+      </p:grpSpPr>
+      <p:sp>
+        <p:nvSpPr>
+          <p:cNvPr id="2" name="Title 1">
+            <a:extLst>
+              <a:ext uri="{FF2B5EF4-FFF2-40B4-BE49-F238E27FC236}">
+                <a16:creationId xmlns:a16="http://schemas.microsoft.com/office/drawing/2014/main" id="{8765B2F1-625C-A09E-D970-7F99DA02806A}"/>
+              </a:ext>
+            </a:extLst>
+          </p:cNvPr>
+          <p:cNvSpPr>
+            <a:spLocks noGrp="1"/>
+          </p:cNvSpPr>
+          <p:nvPr>
+            <p:ph type="title"/>
+          </p:nvPr>
+        </p:nvSpPr>
+        <p:spPr/>
+        <p:txBody>
+          <a:bodyPr/>
+          <a:lstStyle/>
+          <a:p>
+            <a:r>
+              <a:rPr lang="en-US" dirty="0"/>
+              <a:t>System Model: RFLP</a:t>
+            </a:r>
+          </a:p>
+        </p:txBody>
+      </p:sp>
+      <p:sp>
+        <p:nvSpPr>
+          <p:cNvPr id="3" name="Content Placeholder 2">
+            <a:extLst>
+              <a:ext uri="{FF2B5EF4-FFF2-40B4-BE49-F238E27FC236}">
+                <a16:creationId xmlns:a16="http://schemas.microsoft.com/office/drawing/2014/main" id="{89B6FDDB-3703-B4E1-6860-B7CDA386B4E8}"/>
+              </a:ext>
+            </a:extLst>
+          </p:cNvPr>
+          <p:cNvSpPr>
+            <a:spLocks noGrp="1"/>
+          </p:cNvSpPr>
+          <p:nvPr>
+            <p:ph idx="1"/>
+          </p:nvPr>
+        </p:nvSpPr>
+        <p:spPr/>
+        <p:txBody>
+          <a:bodyPr>
+            <a:normAutofit/>
+          </a:bodyPr>
+          <a:lstStyle/>
+          <a:p>
+            <a:r>
+              <a:rPr lang="en-US" dirty="0"/>
+              <a:t>Incremental build-up with the Feynman technique:</a:t>
+            </a:r>
+          </a:p>
+          <a:p>
+            <a:pPr lvl="1"/>
+            <a:r>
+              <a:rPr lang="en-US" dirty="0"/>
+              <a:t>Pick a concept (identify what you want to understand)</a:t>
+            </a:r>
+          </a:p>
+          <a:p>
+            <a:pPr lvl="1"/>
+            <a:r>
+              <a:rPr lang="en-US" dirty="0"/>
+              <a:t>Teach it to a child/ a novice/ .. </a:t>
+            </a:r>
+          </a:p>
+          <a:p>
+            <a:pPr lvl="1"/>
+            <a:r>
+              <a:rPr lang="en-US" dirty="0"/>
+              <a:t>Explain in very simple words, pinpoint what you don't quite know.</a:t>
+            </a:r>
+          </a:p>
+          <a:p>
+            <a:pPr lvl="1"/>
+            <a:r>
+              <a:rPr lang="en-US" dirty="0"/>
+              <a:t>Review what you have pinpointed you don't know. Study about those specific gaps. Refine and simplify.</a:t>
+            </a:r>
+          </a:p>
+          <a:p>
+            <a:pPr lvl="1"/>
+            <a:r>
+              <a:rPr lang="en-US" dirty="0"/>
+              <a:t>Restart, e.g. explain to a novice/ ..</a:t>
+            </a:r>
+          </a:p>
+        </p:txBody>
+      </p:sp>
+      <p:sp>
+        <p:nvSpPr>
+          <p:cNvPr id="4" name="Slide Number Placeholder 3">
+            <a:extLst>
+              <a:ext uri="{FF2B5EF4-FFF2-40B4-BE49-F238E27FC236}">
+                <a16:creationId xmlns:a16="http://schemas.microsoft.com/office/drawing/2014/main" id="{DBAF8154-CBEF-12A5-EE3F-124297551434}"/>
+              </a:ext>
+            </a:extLst>
+          </p:cNvPr>
+          <p:cNvSpPr>
+            <a:spLocks noGrp="1"/>
+          </p:cNvSpPr>
+          <p:nvPr>
+            <p:ph type="sldNum" sz="quarter" idx="12"/>
+          </p:nvPr>
+        </p:nvSpPr>
+        <p:spPr/>
+        <p:txBody>
+          <a:bodyPr/>
+          <a:lstStyle/>
+          <a:p>
+            <a:pPr algn="l"/>
+            <a:fld id="{11CDFDCC-1F45-4E80-8B17-15DA0BDDC059}" type="slidenum">
+              <a:rPr lang="en-US" smtClean="0"/>
+              <a:pPr algn="l"/>
+              <a:t>21</a:t>
+            </a:fld>
+            <a:endParaRPr lang="en-US" dirty="0"/>
+          </a:p>
+        </p:txBody>
+      </p:sp>
+    </p:spTree>
+    <p:extLst>
+      <p:ext uri="{BB962C8B-B14F-4D97-AF65-F5344CB8AC3E}">
+        <p14:creationId xmlns:p14="http://schemas.microsoft.com/office/powerpoint/2010/main" val="3432357209"/>
+      </p:ext>
+    </p:extLst>
+  </p:cSld>
+  <p:clrMapOvr>
+    <a:masterClrMapping/>
+  </p:clrMapOvr>
+</p:sld>
+</file>
+
+<file path=ppt/slides/slide22.xml><?xml version="1.0" encoding="utf-8"?>
+<p:sld xmlns:a="http://schemas.openxmlformats.org/drawingml/2006/main" xmlns:r="http://schemas.openxmlformats.org/officeDocument/2006/relationships" xmlns:p="http://schemas.openxmlformats.org/presentationml/2006/main">
+  <p:cSld>
+    <p:spTree>
+      <p:nvGrpSpPr>
         <p:cNvPr id="1" name=""/>
         <p:cNvGrpSpPr/>
         <p:nvPr/>
@@ -5881,7 +6092,7 @@
           <a:p>
             <a:r>
               <a:rPr lang="en-US" dirty="0"/>
-              <a:t>Effective Engineering</a:t>
+              <a:t>System Design Concepts Full-Stack Web</a:t>
             </a:r>
           </a:p>
         </p:txBody>
@@ -5904,100 +6115,172 @@
         </p:spPr>
         <p:txBody>
           <a:bodyPr>
-            <a:normAutofit fontScale="77500" lnSpcReduction="20000"/>
+            <a:normAutofit fontScale="55000" lnSpcReduction="20000"/>
           </a:bodyPr>
           <a:lstStyle/>
           <a:p>
             <a:r>
               <a:rPr lang="en-US" dirty="0"/>
-              <a:t>10x-engineers produce 10x the impact, they do not work 10x the hours. </a:t>
-            </a:r>
-          </a:p>
-          <a:p>
-            <a:r>
-              <a:rPr lang="en-US" dirty="0"/>
-              <a:t>These engineers, per observation:</a:t>
+              <a:t>Full-stack web programming includes:</a:t>
             </a:r>
           </a:p>
           <a:p>
             <a:pPr lvl="1"/>
             <a:r>
               <a:rPr lang="en-US" dirty="0"/>
-              <a:t>Focus on big levers (work on what has the most impact), e.g. reduce complexity in design, do unit tests where they are most relevant, ..</a:t>
+              <a:t>front-end: client software (e.g. JavaScript, jQuery, Angular, Vue)</a:t>
             </a:r>
           </a:p>
           <a:p>
             <a:pPr lvl="1"/>
             <a:r>
               <a:rPr lang="en-US" dirty="0"/>
-              <a:t>Optimize for learning (use opportunities to learn, educate themselves, do side projects, ..)</a:t>
+              <a:t>back-end: server software (e.g. PHP, ASP, Python, Node) including databases (e.g. SQL, SQLite, MongoDB)</a:t>
+            </a:r>
+          </a:p>
+          <a:p>
+            <a:r>
+              <a:rPr lang="en-US" dirty="0"/>
+              <a:t>Standard design concepts:</a:t>
             </a:r>
           </a:p>
           <a:p>
             <a:pPr lvl="1"/>
             <a:r>
               <a:rPr lang="en-US" dirty="0"/>
-              <a:t>Invest in iteration speed (learn and provide tooling, create tools when you need to do something twice, fasten build processes, [learn to focus and complete things in time] ..)</a:t>
+              <a:t>web server:</a:t>
+            </a:r>
+          </a:p>
+          <a:p>
+            <a:pPr lvl="2"/>
+            <a:r>
+              <a:rPr lang="en-US" dirty="0"/>
+              <a:t>Load balancing: distribute traffic to multiple servers, e.g. DNS load balancing (resolve website to multiple IP addresses)</a:t>
             </a:r>
           </a:p>
           <a:p>
             <a:pPr lvl="1"/>
             <a:r>
               <a:rPr lang="en-US" dirty="0"/>
-              <a:t>Validate your ideas aggressively and iteratively, validate the assumptions that go into your ideas (this is sometimes very simple to do)</a:t>
+              <a:t>static assets servers (images/videos)</a:t>
+            </a:r>
+          </a:p>
+          <a:p>
+            <a:pPr lvl="2"/>
+            <a:r>
+              <a:rPr lang="en-US" dirty="0"/>
+              <a:t>content delivery networks: global network of caching servers makes accessing content quick, e.g. pool technique: first user fetches the file, then it remains in cache.</a:t>
+            </a:r>
+          </a:p>
+          <a:p>
+            <a:pPr lvl="2"/>
+            <a:r>
+              <a:rPr lang="en-US" dirty="0"/>
+              <a:t>Distributed file systems (e.g. for users to upload images), e.g. Amazon S3</a:t>
             </a:r>
           </a:p>
           <a:p>
             <a:pPr lvl="1"/>
             <a:r>
               <a:rPr lang="en-US" dirty="0"/>
-              <a:t>Reduce complexity:</a:t>
+              <a:t>database server:</a:t>
             </a:r>
           </a:p>
           <a:p>
             <a:pPr lvl="2"/>
             <a:r>
               <a:rPr lang="en-US" dirty="0"/>
-              <a:t>Code and system complexity (easier-to-maintain, easier-to-learn for beginners)</a:t>
+              <a:t>Use caching services: place popular data in caching layer instead of slow disk (e.g. NYT website). </a:t>
             </a:r>
           </a:p>
           <a:p>
             <a:pPr lvl="2"/>
             <a:r>
-              <a:rPr lang="en-US" dirty="0"/>
-              <a:t>Product complexity (no clear vision; each feature adds a lot to that)</a:t>
+              <a:rPr lang="en-US" dirty="0" err="1"/>
+              <a:t>Indicing</a:t>
+            </a:r>
+            <a:r>
+              <a:rPr lang="en-US" dirty="0"/>
+              <a:t> using database schema design: the index points to the data record; use composite indices (an index table, e.g. sorted by longitude, latitude, last active) to make queries fast</a:t>
             </a:r>
           </a:p>
           <a:p>
             <a:pPr lvl="2"/>
             <a:r>
               <a:rPr lang="en-US" dirty="0"/>
-              <a:t>Minimize operational burden (at its core, this is a cost of code complexity). With organizational complexity, quality and motivation goes down due to lack of feedback/work in isolation, bus factor goes down.</a:t>
+              <a:t>Slave-master replication: only master used to write to, slave databases replicate master for read-only (with a delay). To avoid delay for high priority request, read from master or a cache that is always up-to-date.</a:t>
+            </a:r>
+          </a:p>
+          <a:p>
+            <a:pPr lvl="2"/>
+            <a:r>
+              <a:rPr lang="en-US" dirty="0"/>
+              <a:t>Database </a:t>
+            </a:r>
+            <a:r>
+              <a:rPr lang="en-US" dirty="0" err="1"/>
+              <a:t>sharding</a:t>
+            </a:r>
+            <a:r>
+              <a:rPr lang="en-US" dirty="0"/>
+              <a:t>: split database into master databases on multiple servers.</a:t>
+            </a:r>
+          </a:p>
+          <a:p>
+            <a:pPr lvl="3"/>
+            <a:r>
+              <a:rPr lang="en-US" dirty="0"/>
+              <a:t>Allows lots of users write to the database simultaneously (e.g. Twitter)</a:t>
+            </a:r>
+          </a:p>
+          <a:p>
+            <a:pPr lvl="3"/>
+            <a:r>
+              <a:rPr lang="en-US" dirty="0" err="1"/>
+              <a:t>Verticle</a:t>
+            </a:r>
+            <a:r>
+              <a:rPr lang="en-US" dirty="0"/>
+              <a:t>: split into databases with different information (users, tweets, comments)</a:t>
+            </a:r>
+          </a:p>
+          <a:p>
+            <a:pPr lvl="3"/>
+            <a:r>
+              <a:rPr lang="en-US" dirty="0"/>
+              <a:t>Horizontal: split same content (e.g. tweets) over multiple machines, method: e.g. </a:t>
+            </a:r>
+            <a:r>
+              <a:rPr lang="en-US" dirty="0" err="1"/>
+              <a:t>userID</a:t>
+            </a:r>
+            <a:r>
+              <a:rPr lang="en-US" dirty="0"/>
+              <a:t> MOD N =&gt; server</a:t>
+            </a:r>
+          </a:p>
+          <a:p>
+            <a:pPr lvl="2"/>
+            <a:r>
+              <a:rPr lang="en-US" dirty="0"/>
+              <a:t>NoSQL databases: not relational (not tables), scale automatically across multiples machines (e.g. MongoDB, Firebase).</a:t>
             </a:r>
           </a:p>
           <a:p>
             <a:pPr lvl="1"/>
             <a:r>
               <a:rPr lang="en-US" dirty="0"/>
-              <a:t>Build a great engineering culture</a:t>
-            </a:r>
-          </a:p>
-          <a:p>
-            <a:pPr lvl="2"/>
-            <a:r>
-              <a:rPr lang="en-US" dirty="0"/>
-              <a:t>Candidates like companies with all of the above.</a:t>
-            </a:r>
-          </a:p>
-          <a:p>
-            <a:pPr lvl="2"/>
-            <a:r>
-              <a:rPr lang="en-US" dirty="0"/>
-              <a:t>Resource conflicts: communicate between teams on their priorities. Align priorities, otherwise, understand them to see if possibly your team has to do some of the low-priority work of others</a:t>
-            </a:r>
-          </a:p>
-          <a:p>
-            <a:endParaRPr lang="en-US" dirty="0"/>
+              <a:t>API design (client-server communication): consider transport mechanism (e.g. JSON or protocol buffers), security requirements, support of offline usage</a:t>
+            </a:r>
+          </a:p>
+          <a:p>
+            <a:pPr marL="457200" lvl="1" indent="0">
+              <a:buNone/>
+            </a:pPr>
+            <a:r>
+              <a:rPr lang="en-US" dirty="0"/>
+              <a:t>General remark: Simplicity comes before optimization! No two applications scale the same way. Load and usage scenarios are important.</a:t>
+            </a:r>
           </a:p>
         </p:txBody>
       </p:sp>
@@ -6020,7 +6303,413 @@
             <a:fld id="{11CDFDCC-1F45-4E80-8B17-15DA0BDDC059}" type="slidenum">
               <a:rPr lang="en-US" smtClean="0"/>
               <a:pPr algn="l"/>
-              <a:t>20</a:t>
+              <a:t>22</a:t>
+            </a:fld>
+            <a:endParaRPr lang="en-US" dirty="0"/>
+          </a:p>
+        </p:txBody>
+      </p:sp>
+      <p:sp>
+        <p:nvSpPr>
+          <p:cNvPr id="6" name="TextBox 5">
+            <a:extLst>
+              <a:ext uri="{FF2B5EF4-FFF2-40B4-BE49-F238E27FC236}">
+                <a16:creationId xmlns:a16="http://schemas.microsoft.com/office/drawing/2014/main" id="{C7C555AA-6A66-253C-E0D7-89387CBF4661}"/>
+              </a:ext>
+            </a:extLst>
+          </p:cNvPr>
+          <p:cNvSpPr txBox="1"/>
+          <p:nvPr/>
+        </p:nvSpPr>
+        <p:spPr>
+          <a:xfrm>
+            <a:off x="830029" y="5897325"/>
+            <a:ext cx="10354644" cy="338554"/>
+          </a:xfrm>
+          <a:prstGeom prst="rect">
+            <a:avLst/>
+          </a:prstGeom>
+          <a:noFill/>
+        </p:spPr>
+        <p:txBody>
+          <a:bodyPr wrap="square">
+            <a:spAutoFit/>
+          </a:bodyPr>
+          <a:lstStyle/>
+          <a:p>
+            <a:r>
+              <a:rPr lang="en-US" sz="1600" dirty="0"/>
+              <a:t>[TechLead, 2020: Systems Design Interview concepts (for software engineers / full-stack web)]</a:t>
+            </a:r>
+          </a:p>
+        </p:txBody>
+      </p:sp>
+    </p:spTree>
+    <p:extLst>
+      <p:ext uri="{BB962C8B-B14F-4D97-AF65-F5344CB8AC3E}">
+        <p14:creationId xmlns:p14="http://schemas.microsoft.com/office/powerpoint/2010/main" val="1408404674"/>
+      </p:ext>
+    </p:extLst>
+  </p:cSld>
+  <p:clrMapOvr>
+    <a:masterClrMapping/>
+  </p:clrMapOvr>
+</p:sld>
+</file>
+
+<file path=ppt/slides/slide23.xml><?xml version="1.0" encoding="utf-8"?>
+<p:sld xmlns:a="http://schemas.openxmlformats.org/drawingml/2006/main" xmlns:r="http://schemas.openxmlformats.org/officeDocument/2006/relationships" xmlns:p="http://schemas.openxmlformats.org/presentationml/2006/main">
+  <p:cSld>
+    <p:spTree>
+      <p:nvGrpSpPr>
+        <p:cNvPr id="1" name=""/>
+        <p:cNvGrpSpPr/>
+        <p:nvPr/>
+      </p:nvGrpSpPr>
+      <p:grpSpPr>
+        <a:xfrm>
+          <a:off x="0" y="0"/>
+          <a:ext cx="0" cy="0"/>
+          <a:chOff x="0" y="0"/>
+          <a:chExt cx="0" cy="0"/>
+        </a:xfrm>
+      </p:grpSpPr>
+      <p:sp>
+        <p:nvSpPr>
+          <p:cNvPr id="2" name="Title 1"/>
+          <p:cNvSpPr>
+            <a:spLocks noGrp="1"/>
+          </p:cNvSpPr>
+          <p:nvPr>
+            <p:ph type="title"/>
+          </p:nvPr>
+        </p:nvSpPr>
+        <p:spPr/>
+        <p:txBody>
+          <a:bodyPr/>
+          <a:lstStyle/>
+          <a:p>
+            <a:r>
+              <a:rPr lang="en-US" dirty="0"/>
+              <a:t>Great Programming</a:t>
+            </a:r>
+          </a:p>
+        </p:txBody>
+      </p:sp>
+      <p:sp>
+        <p:nvSpPr>
+          <p:cNvPr id="3" name="Content Placeholder 2"/>
+          <p:cNvSpPr>
+            <a:spLocks noGrp="1"/>
+          </p:cNvSpPr>
+          <p:nvPr>
+            <p:ph idx="1"/>
+          </p:nvPr>
+        </p:nvSpPr>
+        <p:spPr>
+          <a:xfrm>
+            <a:off x="838200" y="1825625"/>
+            <a:ext cx="10515600" cy="4071700"/>
+          </a:xfrm>
+        </p:spPr>
+        <p:txBody>
+          <a:bodyPr>
+            <a:normAutofit fontScale="92500" lnSpcReduction="20000"/>
+          </a:bodyPr>
+          <a:lstStyle/>
+          <a:p>
+            <a:r>
+              <a:rPr lang="en-US" dirty="0"/>
+              <a:t>Great programming can be practiced.</a:t>
+            </a:r>
+          </a:p>
+          <a:p>
+            <a:r>
+              <a:rPr lang="en-US" dirty="0"/>
+              <a:t>The core art is problem decomposition (e.g. using layers of abstraction)</a:t>
+            </a:r>
+          </a:p>
+          <a:p>
+            <a:r>
+              <a:rPr lang="en-US" dirty="0"/>
+              <a:t>Classes should be deep (i.e. simple interface (cost), lots of functionality contained (benefit); shallow classes create unnecessary overhead and complexity).</a:t>
+            </a:r>
+          </a:p>
+          <a:p>
+            <a:r>
+              <a:rPr lang="en-US" dirty="0"/>
+              <a:t>Ideally write classes for a general purpose (simpler and easier to maintain, special-purpose leads to complexity from sharing information through APIs)</a:t>
+            </a:r>
+          </a:p>
+          <a:p>
+            <a:r>
+              <a:rPr lang="en-US" dirty="0"/>
+              <a:t>Ideally write APIs for a general purpose</a:t>
+            </a:r>
+          </a:p>
+          <a:p>
+            <a:r>
+              <a:rPr lang="en-US" dirty="0"/>
+              <a:t>Spend 10% to continue improving your code base (as it will automatically become more complex otherwise); ideally, after a  change, it should be designed/structured as if change had been known from the start</a:t>
+            </a:r>
+          </a:p>
+        </p:txBody>
+      </p:sp>
+      <p:sp>
+        <p:nvSpPr>
+          <p:cNvPr id="4" name="Slide Number Placeholder 3"/>
+          <p:cNvSpPr>
+            <a:spLocks noGrp="1"/>
+          </p:cNvSpPr>
+          <p:nvPr>
+            <p:ph type="sldNum" sz="quarter" idx="12"/>
+          </p:nvPr>
+        </p:nvSpPr>
+        <p:spPr/>
+        <p:txBody>
+          <a:bodyPr/>
+          <a:lstStyle/>
+          <a:p>
+            <a:pPr algn="l"/>
+            <a:fld id="{11CDFDCC-1F45-4E80-8B17-15DA0BDDC059}" type="slidenum">
+              <a:rPr lang="en-US" smtClean="0"/>
+              <a:pPr algn="l"/>
+              <a:t>23</a:t>
+            </a:fld>
+            <a:endParaRPr lang="en-US" dirty="0"/>
+          </a:p>
+        </p:txBody>
+      </p:sp>
+      <p:sp>
+        <p:nvSpPr>
+          <p:cNvPr id="6" name="TextBox 5">
+            <a:extLst>
+              <a:ext uri="{FF2B5EF4-FFF2-40B4-BE49-F238E27FC236}">
+                <a16:creationId xmlns:a16="http://schemas.microsoft.com/office/drawing/2014/main" id="{C7C555AA-6A66-253C-E0D7-89387CBF4661}"/>
+              </a:ext>
+            </a:extLst>
+          </p:cNvPr>
+          <p:cNvSpPr txBox="1"/>
+          <p:nvPr/>
+        </p:nvSpPr>
+        <p:spPr>
+          <a:xfrm>
+            <a:off x="830029" y="5897325"/>
+            <a:ext cx="10354644" cy="338554"/>
+          </a:xfrm>
+          <a:prstGeom prst="rect">
+            <a:avLst/>
+          </a:prstGeom>
+          <a:noFill/>
+        </p:spPr>
+        <p:txBody>
+          <a:bodyPr wrap="square">
+            <a:spAutoFit/>
+          </a:bodyPr>
+          <a:lstStyle/>
+          <a:p>
+            <a:r>
+              <a:rPr lang="en-US" sz="1600" dirty="0"/>
+              <a:t>[Talk by </a:t>
+            </a:r>
+            <a:r>
+              <a:rPr lang="en-US" sz="1600" dirty="0" err="1"/>
+              <a:t>Ousterhout</a:t>
+            </a:r>
+            <a:r>
+              <a:rPr lang="en-US" sz="1600" dirty="0"/>
+              <a:t>, John related to: A Philosophy of Software Design]</a:t>
+            </a:r>
+          </a:p>
+        </p:txBody>
+      </p:sp>
+    </p:spTree>
+    <p:extLst>
+      <p:ext uri="{BB962C8B-B14F-4D97-AF65-F5344CB8AC3E}">
+        <p14:creationId xmlns:p14="http://schemas.microsoft.com/office/powerpoint/2010/main" val="3004995272"/>
+      </p:ext>
+    </p:extLst>
+  </p:cSld>
+  <p:clrMapOvr>
+    <a:masterClrMapping/>
+  </p:clrMapOvr>
+</p:sld>
+</file>
+
+<file path=ppt/slides/slide24.xml><?xml version="1.0" encoding="utf-8"?>
+<p:sld xmlns:a="http://schemas.openxmlformats.org/drawingml/2006/main" xmlns:r="http://schemas.openxmlformats.org/officeDocument/2006/relationships" xmlns:p="http://schemas.openxmlformats.org/presentationml/2006/main">
+  <p:cSld>
+    <p:spTree>
+      <p:nvGrpSpPr>
+        <p:cNvPr id="1" name=""/>
+        <p:cNvGrpSpPr/>
+        <p:nvPr/>
+      </p:nvGrpSpPr>
+      <p:grpSpPr>
+        <a:xfrm>
+          <a:off x="0" y="0"/>
+          <a:ext cx="0" cy="0"/>
+          <a:chOff x="0" y="0"/>
+          <a:chExt cx="0" cy="0"/>
+        </a:xfrm>
+      </p:grpSpPr>
+      <p:sp>
+        <p:nvSpPr>
+          <p:cNvPr id="2" name="Title 1"/>
+          <p:cNvSpPr>
+            <a:spLocks noGrp="1"/>
+          </p:cNvSpPr>
+          <p:nvPr>
+            <p:ph type="title"/>
+          </p:nvPr>
+        </p:nvSpPr>
+        <p:spPr/>
+        <p:txBody>
+          <a:bodyPr/>
+          <a:lstStyle/>
+          <a:p>
+            <a:r>
+              <a:rPr lang="en-US" dirty="0"/>
+              <a:t>Effective Engineering</a:t>
+            </a:r>
+          </a:p>
+        </p:txBody>
+      </p:sp>
+      <p:sp>
+        <p:nvSpPr>
+          <p:cNvPr id="3" name="Content Placeholder 2"/>
+          <p:cNvSpPr>
+            <a:spLocks noGrp="1"/>
+          </p:cNvSpPr>
+          <p:nvPr>
+            <p:ph idx="1"/>
+          </p:nvPr>
+        </p:nvSpPr>
+        <p:spPr>
+          <a:xfrm>
+            <a:off x="838200" y="1825625"/>
+            <a:ext cx="10515600" cy="4071700"/>
+          </a:xfrm>
+        </p:spPr>
+        <p:txBody>
+          <a:bodyPr>
+            <a:normAutofit fontScale="77500" lnSpcReduction="20000"/>
+          </a:bodyPr>
+          <a:lstStyle/>
+          <a:p>
+            <a:r>
+              <a:rPr lang="en-US" dirty="0"/>
+              <a:t>10x-engineers produce 10x the impact, they do not work 10x the hours. </a:t>
+            </a:r>
+          </a:p>
+          <a:p>
+            <a:r>
+              <a:rPr lang="en-US" dirty="0"/>
+              <a:t>These engineers, per observation:</a:t>
+            </a:r>
+          </a:p>
+          <a:p>
+            <a:pPr lvl="1"/>
+            <a:r>
+              <a:rPr lang="en-US" dirty="0"/>
+              <a:t>Focus on big levers (work on what has the most impact), e.g. reduce complexity in design, do unit tests where they are most relevant, ..</a:t>
+            </a:r>
+          </a:p>
+          <a:p>
+            <a:pPr lvl="1"/>
+            <a:r>
+              <a:rPr lang="en-US" dirty="0"/>
+              <a:t>Optimize for learning (use opportunities to learn, educate themselves, do side projects, ..)</a:t>
+            </a:r>
+          </a:p>
+          <a:p>
+            <a:pPr lvl="1"/>
+            <a:r>
+              <a:rPr lang="en-US" dirty="0"/>
+              <a:t>Invest in iteration speed (learn and provide tooling, create tools when you need to do something twice, fasten build processes, [learn to focus and complete things in time] ..)</a:t>
+            </a:r>
+          </a:p>
+          <a:p>
+            <a:pPr lvl="1"/>
+            <a:r>
+              <a:rPr lang="en-US" dirty="0"/>
+              <a:t>Validate your ideas aggressively and iteratively, validate the assumptions that go into your ideas (this is sometimes very simple to do)</a:t>
+            </a:r>
+          </a:p>
+          <a:p>
+            <a:pPr lvl="1"/>
+            <a:r>
+              <a:rPr lang="en-US" dirty="0"/>
+              <a:t>Reduce complexity:</a:t>
+            </a:r>
+          </a:p>
+          <a:p>
+            <a:pPr lvl="2"/>
+            <a:r>
+              <a:rPr lang="en-US" dirty="0"/>
+              <a:t>Code and system complexity (easier-to-maintain, easier-to-learn for beginners)</a:t>
+            </a:r>
+          </a:p>
+          <a:p>
+            <a:pPr lvl="2"/>
+            <a:r>
+              <a:rPr lang="en-US" dirty="0"/>
+              <a:t>Product complexity (no clear vision; each feature adds a lot to that)</a:t>
+            </a:r>
+          </a:p>
+          <a:p>
+            <a:pPr lvl="2"/>
+            <a:r>
+              <a:rPr lang="en-US" dirty="0"/>
+              <a:t>Minimize operational burden (at its core, this is a cost of code complexity). With organizational complexity, quality and motivation goes down due to lack of feedback/work in isolation, bus factor goes down.</a:t>
+            </a:r>
+          </a:p>
+          <a:p>
+            <a:pPr lvl="1"/>
+            <a:r>
+              <a:rPr lang="en-US" dirty="0"/>
+              <a:t>Build a great engineering culture</a:t>
+            </a:r>
+          </a:p>
+          <a:p>
+            <a:pPr lvl="2"/>
+            <a:r>
+              <a:rPr lang="en-US" dirty="0"/>
+              <a:t>Candidates like companies with all of the above.</a:t>
+            </a:r>
+          </a:p>
+          <a:p>
+            <a:pPr lvl="2"/>
+            <a:r>
+              <a:rPr lang="en-US" dirty="0"/>
+              <a:t>Resource conflicts: communicate between teams on their priorities. Align priorities, otherwise, understand them to see if possibly your team has to do some of the low-priority work of others</a:t>
+            </a:r>
+          </a:p>
+          <a:p>
+            <a:endParaRPr lang="en-US" dirty="0"/>
+          </a:p>
+        </p:txBody>
+      </p:sp>
+      <p:sp>
+        <p:nvSpPr>
+          <p:cNvPr id="4" name="Slide Number Placeholder 3"/>
+          <p:cNvSpPr>
+            <a:spLocks noGrp="1"/>
+          </p:cNvSpPr>
+          <p:nvPr>
+            <p:ph type="sldNum" sz="quarter" idx="12"/>
+          </p:nvPr>
+        </p:nvSpPr>
+        <p:spPr/>
+        <p:txBody>
+          <a:bodyPr/>
+          <a:lstStyle/>
+          <a:p>
+            <a:pPr algn="l"/>
+            <a:fld id="{11CDFDCC-1F45-4E80-8B17-15DA0BDDC059}" type="slidenum">
+              <a:rPr lang="en-US" smtClean="0"/>
+              <a:pPr algn="l"/>
+              <a:t>24</a:t>
             </a:fld>
             <a:endParaRPr lang="en-US" dirty="0"/>
           </a:p>

</xml_diff>